<commit_message>
updated chart and doc
</commit_message>
<xml_diff>
--- a/FinalProposal/OrgChart.pptx
+++ b/FinalProposal/OrgChart.pptx
@@ -7,14 +7,14 @@
   <p:sldIdLst>
     <p:sldId id="257" r:id="rId2"/>
   </p:sldIdLst>
-  <p:sldSz cx="9144000" cy="6858000" type="screen4x3"/>
+  <p:sldSz cx="10972800" cy="10972800"/>
   <p:notesSz cx="6858000" cy="9144000"/>
   <p:defaultTextStyle>
     <a:defPPr>
       <a:defRPr lang="en-US"/>
     </a:defPPr>
-    <a:lvl1pPr marL="0" algn="l" defTabSz="457200" rtl="0" eaLnBrk="1" latinLnBrk="0" hangingPunct="1">
-      <a:defRPr sz="1800" kern="1200">
+    <a:lvl1pPr marL="0" algn="l" defTabSz="627004" rtl="0" eaLnBrk="1" latinLnBrk="0" hangingPunct="1">
+      <a:defRPr sz="2500" kern="1200">
         <a:solidFill>
           <a:schemeClr val="tx1"/>
         </a:solidFill>
@@ -23,8 +23,8 @@
         <a:cs typeface="+mn-cs"/>
       </a:defRPr>
     </a:lvl1pPr>
-    <a:lvl2pPr marL="457200" algn="l" defTabSz="457200" rtl="0" eaLnBrk="1" latinLnBrk="0" hangingPunct="1">
-      <a:defRPr sz="1800" kern="1200">
+    <a:lvl2pPr marL="627004" algn="l" defTabSz="627004" rtl="0" eaLnBrk="1" latinLnBrk="0" hangingPunct="1">
+      <a:defRPr sz="2500" kern="1200">
         <a:solidFill>
           <a:schemeClr val="tx1"/>
         </a:solidFill>
@@ -33,8 +33,8 @@
         <a:cs typeface="+mn-cs"/>
       </a:defRPr>
     </a:lvl2pPr>
-    <a:lvl3pPr marL="914400" algn="l" defTabSz="457200" rtl="0" eaLnBrk="1" latinLnBrk="0" hangingPunct="1">
-      <a:defRPr sz="1800" kern="1200">
+    <a:lvl3pPr marL="1254008" algn="l" defTabSz="627004" rtl="0" eaLnBrk="1" latinLnBrk="0" hangingPunct="1">
+      <a:defRPr sz="2500" kern="1200">
         <a:solidFill>
           <a:schemeClr val="tx1"/>
         </a:solidFill>
@@ -43,8 +43,8 @@
         <a:cs typeface="+mn-cs"/>
       </a:defRPr>
     </a:lvl3pPr>
-    <a:lvl4pPr marL="1371600" algn="l" defTabSz="457200" rtl="0" eaLnBrk="1" latinLnBrk="0" hangingPunct="1">
-      <a:defRPr sz="1800" kern="1200">
+    <a:lvl4pPr marL="1881012" algn="l" defTabSz="627004" rtl="0" eaLnBrk="1" latinLnBrk="0" hangingPunct="1">
+      <a:defRPr sz="2500" kern="1200">
         <a:solidFill>
           <a:schemeClr val="tx1"/>
         </a:solidFill>
@@ -53,8 +53,8 @@
         <a:cs typeface="+mn-cs"/>
       </a:defRPr>
     </a:lvl4pPr>
-    <a:lvl5pPr marL="1828800" algn="l" defTabSz="457200" rtl="0" eaLnBrk="1" latinLnBrk="0" hangingPunct="1">
-      <a:defRPr sz="1800" kern="1200">
+    <a:lvl5pPr marL="2508016" algn="l" defTabSz="627004" rtl="0" eaLnBrk="1" latinLnBrk="0" hangingPunct="1">
+      <a:defRPr sz="2500" kern="1200">
         <a:solidFill>
           <a:schemeClr val="tx1"/>
         </a:solidFill>
@@ -63,8 +63,8 @@
         <a:cs typeface="+mn-cs"/>
       </a:defRPr>
     </a:lvl5pPr>
-    <a:lvl6pPr marL="2286000" algn="l" defTabSz="457200" rtl="0" eaLnBrk="1" latinLnBrk="0" hangingPunct="1">
-      <a:defRPr sz="1800" kern="1200">
+    <a:lvl6pPr marL="3135020" algn="l" defTabSz="627004" rtl="0" eaLnBrk="1" latinLnBrk="0" hangingPunct="1">
+      <a:defRPr sz="2500" kern="1200">
         <a:solidFill>
           <a:schemeClr val="tx1"/>
         </a:solidFill>
@@ -73,8 +73,8 @@
         <a:cs typeface="+mn-cs"/>
       </a:defRPr>
     </a:lvl6pPr>
-    <a:lvl7pPr marL="2743200" algn="l" defTabSz="457200" rtl="0" eaLnBrk="1" latinLnBrk="0" hangingPunct="1">
-      <a:defRPr sz="1800" kern="1200">
+    <a:lvl7pPr marL="3762024" algn="l" defTabSz="627004" rtl="0" eaLnBrk="1" latinLnBrk="0" hangingPunct="1">
+      <a:defRPr sz="2500" kern="1200">
         <a:solidFill>
           <a:schemeClr val="tx1"/>
         </a:solidFill>
@@ -83,8 +83,8 @@
         <a:cs typeface="+mn-cs"/>
       </a:defRPr>
     </a:lvl7pPr>
-    <a:lvl8pPr marL="3200400" algn="l" defTabSz="457200" rtl="0" eaLnBrk="1" latinLnBrk="0" hangingPunct="1">
-      <a:defRPr sz="1800" kern="1200">
+    <a:lvl8pPr marL="4389029" algn="l" defTabSz="627004" rtl="0" eaLnBrk="1" latinLnBrk="0" hangingPunct="1">
+      <a:defRPr sz="2500" kern="1200">
         <a:solidFill>
           <a:schemeClr val="tx1"/>
         </a:solidFill>
@@ -93,8 +93,8 @@
         <a:cs typeface="+mn-cs"/>
       </a:defRPr>
     </a:lvl8pPr>
-    <a:lvl9pPr marL="3657600" algn="l" defTabSz="457200" rtl="0" eaLnBrk="1" latinLnBrk="0" hangingPunct="1">
-      <a:defRPr sz="1800" kern="1200">
+    <a:lvl9pPr marL="5016033" algn="l" defTabSz="627004" rtl="0" eaLnBrk="1" latinLnBrk="0" hangingPunct="1">
+      <a:defRPr sz="2500" kern="1200">
         <a:solidFill>
           <a:schemeClr val="tx1"/>
         </a:solidFill>
@@ -136,8 +136,8 @@
         </p:nvSpPr>
         <p:spPr>
           <a:xfrm>
-            <a:off x="685800" y="2130425"/>
-            <a:ext cx="7772400" cy="1470025"/>
+            <a:off x="822960" y="3408683"/>
+            <a:ext cx="9326880" cy="2352040"/>
           </a:xfrm>
         </p:spPr>
         <p:txBody>
@@ -164,8 +164,8 @@
         </p:nvSpPr>
         <p:spPr>
           <a:xfrm>
-            <a:off x="1371600" y="3886200"/>
-            <a:ext cx="6400800" cy="1752600"/>
+            <a:off x="1645920" y="6217920"/>
+            <a:ext cx="7680960" cy="2804160"/>
           </a:xfrm>
         </p:spPr>
         <p:txBody>
@@ -181,7 +181,7 @@
                 </a:solidFill>
               </a:defRPr>
             </a:lvl1pPr>
-            <a:lvl2pPr marL="457200" indent="0" algn="ctr">
+            <a:lvl2pPr marL="627004" indent="0" algn="ctr">
               <a:buNone/>
               <a:defRPr>
                 <a:solidFill>
@@ -191,7 +191,7 @@
                 </a:solidFill>
               </a:defRPr>
             </a:lvl2pPr>
-            <a:lvl3pPr marL="914400" indent="0" algn="ctr">
+            <a:lvl3pPr marL="1254008" indent="0" algn="ctr">
               <a:buNone/>
               <a:defRPr>
                 <a:solidFill>
@@ -201,7 +201,7 @@
                 </a:solidFill>
               </a:defRPr>
             </a:lvl3pPr>
-            <a:lvl4pPr marL="1371600" indent="0" algn="ctr">
+            <a:lvl4pPr marL="1881012" indent="0" algn="ctr">
               <a:buNone/>
               <a:defRPr>
                 <a:solidFill>
@@ -211,7 +211,7 @@
                 </a:solidFill>
               </a:defRPr>
             </a:lvl4pPr>
-            <a:lvl5pPr marL="1828800" indent="0" algn="ctr">
+            <a:lvl5pPr marL="2508016" indent="0" algn="ctr">
               <a:buNone/>
               <a:defRPr>
                 <a:solidFill>
@@ -221,7 +221,7 @@
                 </a:solidFill>
               </a:defRPr>
             </a:lvl5pPr>
-            <a:lvl6pPr marL="2286000" indent="0" algn="ctr">
+            <a:lvl6pPr marL="3135020" indent="0" algn="ctr">
               <a:buNone/>
               <a:defRPr>
                 <a:solidFill>
@@ -231,7 +231,7 @@
                 </a:solidFill>
               </a:defRPr>
             </a:lvl6pPr>
-            <a:lvl7pPr marL="2743200" indent="0" algn="ctr">
+            <a:lvl7pPr marL="3762024" indent="0" algn="ctr">
               <a:buNone/>
               <a:defRPr>
                 <a:solidFill>
@@ -241,7 +241,7 @@
                 </a:solidFill>
               </a:defRPr>
             </a:lvl7pPr>
-            <a:lvl8pPr marL="3200400" indent="0" algn="ctr">
+            <a:lvl8pPr marL="4389029" indent="0" algn="ctr">
               <a:buNone/>
               <a:defRPr>
                 <a:solidFill>
@@ -251,7 +251,7 @@
                 </a:solidFill>
               </a:defRPr>
             </a:lvl8pPr>
-            <a:lvl9pPr marL="3657600" indent="0" algn="ctr">
+            <a:lvl9pPr marL="5016033" indent="0" algn="ctr">
               <a:buNone/>
               <a:defRPr>
                 <a:solidFill>
@@ -288,7 +288,7 @@
           <a:p>
             <a:fld id="{ECE00523-3F0A-3D4F-9F00-E442DF3AB4B6}" type="datetimeFigureOut">
               <a:rPr lang="en-US" smtClean="0"/>
-              <a:t>1/27/17</a:t>
+              <a:t>1/29/17</a:t>
             </a:fld>
             <a:endParaRPr lang="en-US"/>
           </a:p>
@@ -458,7 +458,7 @@
           <a:p>
             <a:fld id="{ECE00523-3F0A-3D4F-9F00-E442DF3AB4B6}" type="datetimeFigureOut">
               <a:rPr lang="en-US" smtClean="0"/>
-              <a:t>1/27/17</a:t>
+              <a:t>1/29/17</a:t>
             </a:fld>
             <a:endParaRPr lang="en-US"/>
           </a:p>
@@ -548,8 +548,8 @@
         </p:nvSpPr>
         <p:spPr>
           <a:xfrm>
-            <a:off x="6629400" y="274638"/>
-            <a:ext cx="2057400" cy="5851525"/>
+            <a:off x="7955280" y="439424"/>
+            <a:ext cx="2468880" cy="9362440"/>
           </a:xfrm>
         </p:spPr>
         <p:txBody>
@@ -576,8 +576,8 @@
         </p:nvSpPr>
         <p:spPr>
           <a:xfrm>
-            <a:off x="457200" y="274638"/>
-            <a:ext cx="6019800" cy="5851525"/>
+            <a:off x="548640" y="439424"/>
+            <a:ext cx="7223760" cy="9362440"/>
           </a:xfrm>
         </p:spPr>
         <p:txBody>
@@ -638,7 +638,7 @@
           <a:p>
             <a:fld id="{ECE00523-3F0A-3D4F-9F00-E442DF3AB4B6}" type="datetimeFigureOut">
               <a:rPr lang="en-US" smtClean="0"/>
-              <a:t>1/27/17</a:t>
+              <a:t>1/29/17</a:t>
             </a:fld>
             <a:endParaRPr lang="en-US"/>
           </a:p>
@@ -808,7 +808,7 @@
           <a:p>
             <a:fld id="{ECE00523-3F0A-3D4F-9F00-E442DF3AB4B6}" type="datetimeFigureOut">
               <a:rPr lang="en-US" smtClean="0"/>
-              <a:t>1/27/17</a:t>
+              <a:t>1/29/17</a:t>
             </a:fld>
             <a:endParaRPr lang="en-US"/>
           </a:p>
@@ -898,15 +898,15 @@
         </p:nvSpPr>
         <p:spPr>
           <a:xfrm>
-            <a:off x="722313" y="4406900"/>
-            <a:ext cx="7772400" cy="1362075"/>
+            <a:off x="866776" y="7051040"/>
+            <a:ext cx="9326880" cy="2179320"/>
           </a:xfrm>
         </p:spPr>
         <p:txBody>
           <a:bodyPr anchor="t"/>
           <a:lstStyle>
             <a:lvl1pPr algn="l">
-              <a:defRPr sz="4000" b="1" cap="all"/>
+              <a:defRPr sz="5500" b="1" cap="all"/>
             </a:lvl1pPr>
           </a:lstStyle>
           <a:p>
@@ -930,8 +930,8 @@
         </p:nvSpPr>
         <p:spPr>
           <a:xfrm>
-            <a:off x="722313" y="2906713"/>
-            <a:ext cx="7772400" cy="1500187"/>
+            <a:off x="866776" y="4650745"/>
+            <a:ext cx="9326880" cy="2400299"/>
           </a:xfrm>
         </p:spPr>
         <p:txBody>
@@ -939,7 +939,7 @@
           <a:lstStyle>
             <a:lvl1pPr marL="0" indent="0">
               <a:buNone/>
-              <a:defRPr sz="2000">
+              <a:defRPr sz="2700">
                 <a:solidFill>
                   <a:schemeClr val="tx1">
                     <a:tint val="75000"/>
@@ -947,9 +947,9 @@
                 </a:solidFill>
               </a:defRPr>
             </a:lvl1pPr>
-            <a:lvl2pPr marL="457200" indent="0">
-              <a:buNone/>
-              <a:defRPr sz="1800">
+            <a:lvl2pPr marL="627004" indent="0">
+              <a:buNone/>
+              <a:defRPr sz="2500">
                 <a:solidFill>
                   <a:schemeClr val="tx1">
                     <a:tint val="75000"/>
@@ -957,9 +957,9 @@
                 </a:solidFill>
               </a:defRPr>
             </a:lvl2pPr>
-            <a:lvl3pPr marL="914400" indent="0">
-              <a:buNone/>
-              <a:defRPr sz="1600">
+            <a:lvl3pPr marL="1254008" indent="0">
+              <a:buNone/>
+              <a:defRPr sz="2200">
                 <a:solidFill>
                   <a:schemeClr val="tx1">
                     <a:tint val="75000"/>
@@ -967,9 +967,9 @@
                 </a:solidFill>
               </a:defRPr>
             </a:lvl3pPr>
-            <a:lvl4pPr marL="1371600" indent="0">
-              <a:buNone/>
-              <a:defRPr sz="1400">
+            <a:lvl4pPr marL="1881012" indent="0">
+              <a:buNone/>
+              <a:defRPr sz="1900">
                 <a:solidFill>
                   <a:schemeClr val="tx1">
                     <a:tint val="75000"/>
@@ -977,9 +977,9 @@
                 </a:solidFill>
               </a:defRPr>
             </a:lvl4pPr>
-            <a:lvl5pPr marL="1828800" indent="0">
-              <a:buNone/>
-              <a:defRPr sz="1400">
+            <a:lvl5pPr marL="2508016" indent="0">
+              <a:buNone/>
+              <a:defRPr sz="1900">
                 <a:solidFill>
                   <a:schemeClr val="tx1">
                     <a:tint val="75000"/>
@@ -987,9 +987,9 @@
                 </a:solidFill>
               </a:defRPr>
             </a:lvl5pPr>
-            <a:lvl6pPr marL="2286000" indent="0">
-              <a:buNone/>
-              <a:defRPr sz="1400">
+            <a:lvl6pPr marL="3135020" indent="0">
+              <a:buNone/>
+              <a:defRPr sz="1900">
                 <a:solidFill>
                   <a:schemeClr val="tx1">
                     <a:tint val="75000"/>
@@ -997,9 +997,9 @@
                 </a:solidFill>
               </a:defRPr>
             </a:lvl6pPr>
-            <a:lvl7pPr marL="2743200" indent="0">
-              <a:buNone/>
-              <a:defRPr sz="1400">
+            <a:lvl7pPr marL="3762024" indent="0">
+              <a:buNone/>
+              <a:defRPr sz="1900">
                 <a:solidFill>
                   <a:schemeClr val="tx1">
                     <a:tint val="75000"/>
@@ -1007,9 +1007,9 @@
                 </a:solidFill>
               </a:defRPr>
             </a:lvl7pPr>
-            <a:lvl8pPr marL="3200400" indent="0">
-              <a:buNone/>
-              <a:defRPr sz="1400">
+            <a:lvl8pPr marL="4389029" indent="0">
+              <a:buNone/>
+              <a:defRPr sz="1900">
                 <a:solidFill>
                   <a:schemeClr val="tx1">
                     <a:tint val="75000"/>
@@ -1017,9 +1017,9 @@
                 </a:solidFill>
               </a:defRPr>
             </a:lvl8pPr>
-            <a:lvl9pPr marL="3657600" indent="0">
-              <a:buNone/>
-              <a:defRPr sz="1400">
+            <a:lvl9pPr marL="5016033" indent="0">
+              <a:buNone/>
+              <a:defRPr sz="1900">
                 <a:solidFill>
                   <a:schemeClr val="tx1">
                     <a:tint val="75000"/>
@@ -1054,7 +1054,7 @@
           <a:p>
             <a:fld id="{ECE00523-3F0A-3D4F-9F00-E442DF3AB4B6}" type="datetimeFigureOut">
               <a:rPr lang="en-US" smtClean="0"/>
-              <a:t>1/27/17</a:t>
+              <a:t>1/29/17</a:t>
             </a:fld>
             <a:endParaRPr lang="en-US"/>
           </a:p>
@@ -1167,39 +1167,39 @@
         </p:nvSpPr>
         <p:spPr>
           <a:xfrm>
-            <a:off x="457200" y="1600200"/>
-            <a:ext cx="4038600" cy="4525963"/>
+            <a:off x="548640" y="2560323"/>
+            <a:ext cx="4846320" cy="7241540"/>
           </a:xfrm>
         </p:spPr>
         <p:txBody>
           <a:bodyPr/>
           <a:lstStyle>
             <a:lvl1pPr>
-              <a:defRPr sz="2800"/>
+              <a:defRPr sz="3800"/>
             </a:lvl1pPr>
             <a:lvl2pPr>
-              <a:defRPr sz="2400"/>
+              <a:defRPr sz="3300"/>
             </a:lvl2pPr>
             <a:lvl3pPr>
-              <a:defRPr sz="2000"/>
+              <a:defRPr sz="2700"/>
             </a:lvl3pPr>
             <a:lvl4pPr>
-              <a:defRPr sz="1800"/>
+              <a:defRPr sz="2500"/>
             </a:lvl4pPr>
             <a:lvl5pPr>
-              <a:defRPr sz="1800"/>
+              <a:defRPr sz="2500"/>
             </a:lvl5pPr>
             <a:lvl6pPr>
-              <a:defRPr sz="1800"/>
+              <a:defRPr sz="2500"/>
             </a:lvl6pPr>
             <a:lvl7pPr>
-              <a:defRPr sz="1800"/>
+              <a:defRPr sz="2500"/>
             </a:lvl7pPr>
             <a:lvl8pPr>
-              <a:defRPr sz="1800"/>
+              <a:defRPr sz="2500"/>
             </a:lvl8pPr>
             <a:lvl9pPr>
-              <a:defRPr sz="1800"/>
+              <a:defRPr sz="2500"/>
             </a:lvl9pPr>
           </a:lstStyle>
           <a:p>
@@ -1252,39 +1252,39 @@
         </p:nvSpPr>
         <p:spPr>
           <a:xfrm>
-            <a:off x="4648200" y="1600200"/>
-            <a:ext cx="4038600" cy="4525963"/>
+            <a:off x="5577840" y="2560323"/>
+            <a:ext cx="4846320" cy="7241540"/>
           </a:xfrm>
         </p:spPr>
         <p:txBody>
           <a:bodyPr/>
           <a:lstStyle>
             <a:lvl1pPr>
-              <a:defRPr sz="2800"/>
+              <a:defRPr sz="3800"/>
             </a:lvl1pPr>
             <a:lvl2pPr>
-              <a:defRPr sz="2400"/>
+              <a:defRPr sz="3300"/>
             </a:lvl2pPr>
             <a:lvl3pPr>
-              <a:defRPr sz="2000"/>
+              <a:defRPr sz="2700"/>
             </a:lvl3pPr>
             <a:lvl4pPr>
-              <a:defRPr sz="1800"/>
+              <a:defRPr sz="2500"/>
             </a:lvl4pPr>
             <a:lvl5pPr>
-              <a:defRPr sz="1800"/>
+              <a:defRPr sz="2500"/>
             </a:lvl5pPr>
             <a:lvl6pPr>
-              <a:defRPr sz="1800"/>
+              <a:defRPr sz="2500"/>
             </a:lvl6pPr>
             <a:lvl7pPr>
-              <a:defRPr sz="1800"/>
+              <a:defRPr sz="2500"/>
             </a:lvl7pPr>
             <a:lvl8pPr>
-              <a:defRPr sz="1800"/>
+              <a:defRPr sz="2500"/>
             </a:lvl8pPr>
             <a:lvl9pPr>
-              <a:defRPr sz="1800"/>
+              <a:defRPr sz="2500"/>
             </a:lvl9pPr>
           </a:lstStyle>
           <a:p>
@@ -1342,7 +1342,7 @@
           <a:p>
             <a:fld id="{ECE00523-3F0A-3D4F-9F00-E442DF3AB4B6}" type="datetimeFigureOut">
               <a:rPr lang="en-US" smtClean="0"/>
-              <a:t>1/27/17</a:t>
+              <a:t>1/29/17</a:t>
             </a:fld>
             <a:endParaRPr lang="en-US"/>
           </a:p>
@@ -1459,8 +1459,8 @@
         </p:nvSpPr>
         <p:spPr>
           <a:xfrm>
-            <a:off x="457200" y="1535113"/>
-            <a:ext cx="4040188" cy="639762"/>
+            <a:off x="548642" y="2456181"/>
+            <a:ext cx="4848226" cy="1023619"/>
           </a:xfrm>
         </p:spPr>
         <p:txBody>
@@ -1468,39 +1468,39 @@
           <a:lstStyle>
             <a:lvl1pPr marL="0" indent="0">
               <a:buNone/>
-              <a:defRPr sz="2400" b="1"/>
+              <a:defRPr sz="3300" b="1"/>
             </a:lvl1pPr>
-            <a:lvl2pPr marL="457200" indent="0">
-              <a:buNone/>
-              <a:defRPr sz="2000" b="1"/>
+            <a:lvl2pPr marL="627004" indent="0">
+              <a:buNone/>
+              <a:defRPr sz="2700" b="1"/>
             </a:lvl2pPr>
-            <a:lvl3pPr marL="914400" indent="0">
-              <a:buNone/>
-              <a:defRPr sz="1800" b="1"/>
+            <a:lvl3pPr marL="1254008" indent="0">
+              <a:buNone/>
+              <a:defRPr sz="2500" b="1"/>
             </a:lvl3pPr>
-            <a:lvl4pPr marL="1371600" indent="0">
-              <a:buNone/>
-              <a:defRPr sz="1600" b="1"/>
+            <a:lvl4pPr marL="1881012" indent="0">
+              <a:buNone/>
+              <a:defRPr sz="2200" b="1"/>
             </a:lvl4pPr>
-            <a:lvl5pPr marL="1828800" indent="0">
-              <a:buNone/>
-              <a:defRPr sz="1600" b="1"/>
+            <a:lvl5pPr marL="2508016" indent="0">
+              <a:buNone/>
+              <a:defRPr sz="2200" b="1"/>
             </a:lvl5pPr>
-            <a:lvl6pPr marL="2286000" indent="0">
-              <a:buNone/>
-              <a:defRPr sz="1600" b="1"/>
+            <a:lvl6pPr marL="3135020" indent="0">
+              <a:buNone/>
+              <a:defRPr sz="2200" b="1"/>
             </a:lvl6pPr>
-            <a:lvl7pPr marL="2743200" indent="0">
-              <a:buNone/>
-              <a:defRPr sz="1600" b="1"/>
+            <a:lvl7pPr marL="3762024" indent="0">
+              <a:buNone/>
+              <a:defRPr sz="2200" b="1"/>
             </a:lvl7pPr>
-            <a:lvl8pPr marL="3200400" indent="0">
-              <a:buNone/>
-              <a:defRPr sz="1600" b="1"/>
+            <a:lvl8pPr marL="4389029" indent="0">
+              <a:buNone/>
+              <a:defRPr sz="2200" b="1"/>
             </a:lvl8pPr>
-            <a:lvl9pPr marL="3657600" indent="0">
-              <a:buNone/>
-              <a:defRPr sz="1600" b="1"/>
+            <a:lvl9pPr marL="5016033" indent="0">
+              <a:buNone/>
+              <a:defRPr sz="2200" b="1"/>
             </a:lvl9pPr>
           </a:lstStyle>
           <a:p>
@@ -1524,39 +1524,39 @@
         </p:nvSpPr>
         <p:spPr>
           <a:xfrm>
-            <a:off x="457200" y="2174875"/>
-            <a:ext cx="4040188" cy="3951288"/>
+            <a:off x="548642" y="3479800"/>
+            <a:ext cx="4848226" cy="6322061"/>
           </a:xfrm>
         </p:spPr>
         <p:txBody>
           <a:bodyPr/>
           <a:lstStyle>
             <a:lvl1pPr>
-              <a:defRPr sz="2400"/>
+              <a:defRPr sz="3300"/>
             </a:lvl1pPr>
             <a:lvl2pPr>
-              <a:defRPr sz="2000"/>
+              <a:defRPr sz="2700"/>
             </a:lvl2pPr>
             <a:lvl3pPr>
-              <a:defRPr sz="1800"/>
+              <a:defRPr sz="2500"/>
             </a:lvl3pPr>
             <a:lvl4pPr>
-              <a:defRPr sz="1600"/>
+              <a:defRPr sz="2200"/>
             </a:lvl4pPr>
             <a:lvl5pPr>
-              <a:defRPr sz="1600"/>
+              <a:defRPr sz="2200"/>
             </a:lvl5pPr>
             <a:lvl6pPr>
-              <a:defRPr sz="1600"/>
+              <a:defRPr sz="2200"/>
             </a:lvl6pPr>
             <a:lvl7pPr>
-              <a:defRPr sz="1600"/>
+              <a:defRPr sz="2200"/>
             </a:lvl7pPr>
             <a:lvl8pPr>
-              <a:defRPr sz="1600"/>
+              <a:defRPr sz="2200"/>
             </a:lvl8pPr>
             <a:lvl9pPr>
-              <a:defRPr sz="1600"/>
+              <a:defRPr sz="2200"/>
             </a:lvl9pPr>
           </a:lstStyle>
           <a:p>
@@ -1609,8 +1609,8 @@
         </p:nvSpPr>
         <p:spPr>
           <a:xfrm>
-            <a:off x="4645025" y="1535113"/>
-            <a:ext cx="4041775" cy="639762"/>
+            <a:off x="5574033" y="2456181"/>
+            <a:ext cx="4850130" cy="1023619"/>
           </a:xfrm>
         </p:spPr>
         <p:txBody>
@@ -1618,39 +1618,39 @@
           <a:lstStyle>
             <a:lvl1pPr marL="0" indent="0">
               <a:buNone/>
-              <a:defRPr sz="2400" b="1"/>
+              <a:defRPr sz="3300" b="1"/>
             </a:lvl1pPr>
-            <a:lvl2pPr marL="457200" indent="0">
-              <a:buNone/>
-              <a:defRPr sz="2000" b="1"/>
+            <a:lvl2pPr marL="627004" indent="0">
+              <a:buNone/>
+              <a:defRPr sz="2700" b="1"/>
             </a:lvl2pPr>
-            <a:lvl3pPr marL="914400" indent="0">
-              <a:buNone/>
-              <a:defRPr sz="1800" b="1"/>
+            <a:lvl3pPr marL="1254008" indent="0">
+              <a:buNone/>
+              <a:defRPr sz="2500" b="1"/>
             </a:lvl3pPr>
-            <a:lvl4pPr marL="1371600" indent="0">
-              <a:buNone/>
-              <a:defRPr sz="1600" b="1"/>
+            <a:lvl4pPr marL="1881012" indent="0">
+              <a:buNone/>
+              <a:defRPr sz="2200" b="1"/>
             </a:lvl4pPr>
-            <a:lvl5pPr marL="1828800" indent="0">
-              <a:buNone/>
-              <a:defRPr sz="1600" b="1"/>
+            <a:lvl5pPr marL="2508016" indent="0">
+              <a:buNone/>
+              <a:defRPr sz="2200" b="1"/>
             </a:lvl5pPr>
-            <a:lvl6pPr marL="2286000" indent="0">
-              <a:buNone/>
-              <a:defRPr sz="1600" b="1"/>
+            <a:lvl6pPr marL="3135020" indent="0">
+              <a:buNone/>
+              <a:defRPr sz="2200" b="1"/>
             </a:lvl6pPr>
-            <a:lvl7pPr marL="2743200" indent="0">
-              <a:buNone/>
-              <a:defRPr sz="1600" b="1"/>
+            <a:lvl7pPr marL="3762024" indent="0">
+              <a:buNone/>
+              <a:defRPr sz="2200" b="1"/>
             </a:lvl7pPr>
-            <a:lvl8pPr marL="3200400" indent="0">
-              <a:buNone/>
-              <a:defRPr sz="1600" b="1"/>
+            <a:lvl8pPr marL="4389029" indent="0">
+              <a:buNone/>
+              <a:defRPr sz="2200" b="1"/>
             </a:lvl8pPr>
-            <a:lvl9pPr marL="3657600" indent="0">
-              <a:buNone/>
-              <a:defRPr sz="1600" b="1"/>
+            <a:lvl9pPr marL="5016033" indent="0">
+              <a:buNone/>
+              <a:defRPr sz="2200" b="1"/>
             </a:lvl9pPr>
           </a:lstStyle>
           <a:p>
@@ -1674,39 +1674,39 @@
         </p:nvSpPr>
         <p:spPr>
           <a:xfrm>
-            <a:off x="4645025" y="2174875"/>
-            <a:ext cx="4041775" cy="3951288"/>
+            <a:off x="5574033" y="3479800"/>
+            <a:ext cx="4850130" cy="6322061"/>
           </a:xfrm>
         </p:spPr>
         <p:txBody>
           <a:bodyPr/>
           <a:lstStyle>
             <a:lvl1pPr>
-              <a:defRPr sz="2400"/>
+              <a:defRPr sz="3300"/>
             </a:lvl1pPr>
             <a:lvl2pPr>
-              <a:defRPr sz="2000"/>
+              <a:defRPr sz="2700"/>
             </a:lvl2pPr>
             <a:lvl3pPr>
-              <a:defRPr sz="1800"/>
+              <a:defRPr sz="2500"/>
             </a:lvl3pPr>
             <a:lvl4pPr>
-              <a:defRPr sz="1600"/>
+              <a:defRPr sz="2200"/>
             </a:lvl4pPr>
             <a:lvl5pPr>
-              <a:defRPr sz="1600"/>
+              <a:defRPr sz="2200"/>
             </a:lvl5pPr>
             <a:lvl6pPr>
-              <a:defRPr sz="1600"/>
+              <a:defRPr sz="2200"/>
             </a:lvl6pPr>
             <a:lvl7pPr>
-              <a:defRPr sz="1600"/>
+              <a:defRPr sz="2200"/>
             </a:lvl7pPr>
             <a:lvl8pPr>
-              <a:defRPr sz="1600"/>
+              <a:defRPr sz="2200"/>
             </a:lvl8pPr>
             <a:lvl9pPr>
-              <a:defRPr sz="1600"/>
+              <a:defRPr sz="2200"/>
             </a:lvl9pPr>
           </a:lstStyle>
           <a:p>
@@ -1764,7 +1764,7 @@
           <a:p>
             <a:fld id="{ECE00523-3F0A-3D4F-9F00-E442DF3AB4B6}" type="datetimeFigureOut">
               <a:rPr lang="en-US" smtClean="0"/>
-              <a:t>1/27/17</a:t>
+              <a:t>1/29/17</a:t>
             </a:fld>
             <a:endParaRPr lang="en-US"/>
           </a:p>
@@ -1882,7 +1882,7 @@
           <a:p>
             <a:fld id="{ECE00523-3F0A-3D4F-9F00-E442DF3AB4B6}" type="datetimeFigureOut">
               <a:rPr lang="en-US" smtClean="0"/>
-              <a:t>1/27/17</a:t>
+              <a:t>1/29/17</a:t>
             </a:fld>
             <a:endParaRPr lang="en-US"/>
           </a:p>
@@ -1977,7 +1977,7 @@
           <a:p>
             <a:fld id="{ECE00523-3F0A-3D4F-9F00-E442DF3AB4B6}" type="datetimeFigureOut">
               <a:rPr lang="en-US" smtClean="0"/>
-              <a:t>1/27/17</a:t>
+              <a:t>1/29/17</a:t>
             </a:fld>
             <a:endParaRPr lang="en-US"/>
           </a:p>
@@ -2067,15 +2067,15 @@
         </p:nvSpPr>
         <p:spPr>
           <a:xfrm>
-            <a:off x="457200" y="273050"/>
-            <a:ext cx="3008313" cy="1162050"/>
+            <a:off x="548642" y="436880"/>
+            <a:ext cx="3609976" cy="1859280"/>
           </a:xfrm>
         </p:spPr>
         <p:txBody>
           <a:bodyPr anchor="b"/>
           <a:lstStyle>
             <a:lvl1pPr algn="l">
-              <a:defRPr sz="2000" b="1"/>
+              <a:defRPr sz="2700" b="1"/>
             </a:lvl1pPr>
           </a:lstStyle>
           <a:p>
@@ -2099,39 +2099,39 @@
         </p:nvSpPr>
         <p:spPr>
           <a:xfrm>
-            <a:off x="3575050" y="273050"/>
-            <a:ext cx="5111750" cy="5853113"/>
+            <a:off x="4290062" y="436884"/>
+            <a:ext cx="6134101" cy="9364981"/>
           </a:xfrm>
         </p:spPr>
         <p:txBody>
           <a:bodyPr/>
           <a:lstStyle>
             <a:lvl1pPr>
-              <a:defRPr sz="3200"/>
+              <a:defRPr sz="4400"/>
             </a:lvl1pPr>
             <a:lvl2pPr>
-              <a:defRPr sz="2800"/>
+              <a:defRPr sz="3800"/>
             </a:lvl2pPr>
             <a:lvl3pPr>
-              <a:defRPr sz="2400"/>
+              <a:defRPr sz="3300"/>
             </a:lvl3pPr>
             <a:lvl4pPr>
-              <a:defRPr sz="2000"/>
+              <a:defRPr sz="2700"/>
             </a:lvl4pPr>
             <a:lvl5pPr>
-              <a:defRPr sz="2000"/>
+              <a:defRPr sz="2700"/>
             </a:lvl5pPr>
             <a:lvl6pPr>
-              <a:defRPr sz="2000"/>
+              <a:defRPr sz="2700"/>
             </a:lvl6pPr>
             <a:lvl7pPr>
-              <a:defRPr sz="2000"/>
+              <a:defRPr sz="2700"/>
             </a:lvl7pPr>
             <a:lvl8pPr>
-              <a:defRPr sz="2000"/>
+              <a:defRPr sz="2700"/>
             </a:lvl8pPr>
             <a:lvl9pPr>
-              <a:defRPr sz="2000"/>
+              <a:defRPr sz="2700"/>
             </a:lvl9pPr>
           </a:lstStyle>
           <a:p>
@@ -2184,8 +2184,8 @@
         </p:nvSpPr>
         <p:spPr>
           <a:xfrm>
-            <a:off x="457200" y="1435100"/>
-            <a:ext cx="3008313" cy="4691063"/>
+            <a:off x="548642" y="2296164"/>
+            <a:ext cx="3609976" cy="7505701"/>
           </a:xfrm>
         </p:spPr>
         <p:txBody>
@@ -2193,39 +2193,39 @@
           <a:lstStyle>
             <a:lvl1pPr marL="0" indent="0">
               <a:buNone/>
+              <a:defRPr sz="1900"/>
+            </a:lvl1pPr>
+            <a:lvl2pPr marL="627004" indent="0">
+              <a:buNone/>
+              <a:defRPr sz="1600"/>
+            </a:lvl2pPr>
+            <a:lvl3pPr marL="1254008" indent="0">
+              <a:buNone/>
               <a:defRPr sz="1400"/>
-            </a:lvl1pPr>
-            <a:lvl2pPr marL="457200" indent="0">
+            </a:lvl3pPr>
+            <a:lvl4pPr marL="1881012" indent="0">
               <a:buNone/>
               <a:defRPr sz="1200"/>
-            </a:lvl2pPr>
-            <a:lvl3pPr marL="914400" indent="0">
-              <a:buNone/>
-              <a:defRPr sz="1000"/>
-            </a:lvl3pPr>
-            <a:lvl4pPr marL="1371600" indent="0">
-              <a:buNone/>
-              <a:defRPr sz="900"/>
             </a:lvl4pPr>
-            <a:lvl5pPr marL="1828800" indent="0">
-              <a:buNone/>
-              <a:defRPr sz="900"/>
+            <a:lvl5pPr marL="2508016" indent="0">
+              <a:buNone/>
+              <a:defRPr sz="1200"/>
             </a:lvl5pPr>
-            <a:lvl6pPr marL="2286000" indent="0">
-              <a:buNone/>
-              <a:defRPr sz="900"/>
+            <a:lvl6pPr marL="3135020" indent="0">
+              <a:buNone/>
+              <a:defRPr sz="1200"/>
             </a:lvl6pPr>
-            <a:lvl7pPr marL="2743200" indent="0">
-              <a:buNone/>
-              <a:defRPr sz="900"/>
+            <a:lvl7pPr marL="3762024" indent="0">
+              <a:buNone/>
+              <a:defRPr sz="1200"/>
             </a:lvl7pPr>
-            <a:lvl8pPr marL="3200400" indent="0">
-              <a:buNone/>
-              <a:defRPr sz="900"/>
+            <a:lvl8pPr marL="4389029" indent="0">
+              <a:buNone/>
+              <a:defRPr sz="1200"/>
             </a:lvl8pPr>
-            <a:lvl9pPr marL="3657600" indent="0">
-              <a:buNone/>
-              <a:defRPr sz="900"/>
+            <a:lvl9pPr marL="5016033" indent="0">
+              <a:buNone/>
+              <a:defRPr sz="1200"/>
             </a:lvl9pPr>
           </a:lstStyle>
           <a:p>
@@ -2254,7 +2254,7 @@
           <a:p>
             <a:fld id="{ECE00523-3F0A-3D4F-9F00-E442DF3AB4B6}" type="datetimeFigureOut">
               <a:rPr lang="en-US" smtClean="0"/>
-              <a:t>1/27/17</a:t>
+              <a:t>1/29/17</a:t>
             </a:fld>
             <a:endParaRPr lang="en-US"/>
           </a:p>
@@ -2344,15 +2344,15 @@
         </p:nvSpPr>
         <p:spPr>
           <a:xfrm>
-            <a:off x="1792288" y="4800600"/>
-            <a:ext cx="5486400" cy="566738"/>
+            <a:off x="2150746" y="7680962"/>
+            <a:ext cx="6583680" cy="906781"/>
           </a:xfrm>
         </p:spPr>
         <p:txBody>
           <a:bodyPr anchor="b"/>
           <a:lstStyle>
             <a:lvl1pPr algn="l">
-              <a:defRPr sz="2000" b="1"/>
+              <a:defRPr sz="2700" b="1"/>
             </a:lvl1pPr>
           </a:lstStyle>
           <a:p>
@@ -2376,8 +2376,8 @@
         </p:nvSpPr>
         <p:spPr>
           <a:xfrm>
-            <a:off x="1792288" y="612775"/>
-            <a:ext cx="5486400" cy="4114800"/>
+            <a:off x="2150746" y="980440"/>
+            <a:ext cx="6583680" cy="6583680"/>
           </a:xfrm>
         </p:spPr>
         <p:txBody>
@@ -2385,39 +2385,39 @@
           <a:lstStyle>
             <a:lvl1pPr marL="0" indent="0">
               <a:buNone/>
-              <a:defRPr sz="3200"/>
+              <a:defRPr sz="4400"/>
             </a:lvl1pPr>
-            <a:lvl2pPr marL="457200" indent="0">
-              <a:buNone/>
-              <a:defRPr sz="2800"/>
+            <a:lvl2pPr marL="627004" indent="0">
+              <a:buNone/>
+              <a:defRPr sz="3800"/>
             </a:lvl2pPr>
-            <a:lvl3pPr marL="914400" indent="0">
-              <a:buNone/>
-              <a:defRPr sz="2400"/>
+            <a:lvl3pPr marL="1254008" indent="0">
+              <a:buNone/>
+              <a:defRPr sz="3300"/>
             </a:lvl3pPr>
-            <a:lvl4pPr marL="1371600" indent="0">
-              <a:buNone/>
-              <a:defRPr sz="2000"/>
+            <a:lvl4pPr marL="1881012" indent="0">
+              <a:buNone/>
+              <a:defRPr sz="2700"/>
             </a:lvl4pPr>
-            <a:lvl5pPr marL="1828800" indent="0">
-              <a:buNone/>
-              <a:defRPr sz="2000"/>
+            <a:lvl5pPr marL="2508016" indent="0">
+              <a:buNone/>
+              <a:defRPr sz="2700"/>
             </a:lvl5pPr>
-            <a:lvl6pPr marL="2286000" indent="0">
-              <a:buNone/>
-              <a:defRPr sz="2000"/>
+            <a:lvl6pPr marL="3135020" indent="0">
+              <a:buNone/>
+              <a:defRPr sz="2700"/>
             </a:lvl6pPr>
-            <a:lvl7pPr marL="2743200" indent="0">
-              <a:buNone/>
-              <a:defRPr sz="2000"/>
+            <a:lvl7pPr marL="3762024" indent="0">
+              <a:buNone/>
+              <a:defRPr sz="2700"/>
             </a:lvl7pPr>
-            <a:lvl8pPr marL="3200400" indent="0">
-              <a:buNone/>
-              <a:defRPr sz="2000"/>
+            <a:lvl8pPr marL="4389029" indent="0">
+              <a:buNone/>
+              <a:defRPr sz="2700"/>
             </a:lvl8pPr>
-            <a:lvl9pPr marL="3657600" indent="0">
-              <a:buNone/>
-              <a:defRPr sz="2000"/>
+            <a:lvl9pPr marL="5016033" indent="0">
+              <a:buNone/>
+              <a:defRPr sz="2700"/>
             </a:lvl9pPr>
           </a:lstStyle>
           <a:p>
@@ -2437,8 +2437,8 @@
         </p:nvSpPr>
         <p:spPr>
           <a:xfrm>
-            <a:off x="1792288" y="5367338"/>
-            <a:ext cx="5486400" cy="804862"/>
+            <a:off x="2150746" y="8587743"/>
+            <a:ext cx="6583680" cy="1287779"/>
           </a:xfrm>
         </p:spPr>
         <p:txBody>
@@ -2446,39 +2446,39 @@
           <a:lstStyle>
             <a:lvl1pPr marL="0" indent="0">
               <a:buNone/>
+              <a:defRPr sz="1900"/>
+            </a:lvl1pPr>
+            <a:lvl2pPr marL="627004" indent="0">
+              <a:buNone/>
+              <a:defRPr sz="1600"/>
+            </a:lvl2pPr>
+            <a:lvl3pPr marL="1254008" indent="0">
+              <a:buNone/>
               <a:defRPr sz="1400"/>
-            </a:lvl1pPr>
-            <a:lvl2pPr marL="457200" indent="0">
+            </a:lvl3pPr>
+            <a:lvl4pPr marL="1881012" indent="0">
               <a:buNone/>
               <a:defRPr sz="1200"/>
-            </a:lvl2pPr>
-            <a:lvl3pPr marL="914400" indent="0">
-              <a:buNone/>
-              <a:defRPr sz="1000"/>
-            </a:lvl3pPr>
-            <a:lvl4pPr marL="1371600" indent="0">
-              <a:buNone/>
-              <a:defRPr sz="900"/>
             </a:lvl4pPr>
-            <a:lvl5pPr marL="1828800" indent="0">
-              <a:buNone/>
-              <a:defRPr sz="900"/>
+            <a:lvl5pPr marL="2508016" indent="0">
+              <a:buNone/>
+              <a:defRPr sz="1200"/>
             </a:lvl5pPr>
-            <a:lvl6pPr marL="2286000" indent="0">
-              <a:buNone/>
-              <a:defRPr sz="900"/>
+            <a:lvl6pPr marL="3135020" indent="0">
+              <a:buNone/>
+              <a:defRPr sz="1200"/>
             </a:lvl6pPr>
-            <a:lvl7pPr marL="2743200" indent="0">
-              <a:buNone/>
-              <a:defRPr sz="900"/>
+            <a:lvl7pPr marL="3762024" indent="0">
+              <a:buNone/>
+              <a:defRPr sz="1200"/>
             </a:lvl7pPr>
-            <a:lvl8pPr marL="3200400" indent="0">
-              <a:buNone/>
-              <a:defRPr sz="900"/>
+            <a:lvl8pPr marL="4389029" indent="0">
+              <a:buNone/>
+              <a:defRPr sz="1200"/>
             </a:lvl8pPr>
-            <a:lvl9pPr marL="3657600" indent="0">
-              <a:buNone/>
-              <a:defRPr sz="900"/>
+            <a:lvl9pPr marL="5016033" indent="0">
+              <a:buNone/>
+              <a:defRPr sz="1200"/>
             </a:lvl9pPr>
           </a:lstStyle>
           <a:p>
@@ -2507,7 +2507,7 @@
           <a:p>
             <a:fld id="{ECE00523-3F0A-3D4F-9F00-E442DF3AB4B6}" type="datetimeFigureOut">
               <a:rPr lang="en-US" smtClean="0"/>
-              <a:t>1/27/17</a:t>
+              <a:t>1/29/17</a:t>
             </a:fld>
             <a:endParaRPr lang="en-US"/>
           </a:p>
@@ -2602,15 +2602,15 @@
         </p:nvSpPr>
         <p:spPr>
           <a:xfrm>
-            <a:off x="457200" y="274638"/>
-            <a:ext cx="8229600" cy="1143000"/>
+            <a:off x="548640" y="439421"/>
+            <a:ext cx="9875520" cy="1828800"/>
           </a:xfrm>
           <a:prstGeom prst="rect">
             <a:avLst/>
           </a:prstGeom>
         </p:spPr>
         <p:txBody>
-          <a:bodyPr vert="horz" lIns="91440" tIns="45720" rIns="91440" bIns="45720" rtlCol="0" anchor="ctr">
+          <a:bodyPr vert="horz" lIns="125401" tIns="62700" rIns="125401" bIns="62700" rtlCol="0" anchor="ctr">
             <a:normAutofit/>
           </a:bodyPr>
           <a:lstStyle/>
@@ -2635,15 +2635,15 @@
         </p:nvSpPr>
         <p:spPr>
           <a:xfrm>
-            <a:off x="457200" y="1600200"/>
-            <a:ext cx="8229600" cy="4525963"/>
+            <a:off x="548640" y="2560323"/>
+            <a:ext cx="9875520" cy="7241540"/>
           </a:xfrm>
           <a:prstGeom prst="rect">
             <a:avLst/>
           </a:prstGeom>
         </p:spPr>
         <p:txBody>
-          <a:bodyPr vert="horz" lIns="91440" tIns="45720" rIns="91440" bIns="45720" rtlCol="0">
+          <a:bodyPr vert="horz" lIns="125401" tIns="62700" rIns="125401" bIns="62700" rtlCol="0">
             <a:normAutofit/>
           </a:bodyPr>
           <a:lstStyle/>
@@ -2697,18 +2697,18 @@
         </p:nvSpPr>
         <p:spPr>
           <a:xfrm>
-            <a:off x="457200" y="6356350"/>
-            <a:ext cx="2133600" cy="365125"/>
+            <a:off x="548640" y="10170164"/>
+            <a:ext cx="2560320" cy="584200"/>
           </a:xfrm>
           <a:prstGeom prst="rect">
             <a:avLst/>
           </a:prstGeom>
         </p:spPr>
         <p:txBody>
-          <a:bodyPr vert="horz" lIns="91440" tIns="45720" rIns="91440" bIns="45720" rtlCol="0" anchor="ctr"/>
+          <a:bodyPr vert="horz" lIns="125401" tIns="62700" rIns="125401" bIns="62700" rtlCol="0" anchor="ctr"/>
           <a:lstStyle>
             <a:lvl1pPr algn="l">
-              <a:defRPr sz="1200">
+              <a:defRPr sz="1600">
                 <a:solidFill>
                   <a:schemeClr val="tx1">
                     <a:tint val="75000"/>
@@ -2720,7 +2720,7 @@
           <a:p>
             <a:fld id="{ECE00523-3F0A-3D4F-9F00-E442DF3AB4B6}" type="datetimeFigureOut">
               <a:rPr lang="en-US" smtClean="0"/>
-              <a:t>1/27/17</a:t>
+              <a:t>1/29/17</a:t>
             </a:fld>
             <a:endParaRPr lang="en-US"/>
           </a:p>
@@ -2738,18 +2738,18 @@
         </p:nvSpPr>
         <p:spPr>
           <a:xfrm>
-            <a:off x="3124200" y="6356350"/>
-            <a:ext cx="2895600" cy="365125"/>
+            <a:off x="3749040" y="10170164"/>
+            <a:ext cx="3474720" cy="584200"/>
           </a:xfrm>
           <a:prstGeom prst="rect">
             <a:avLst/>
           </a:prstGeom>
         </p:spPr>
         <p:txBody>
-          <a:bodyPr vert="horz" lIns="91440" tIns="45720" rIns="91440" bIns="45720" rtlCol="0" anchor="ctr"/>
+          <a:bodyPr vert="horz" lIns="125401" tIns="62700" rIns="125401" bIns="62700" rtlCol="0" anchor="ctr"/>
           <a:lstStyle>
             <a:lvl1pPr algn="ctr">
-              <a:defRPr sz="1200">
+              <a:defRPr sz="1600">
                 <a:solidFill>
                   <a:schemeClr val="tx1">
                     <a:tint val="75000"/>
@@ -2775,18 +2775,18 @@
         </p:nvSpPr>
         <p:spPr>
           <a:xfrm>
-            <a:off x="6553200" y="6356350"/>
-            <a:ext cx="2133600" cy="365125"/>
+            <a:off x="7863840" y="10170164"/>
+            <a:ext cx="2560320" cy="584200"/>
           </a:xfrm>
           <a:prstGeom prst="rect">
             <a:avLst/>
           </a:prstGeom>
         </p:spPr>
         <p:txBody>
-          <a:bodyPr vert="horz" lIns="91440" tIns="45720" rIns="91440" bIns="45720" rtlCol="0" anchor="ctr"/>
+          <a:bodyPr vert="horz" lIns="125401" tIns="62700" rIns="125401" bIns="62700" rtlCol="0" anchor="ctr"/>
           <a:lstStyle>
             <a:lvl1pPr algn="r">
-              <a:defRPr sz="1200">
+              <a:defRPr sz="1600">
                 <a:solidFill>
                   <a:schemeClr val="tx1">
                     <a:tint val="75000"/>
@@ -2827,12 +2827,12 @@
   </p:sldLayoutIdLst>
   <p:txStyles>
     <p:titleStyle>
-      <a:lvl1pPr algn="ctr" defTabSz="457200" rtl="0" eaLnBrk="1" latinLnBrk="0" hangingPunct="1">
+      <a:lvl1pPr algn="ctr" defTabSz="627004" rtl="0" eaLnBrk="1" latinLnBrk="0" hangingPunct="1">
         <a:spcBef>
           <a:spcPct val="0"/>
         </a:spcBef>
         <a:buNone/>
-        <a:defRPr sz="4400" kern="1200">
+        <a:defRPr sz="6000" kern="1200">
           <a:solidFill>
             <a:schemeClr val="tx1"/>
           </a:solidFill>
@@ -2843,13 +2843,13 @@
       </a:lvl1pPr>
     </p:titleStyle>
     <p:bodyStyle>
-      <a:lvl1pPr marL="342900" indent="-342900" algn="l" defTabSz="457200" rtl="0" eaLnBrk="1" latinLnBrk="0" hangingPunct="1">
+      <a:lvl1pPr marL="470253" indent="-470253" algn="l" defTabSz="627004" rtl="0" eaLnBrk="1" latinLnBrk="0" hangingPunct="1">
         <a:spcBef>
           <a:spcPct val="20000"/>
         </a:spcBef>
         <a:buFont typeface="Arial"/>
         <a:buChar char="•"/>
-        <a:defRPr sz="3200" kern="1200">
+        <a:defRPr sz="4400" kern="1200">
           <a:solidFill>
             <a:schemeClr val="tx1"/>
           </a:solidFill>
@@ -2858,13 +2858,13 @@
           <a:cs typeface="+mn-cs"/>
         </a:defRPr>
       </a:lvl1pPr>
-      <a:lvl2pPr marL="742950" indent="-285750" algn="l" defTabSz="457200" rtl="0" eaLnBrk="1" latinLnBrk="0" hangingPunct="1">
+      <a:lvl2pPr marL="1018882" indent="-391878" algn="l" defTabSz="627004" rtl="0" eaLnBrk="1" latinLnBrk="0" hangingPunct="1">
         <a:spcBef>
           <a:spcPct val="20000"/>
         </a:spcBef>
         <a:buFont typeface="Arial"/>
         <a:buChar char="–"/>
-        <a:defRPr sz="2800" kern="1200">
+        <a:defRPr sz="3800" kern="1200">
           <a:solidFill>
             <a:schemeClr val="tx1"/>
           </a:solidFill>
@@ -2873,13 +2873,13 @@
           <a:cs typeface="+mn-cs"/>
         </a:defRPr>
       </a:lvl2pPr>
-      <a:lvl3pPr marL="1143000" indent="-228600" algn="l" defTabSz="457200" rtl="0" eaLnBrk="1" latinLnBrk="0" hangingPunct="1">
+      <a:lvl3pPr marL="1567510" indent="-313502" algn="l" defTabSz="627004" rtl="0" eaLnBrk="1" latinLnBrk="0" hangingPunct="1">
         <a:spcBef>
           <a:spcPct val="20000"/>
         </a:spcBef>
         <a:buFont typeface="Arial"/>
         <a:buChar char="•"/>
-        <a:defRPr sz="2400" kern="1200">
+        <a:defRPr sz="3300" kern="1200">
           <a:solidFill>
             <a:schemeClr val="tx1"/>
           </a:solidFill>
@@ -2888,13 +2888,13 @@
           <a:cs typeface="+mn-cs"/>
         </a:defRPr>
       </a:lvl3pPr>
-      <a:lvl4pPr marL="1600200" indent="-228600" algn="l" defTabSz="457200" rtl="0" eaLnBrk="1" latinLnBrk="0" hangingPunct="1">
+      <a:lvl4pPr marL="2194514" indent="-313502" algn="l" defTabSz="627004" rtl="0" eaLnBrk="1" latinLnBrk="0" hangingPunct="1">
         <a:spcBef>
           <a:spcPct val="20000"/>
         </a:spcBef>
         <a:buFont typeface="Arial"/>
         <a:buChar char="–"/>
-        <a:defRPr sz="2000" kern="1200">
+        <a:defRPr sz="2700" kern="1200">
           <a:solidFill>
             <a:schemeClr val="tx1"/>
           </a:solidFill>
@@ -2903,13 +2903,13 @@
           <a:cs typeface="+mn-cs"/>
         </a:defRPr>
       </a:lvl4pPr>
-      <a:lvl5pPr marL="2057400" indent="-228600" algn="l" defTabSz="457200" rtl="0" eaLnBrk="1" latinLnBrk="0" hangingPunct="1">
+      <a:lvl5pPr marL="2821518" indent="-313502" algn="l" defTabSz="627004" rtl="0" eaLnBrk="1" latinLnBrk="0" hangingPunct="1">
         <a:spcBef>
           <a:spcPct val="20000"/>
         </a:spcBef>
         <a:buFont typeface="Arial"/>
         <a:buChar char="»"/>
-        <a:defRPr sz="2000" kern="1200">
+        <a:defRPr sz="2700" kern="1200">
           <a:solidFill>
             <a:schemeClr val="tx1"/>
           </a:solidFill>
@@ -2918,13 +2918,13 @@
           <a:cs typeface="+mn-cs"/>
         </a:defRPr>
       </a:lvl5pPr>
-      <a:lvl6pPr marL="2514600" indent="-228600" algn="l" defTabSz="457200" rtl="0" eaLnBrk="1" latinLnBrk="0" hangingPunct="1">
+      <a:lvl6pPr marL="3448522" indent="-313502" algn="l" defTabSz="627004" rtl="0" eaLnBrk="1" latinLnBrk="0" hangingPunct="1">
         <a:spcBef>
           <a:spcPct val="20000"/>
         </a:spcBef>
         <a:buFont typeface="Arial"/>
         <a:buChar char="•"/>
-        <a:defRPr sz="2000" kern="1200">
+        <a:defRPr sz="2700" kern="1200">
           <a:solidFill>
             <a:schemeClr val="tx1"/>
           </a:solidFill>
@@ -2933,13 +2933,13 @@
           <a:cs typeface="+mn-cs"/>
         </a:defRPr>
       </a:lvl6pPr>
-      <a:lvl7pPr marL="2971800" indent="-228600" algn="l" defTabSz="457200" rtl="0" eaLnBrk="1" latinLnBrk="0" hangingPunct="1">
+      <a:lvl7pPr marL="4075527" indent="-313502" algn="l" defTabSz="627004" rtl="0" eaLnBrk="1" latinLnBrk="0" hangingPunct="1">
         <a:spcBef>
           <a:spcPct val="20000"/>
         </a:spcBef>
         <a:buFont typeface="Arial"/>
         <a:buChar char="•"/>
-        <a:defRPr sz="2000" kern="1200">
+        <a:defRPr sz="2700" kern="1200">
           <a:solidFill>
             <a:schemeClr val="tx1"/>
           </a:solidFill>
@@ -2948,13 +2948,13 @@
           <a:cs typeface="+mn-cs"/>
         </a:defRPr>
       </a:lvl7pPr>
-      <a:lvl8pPr marL="3429000" indent="-228600" algn="l" defTabSz="457200" rtl="0" eaLnBrk="1" latinLnBrk="0" hangingPunct="1">
+      <a:lvl8pPr marL="4702531" indent="-313502" algn="l" defTabSz="627004" rtl="0" eaLnBrk="1" latinLnBrk="0" hangingPunct="1">
         <a:spcBef>
           <a:spcPct val="20000"/>
         </a:spcBef>
         <a:buFont typeface="Arial"/>
         <a:buChar char="•"/>
-        <a:defRPr sz="2000" kern="1200">
+        <a:defRPr sz="2700" kern="1200">
           <a:solidFill>
             <a:schemeClr val="tx1"/>
           </a:solidFill>
@@ -2963,13 +2963,13 @@
           <a:cs typeface="+mn-cs"/>
         </a:defRPr>
       </a:lvl8pPr>
-      <a:lvl9pPr marL="3886200" indent="-228600" algn="l" defTabSz="457200" rtl="0" eaLnBrk="1" latinLnBrk="0" hangingPunct="1">
+      <a:lvl9pPr marL="5329535" indent="-313502" algn="l" defTabSz="627004" rtl="0" eaLnBrk="1" latinLnBrk="0" hangingPunct="1">
         <a:spcBef>
           <a:spcPct val="20000"/>
         </a:spcBef>
         <a:buFont typeface="Arial"/>
         <a:buChar char="•"/>
-        <a:defRPr sz="2000" kern="1200">
+        <a:defRPr sz="2700" kern="1200">
           <a:solidFill>
             <a:schemeClr val="tx1"/>
           </a:solidFill>
@@ -2983,8 +2983,8 @@
       <a:defPPr>
         <a:defRPr lang="en-US"/>
       </a:defPPr>
-      <a:lvl1pPr marL="0" algn="l" defTabSz="457200" rtl="0" eaLnBrk="1" latinLnBrk="0" hangingPunct="1">
-        <a:defRPr sz="1800" kern="1200">
+      <a:lvl1pPr marL="0" algn="l" defTabSz="627004" rtl="0" eaLnBrk="1" latinLnBrk="0" hangingPunct="1">
+        <a:defRPr sz="2500" kern="1200">
           <a:solidFill>
             <a:schemeClr val="tx1"/>
           </a:solidFill>
@@ -2993,8 +2993,8 @@
           <a:cs typeface="+mn-cs"/>
         </a:defRPr>
       </a:lvl1pPr>
-      <a:lvl2pPr marL="457200" algn="l" defTabSz="457200" rtl="0" eaLnBrk="1" latinLnBrk="0" hangingPunct="1">
-        <a:defRPr sz="1800" kern="1200">
+      <a:lvl2pPr marL="627004" algn="l" defTabSz="627004" rtl="0" eaLnBrk="1" latinLnBrk="0" hangingPunct="1">
+        <a:defRPr sz="2500" kern="1200">
           <a:solidFill>
             <a:schemeClr val="tx1"/>
           </a:solidFill>
@@ -3003,8 +3003,8 @@
           <a:cs typeface="+mn-cs"/>
         </a:defRPr>
       </a:lvl2pPr>
-      <a:lvl3pPr marL="914400" algn="l" defTabSz="457200" rtl="0" eaLnBrk="1" latinLnBrk="0" hangingPunct="1">
-        <a:defRPr sz="1800" kern="1200">
+      <a:lvl3pPr marL="1254008" algn="l" defTabSz="627004" rtl="0" eaLnBrk="1" latinLnBrk="0" hangingPunct="1">
+        <a:defRPr sz="2500" kern="1200">
           <a:solidFill>
             <a:schemeClr val="tx1"/>
           </a:solidFill>
@@ -3013,8 +3013,8 @@
           <a:cs typeface="+mn-cs"/>
         </a:defRPr>
       </a:lvl3pPr>
-      <a:lvl4pPr marL="1371600" algn="l" defTabSz="457200" rtl="0" eaLnBrk="1" latinLnBrk="0" hangingPunct="1">
-        <a:defRPr sz="1800" kern="1200">
+      <a:lvl4pPr marL="1881012" algn="l" defTabSz="627004" rtl="0" eaLnBrk="1" latinLnBrk="0" hangingPunct="1">
+        <a:defRPr sz="2500" kern="1200">
           <a:solidFill>
             <a:schemeClr val="tx1"/>
           </a:solidFill>
@@ -3023,8 +3023,8 @@
           <a:cs typeface="+mn-cs"/>
         </a:defRPr>
       </a:lvl4pPr>
-      <a:lvl5pPr marL="1828800" algn="l" defTabSz="457200" rtl="0" eaLnBrk="1" latinLnBrk="0" hangingPunct="1">
-        <a:defRPr sz="1800" kern="1200">
+      <a:lvl5pPr marL="2508016" algn="l" defTabSz="627004" rtl="0" eaLnBrk="1" latinLnBrk="0" hangingPunct="1">
+        <a:defRPr sz="2500" kern="1200">
           <a:solidFill>
             <a:schemeClr val="tx1"/>
           </a:solidFill>
@@ -3033,8 +3033,8 @@
           <a:cs typeface="+mn-cs"/>
         </a:defRPr>
       </a:lvl5pPr>
-      <a:lvl6pPr marL="2286000" algn="l" defTabSz="457200" rtl="0" eaLnBrk="1" latinLnBrk="0" hangingPunct="1">
-        <a:defRPr sz="1800" kern="1200">
+      <a:lvl6pPr marL="3135020" algn="l" defTabSz="627004" rtl="0" eaLnBrk="1" latinLnBrk="0" hangingPunct="1">
+        <a:defRPr sz="2500" kern="1200">
           <a:solidFill>
             <a:schemeClr val="tx1"/>
           </a:solidFill>
@@ -3043,8 +3043,8 @@
           <a:cs typeface="+mn-cs"/>
         </a:defRPr>
       </a:lvl6pPr>
-      <a:lvl7pPr marL="2743200" algn="l" defTabSz="457200" rtl="0" eaLnBrk="1" latinLnBrk="0" hangingPunct="1">
-        <a:defRPr sz="1800" kern="1200">
+      <a:lvl7pPr marL="3762024" algn="l" defTabSz="627004" rtl="0" eaLnBrk="1" latinLnBrk="0" hangingPunct="1">
+        <a:defRPr sz="2500" kern="1200">
           <a:solidFill>
             <a:schemeClr val="tx1"/>
           </a:solidFill>
@@ -3053,8 +3053,8 @@
           <a:cs typeface="+mn-cs"/>
         </a:defRPr>
       </a:lvl7pPr>
-      <a:lvl8pPr marL="3200400" algn="l" defTabSz="457200" rtl="0" eaLnBrk="1" latinLnBrk="0" hangingPunct="1">
-        <a:defRPr sz="1800" kern="1200">
+      <a:lvl8pPr marL="4389029" algn="l" defTabSz="627004" rtl="0" eaLnBrk="1" latinLnBrk="0" hangingPunct="1">
+        <a:defRPr sz="2500" kern="1200">
           <a:solidFill>
             <a:schemeClr val="tx1"/>
           </a:solidFill>
@@ -3063,8 +3063,8 @@
           <a:cs typeface="+mn-cs"/>
         </a:defRPr>
       </a:lvl8pPr>
-      <a:lvl9pPr marL="3657600" algn="l" defTabSz="457200" rtl="0" eaLnBrk="1" latinLnBrk="0" hangingPunct="1">
-        <a:defRPr sz="1800" kern="1200">
+      <a:lvl9pPr marL="5016033" algn="l" defTabSz="627004" rtl="0" eaLnBrk="1" latinLnBrk="0" hangingPunct="1">
+        <a:defRPr sz="2500" kern="1200">
           <a:solidFill>
             <a:schemeClr val="tx1"/>
           </a:solidFill>
@@ -3097,19 +3097,69 @@
       </p:grpSpPr>
       <p:sp>
         <p:nvSpPr>
-          <p:cNvPr id="17" name="Process 16"/>
+          <p:cNvPr id="45" name="Alternate Process 44"/>
           <p:cNvSpPr/>
           <p:nvPr/>
         </p:nvSpPr>
         <p:spPr>
           <a:xfrm>
-            <a:off x="4015236" y="1298059"/>
-            <a:ext cx="1426258" cy="771166"/>
+            <a:off x="3186211" y="22537"/>
+            <a:ext cx="4769945" cy="2484196"/>
+          </a:xfrm>
+          <a:prstGeom prst="flowChartAlternateProcess">
+            <a:avLst/>
+          </a:prstGeom>
+          <a:solidFill>
+            <a:schemeClr val="bg1">
+              <a:lumMod val="85000"/>
+            </a:schemeClr>
+          </a:solidFill>
+          <a:ln>
+            <a:solidFill>
+              <a:schemeClr val="tx1"/>
+            </a:solidFill>
+          </a:ln>
+        </p:spPr>
+        <p:style>
+          <a:lnRef idx="1">
+            <a:schemeClr val="accent1"/>
+          </a:lnRef>
+          <a:fillRef idx="3">
+            <a:schemeClr val="accent1"/>
+          </a:fillRef>
+          <a:effectRef idx="2">
+            <a:schemeClr val="accent1"/>
+          </a:effectRef>
+          <a:fontRef idx="minor">
+            <a:schemeClr val="lt1"/>
+          </a:fontRef>
+        </p:style>
+        <p:txBody>
+          <a:bodyPr rtlCol="0" anchor="ctr"/>
+          <a:lstStyle/>
+          <a:p>
+            <a:pPr algn="ctr"/>
+            <a:endParaRPr lang="en-US"/>
+          </a:p>
+        </p:txBody>
+      </p:sp>
+      <p:sp>
+        <p:nvSpPr>
+          <p:cNvPr id="46" name="Process 45"/>
+          <p:cNvSpPr/>
+          <p:nvPr/>
+        </p:nvSpPr>
+        <p:spPr>
+          <a:xfrm>
+            <a:off x="4857522" y="366460"/>
+            <a:ext cx="1426259" cy="771166"/>
           </a:xfrm>
           <a:prstGeom prst="flowChartProcess">
             <a:avLst/>
           </a:prstGeom>
-          <a:noFill/>
+          <a:solidFill>
+            <a:schemeClr val="bg1"/>
+          </a:solidFill>
           <a:ln>
             <a:solidFill>
               <a:schemeClr val="tx1"/>
@@ -3136,7 +3186,7 @@
           <a:lstStyle/>
           <a:p>
             <a:r>
-              <a:rPr lang="en-US" sz="1100" dirty="0" smtClean="0">
+              <a:rPr lang="en-US" sz="1100" b="1" dirty="0" smtClean="0">
                 <a:solidFill>
                   <a:srgbClr val="000000"/>
                 </a:solidFill>
@@ -3144,7 +3194,18 @@
                 <a:latin typeface="Arial"/>
                 <a:cs typeface="Arial"/>
               </a:rPr>
-              <a:t>PI O’Meara: Oversee project to ensure delivery of targets. Workshops </a:t>
+              <a:t>PI O’Meara</a:t>
+            </a:r>
+            <a:r>
+              <a:rPr lang="en-US" sz="1100" dirty="0" smtClean="0">
+                <a:solidFill>
+                  <a:srgbClr val="000000"/>
+                </a:solidFill>
+                <a:effectLst/>
+                <a:latin typeface="Arial"/>
+                <a:cs typeface="Arial"/>
+              </a:rPr>
+              <a:t>: Oversee project to ensure delivery of targets. Workshops </a:t>
             </a:r>
             <a:endParaRPr lang="en-US" sz="1100" dirty="0">
               <a:solidFill>
@@ -3159,16 +3220,17 @@
       </p:sp>
       <p:cxnSp>
         <p:nvCxnSpPr>
-          <p:cNvPr id="29" name="Curved Connector 28"/>
+          <p:cNvPr id="47" name="Curved Connector 46"/>
           <p:cNvCxnSpPr>
-            <a:stCxn id="17" idx="3"/>
+            <a:stCxn id="46" idx="2"/>
+            <a:endCxn id="52" idx="0"/>
           </p:cNvCxnSpPr>
           <p:nvPr/>
         </p:nvCxnSpPr>
         <p:spPr>
-          <a:xfrm>
-            <a:off x="5441494" y="1683642"/>
-            <a:ext cx="1979512" cy="21381"/>
+          <a:xfrm rot="16200000" flipH="1">
+            <a:off x="5439577" y="1268701"/>
+            <a:ext cx="273292" cy="11142"/>
           </a:xfrm>
           <a:prstGeom prst="curvedConnector3">
             <a:avLst>
@@ -3205,19 +3267,21 @@
       </p:cxnSp>
       <p:sp>
         <p:nvSpPr>
-          <p:cNvPr id="42" name="Process 41"/>
+          <p:cNvPr id="48" name="Process 47"/>
           <p:cNvSpPr/>
           <p:nvPr/>
         </p:nvSpPr>
         <p:spPr>
           <a:xfrm>
-            <a:off x="2238972" y="1478474"/>
-            <a:ext cx="1426258" cy="771166"/>
+            <a:off x="3271877" y="366459"/>
+            <a:ext cx="1426259" cy="771166"/>
           </a:xfrm>
           <a:prstGeom prst="flowChartProcess">
             <a:avLst/>
           </a:prstGeom>
-          <a:noFill/>
+          <a:solidFill>
+            <a:schemeClr val="bg1"/>
+          </a:solidFill>
           <a:ln>
             <a:solidFill>
               <a:schemeClr val="tx1"/>
@@ -3244,7 +3308,7 @@
           <a:lstStyle/>
           <a:p>
             <a:r>
-              <a:rPr lang="en-US" sz="1100" dirty="0" smtClean="0">
+              <a:rPr lang="en-US" sz="1100" b="1" dirty="0" smtClean="0">
                 <a:solidFill>
                   <a:srgbClr val="000000"/>
                 </a:solidFill>
@@ -3255,7 +3319,7 @@
               <a:t>Co-PI </a:t>
             </a:r>
             <a:r>
-              <a:rPr lang="en-US" sz="1100" dirty="0" err="1" smtClean="0">
+              <a:rPr lang="en-US" sz="1100" b="1" dirty="0" err="1" smtClean="0">
                 <a:solidFill>
                   <a:srgbClr val="000000"/>
                 </a:solidFill>
@@ -3289,19 +3353,21 @@
       </p:sp>
       <p:sp>
         <p:nvSpPr>
-          <p:cNvPr id="43" name="Process 42"/>
+          <p:cNvPr id="49" name="Process 48"/>
           <p:cNvSpPr/>
           <p:nvPr/>
         </p:nvSpPr>
         <p:spPr>
           <a:xfrm>
-            <a:off x="3502565" y="2919594"/>
-            <a:ext cx="1426258" cy="771166"/>
+            <a:off x="3271877" y="1410918"/>
+            <a:ext cx="1426259" cy="771166"/>
           </a:xfrm>
           <a:prstGeom prst="flowChartProcess">
             <a:avLst/>
           </a:prstGeom>
-          <a:noFill/>
+          <a:solidFill>
+            <a:schemeClr val="bg1"/>
+          </a:solidFill>
           <a:ln>
             <a:solidFill>
               <a:schemeClr val="tx1"/>
@@ -3328,7 +3394,7 @@
           <a:lstStyle/>
           <a:p>
             <a:r>
-              <a:rPr lang="en-US" sz="1100" dirty="0" smtClean="0">
+              <a:rPr lang="en-US" sz="1100" b="1" dirty="0" smtClean="0">
                 <a:solidFill>
                   <a:srgbClr val="000000"/>
                 </a:solidFill>
@@ -3339,7 +3405,7 @@
               <a:t>Co-PI </a:t>
             </a:r>
             <a:r>
-              <a:rPr lang="en-US" sz="1100" dirty="0" err="1" smtClean="0">
+              <a:rPr lang="en-US" sz="1100" b="1" dirty="0" err="1" smtClean="0">
                 <a:solidFill>
                   <a:srgbClr val="000000"/>
                 </a:solidFill>
@@ -3347,7 +3413,7 @@
                 <a:latin typeface="Arial"/>
                 <a:cs typeface="Arial"/>
               </a:rPr>
-              <a:t>Kwit</a:t>
+              <a:t>Staton</a:t>
             </a:r>
             <a:r>
               <a:rPr lang="en-US" sz="1100" dirty="0" smtClean="0">
@@ -3358,7 +3424,7 @@
                 <a:latin typeface="Arial"/>
                 <a:cs typeface="Arial"/>
               </a:rPr>
-              <a:t>: Liaison between students and external groups</a:t>
+              <a:t>: Teach workshops, identify curriculum needs </a:t>
             </a:r>
             <a:endParaRPr lang="en-US" sz="1100" dirty="0">
               <a:solidFill>
@@ -3371,6 +3437,1883 @@
           </a:p>
         </p:txBody>
       </p:sp>
+      <p:sp>
+        <p:nvSpPr>
+          <p:cNvPr id="50" name="Process 49"/>
+          <p:cNvSpPr/>
+          <p:nvPr/>
+        </p:nvSpPr>
+        <p:spPr>
+          <a:xfrm>
+            <a:off x="6443169" y="366460"/>
+            <a:ext cx="1426259" cy="771166"/>
+          </a:xfrm>
+          <a:prstGeom prst="flowChartProcess">
+            <a:avLst/>
+          </a:prstGeom>
+          <a:solidFill>
+            <a:schemeClr val="bg1"/>
+          </a:solidFill>
+          <a:ln>
+            <a:solidFill>
+              <a:schemeClr val="tx1"/>
+            </a:solidFill>
+          </a:ln>
+          <a:effectLst/>
+        </p:spPr>
+        <p:style>
+          <a:lnRef idx="1">
+            <a:schemeClr val="accent1"/>
+          </a:lnRef>
+          <a:fillRef idx="3">
+            <a:schemeClr val="accent1"/>
+          </a:fillRef>
+          <a:effectRef idx="2">
+            <a:schemeClr val="accent1"/>
+          </a:effectRef>
+          <a:fontRef idx="minor">
+            <a:schemeClr val="lt1"/>
+          </a:fontRef>
+        </p:style>
+        <p:txBody>
+          <a:bodyPr rtlCol="0" anchor="ctr"/>
+          <a:lstStyle/>
+          <a:p>
+            <a:r>
+              <a:rPr lang="en-US" sz="1100" b="1" dirty="0" smtClean="0">
+                <a:solidFill>
+                  <a:srgbClr val="000000"/>
+                </a:solidFill>
+                <a:effectLst/>
+                <a:latin typeface="Arial"/>
+                <a:cs typeface="Arial"/>
+              </a:rPr>
+              <a:t>Co-PI </a:t>
+            </a:r>
+            <a:r>
+              <a:rPr lang="en-US" sz="1100" b="1" dirty="0" smtClean="0">
+                <a:solidFill>
+                  <a:srgbClr val="000000"/>
+                </a:solidFill>
+                <a:effectLst/>
+                <a:latin typeface="Arial"/>
+                <a:cs typeface="Arial"/>
+              </a:rPr>
+              <a:t>Moulton</a:t>
+            </a:r>
+            <a:r>
+              <a:rPr lang="en-US" sz="1100" dirty="0" smtClean="0">
+                <a:solidFill>
+                  <a:srgbClr val="000000"/>
+                </a:solidFill>
+                <a:effectLst/>
+                <a:latin typeface="Arial"/>
+                <a:cs typeface="Arial"/>
+              </a:rPr>
+              <a:t>: Mentoring students, teaching</a:t>
+            </a:r>
+            <a:endParaRPr lang="en-US" sz="1100" dirty="0">
+              <a:solidFill>
+                <a:srgbClr val="000000"/>
+              </a:solidFill>
+              <a:effectLst/>
+              <a:latin typeface="Arial"/>
+              <a:cs typeface="Arial"/>
+            </a:endParaRPr>
+          </a:p>
+        </p:txBody>
+      </p:sp>
+      <p:sp>
+        <p:nvSpPr>
+          <p:cNvPr id="51" name="Process 50"/>
+          <p:cNvSpPr/>
+          <p:nvPr/>
+        </p:nvSpPr>
+        <p:spPr>
+          <a:xfrm>
+            <a:off x="6443169" y="1291072"/>
+            <a:ext cx="1426259" cy="771166"/>
+          </a:xfrm>
+          <a:prstGeom prst="flowChartProcess">
+            <a:avLst/>
+          </a:prstGeom>
+          <a:solidFill>
+            <a:schemeClr val="bg1"/>
+          </a:solidFill>
+          <a:ln>
+            <a:solidFill>
+              <a:schemeClr val="tx1"/>
+            </a:solidFill>
+          </a:ln>
+          <a:effectLst/>
+        </p:spPr>
+        <p:style>
+          <a:lnRef idx="1">
+            <a:schemeClr val="accent1"/>
+          </a:lnRef>
+          <a:fillRef idx="3">
+            <a:schemeClr val="accent1"/>
+          </a:fillRef>
+          <a:effectRef idx="2">
+            <a:schemeClr val="accent1"/>
+          </a:effectRef>
+          <a:fontRef idx="minor">
+            <a:schemeClr val="lt1"/>
+          </a:fontRef>
+        </p:style>
+        <p:txBody>
+          <a:bodyPr rtlCol="0" anchor="ctr"/>
+          <a:lstStyle/>
+          <a:p>
+            <a:r>
+              <a:rPr lang="en-US" sz="1100" b="1" dirty="0" smtClean="0">
+                <a:solidFill>
+                  <a:srgbClr val="000000"/>
+                </a:solidFill>
+                <a:effectLst/>
+                <a:latin typeface="Arial"/>
+                <a:cs typeface="Arial"/>
+              </a:rPr>
+              <a:t>Co-PI </a:t>
+            </a:r>
+            <a:r>
+              <a:rPr lang="en-US" sz="1100" b="1" dirty="0" smtClean="0">
+                <a:solidFill>
+                  <a:srgbClr val="000000"/>
+                </a:solidFill>
+                <a:effectLst/>
+                <a:latin typeface="Arial"/>
+                <a:cs typeface="Arial"/>
+              </a:rPr>
+              <a:t>Kalisz</a:t>
+            </a:r>
+            <a:r>
+              <a:rPr lang="en-US" sz="1100" dirty="0" smtClean="0">
+                <a:solidFill>
+                  <a:srgbClr val="000000"/>
+                </a:solidFill>
+                <a:effectLst/>
+                <a:latin typeface="Arial"/>
+                <a:cs typeface="Arial"/>
+              </a:rPr>
+              <a:t>: Mentoring, coordination with other administrators</a:t>
+            </a:r>
+            <a:endParaRPr lang="en-US" sz="1100" dirty="0">
+              <a:solidFill>
+                <a:srgbClr val="000000"/>
+              </a:solidFill>
+              <a:effectLst/>
+              <a:latin typeface="Arial"/>
+              <a:cs typeface="Arial"/>
+            </a:endParaRPr>
+          </a:p>
+        </p:txBody>
+      </p:sp>
+      <p:sp>
+        <p:nvSpPr>
+          <p:cNvPr id="52" name="Process 51"/>
+          <p:cNvSpPr/>
+          <p:nvPr/>
+        </p:nvSpPr>
+        <p:spPr>
+          <a:xfrm>
+            <a:off x="4868664" y="1410918"/>
+            <a:ext cx="1426259" cy="920727"/>
+          </a:xfrm>
+          <a:prstGeom prst="flowChartProcess">
+            <a:avLst/>
+          </a:prstGeom>
+          <a:solidFill>
+            <a:schemeClr val="bg1"/>
+          </a:solidFill>
+          <a:ln>
+            <a:solidFill>
+              <a:schemeClr val="tx1"/>
+            </a:solidFill>
+          </a:ln>
+          <a:effectLst/>
+        </p:spPr>
+        <p:style>
+          <a:lnRef idx="1">
+            <a:schemeClr val="accent1"/>
+          </a:lnRef>
+          <a:fillRef idx="3">
+            <a:schemeClr val="accent1"/>
+          </a:fillRef>
+          <a:effectRef idx="2">
+            <a:schemeClr val="accent1"/>
+          </a:effectRef>
+          <a:fontRef idx="minor">
+            <a:schemeClr val="lt1"/>
+          </a:fontRef>
+        </p:style>
+        <p:txBody>
+          <a:bodyPr rtlCol="0" anchor="ctr"/>
+          <a:lstStyle/>
+          <a:p>
+            <a:r>
+              <a:rPr lang="en-US" sz="1100" b="1" dirty="0" smtClean="0">
+                <a:solidFill>
+                  <a:srgbClr val="000000"/>
+                </a:solidFill>
+                <a:effectLst/>
+                <a:latin typeface="Arial"/>
+                <a:cs typeface="Arial"/>
+              </a:rPr>
+              <a:t>Project Coordinator</a:t>
+            </a:r>
+            <a:r>
+              <a:rPr lang="en-US" sz="1100" dirty="0" smtClean="0">
+                <a:solidFill>
+                  <a:srgbClr val="000000"/>
+                </a:solidFill>
+                <a:effectLst/>
+                <a:latin typeface="Arial"/>
+                <a:cs typeface="Arial"/>
+              </a:rPr>
+              <a:t>: Matching students to internships, tracking progress</a:t>
+            </a:r>
+            <a:endParaRPr lang="en-US" sz="1100" dirty="0">
+              <a:solidFill>
+                <a:srgbClr val="000000"/>
+              </a:solidFill>
+              <a:effectLst/>
+              <a:latin typeface="Arial"/>
+              <a:cs typeface="Arial"/>
+            </a:endParaRPr>
+          </a:p>
+        </p:txBody>
+      </p:sp>
+      <p:sp>
+        <p:nvSpPr>
+          <p:cNvPr id="53" name="Rectangle 52"/>
+          <p:cNvSpPr/>
+          <p:nvPr/>
+        </p:nvSpPr>
+        <p:spPr>
+          <a:xfrm>
+            <a:off x="4284908" y="22537"/>
+            <a:ext cx="2593771" cy="400110"/>
+          </a:xfrm>
+          <a:prstGeom prst="rect">
+            <a:avLst/>
+          </a:prstGeom>
+        </p:spPr>
+        <p:txBody>
+          <a:bodyPr wrap="square">
+            <a:spAutoFit/>
+          </a:bodyPr>
+          <a:lstStyle/>
+          <a:p>
+            <a:pPr algn="ctr"/>
+            <a:r>
+              <a:rPr lang="en-US" sz="2000" dirty="0" smtClean="0">
+                <a:solidFill>
+                  <a:srgbClr val="000000"/>
+                </a:solidFill>
+                <a:latin typeface="Arial"/>
+                <a:cs typeface="Arial"/>
+              </a:rPr>
+              <a:t>Leadership team</a:t>
+            </a:r>
+            <a:endParaRPr lang="en-US" sz="2000" dirty="0">
+              <a:solidFill>
+                <a:srgbClr val="000000"/>
+              </a:solidFill>
+              <a:latin typeface="Arial"/>
+              <a:cs typeface="Arial"/>
+            </a:endParaRPr>
+          </a:p>
+        </p:txBody>
+      </p:sp>
+      <p:grpSp>
+        <p:nvGrpSpPr>
+          <p:cNvPr id="68" name="Group 67"/>
+          <p:cNvGrpSpPr/>
+          <p:nvPr/>
+        </p:nvGrpSpPr>
+        <p:grpSpPr>
+          <a:xfrm>
+            <a:off x="223236" y="3273452"/>
+            <a:ext cx="3813807" cy="2484196"/>
+            <a:chOff x="1279588" y="5774643"/>
+            <a:chExt cx="3813807" cy="2484196"/>
+          </a:xfrm>
+        </p:grpSpPr>
+        <p:sp>
+          <p:nvSpPr>
+            <p:cNvPr id="54" name="Alternate Process 53"/>
+            <p:cNvSpPr/>
+            <p:nvPr/>
+          </p:nvSpPr>
+          <p:spPr>
+            <a:xfrm>
+              <a:off x="1279588" y="5774643"/>
+              <a:ext cx="3813807" cy="2484196"/>
+            </a:xfrm>
+            <a:prstGeom prst="flowChartAlternateProcess">
+              <a:avLst/>
+            </a:prstGeom>
+            <a:solidFill>
+              <a:schemeClr val="accent6">
+                <a:lumMod val="60000"/>
+                <a:lumOff val="40000"/>
+              </a:schemeClr>
+            </a:solidFill>
+            <a:ln>
+              <a:solidFill>
+                <a:schemeClr val="tx1"/>
+              </a:solidFill>
+            </a:ln>
+          </p:spPr>
+          <p:style>
+            <a:lnRef idx="1">
+              <a:schemeClr val="accent1"/>
+            </a:lnRef>
+            <a:fillRef idx="3">
+              <a:schemeClr val="accent1"/>
+            </a:fillRef>
+            <a:effectRef idx="2">
+              <a:schemeClr val="accent1"/>
+            </a:effectRef>
+            <a:fontRef idx="minor">
+              <a:schemeClr val="lt1"/>
+            </a:fontRef>
+          </p:style>
+          <p:txBody>
+            <a:bodyPr rtlCol="0" anchor="ctr"/>
+            <a:lstStyle/>
+            <a:p>
+              <a:pPr algn="ctr"/>
+              <a:endParaRPr lang="en-US" sz="1300" dirty="0"/>
+            </a:p>
+          </p:txBody>
+        </p:sp>
+        <p:sp>
+          <p:nvSpPr>
+            <p:cNvPr id="55" name="Rectangle 54"/>
+            <p:cNvSpPr/>
+            <p:nvPr/>
+          </p:nvSpPr>
+          <p:spPr>
+            <a:xfrm>
+              <a:off x="2562505" y="5801261"/>
+              <a:ext cx="1197063" cy="400110"/>
+            </a:xfrm>
+            <a:prstGeom prst="rect">
+              <a:avLst/>
+            </a:prstGeom>
+          </p:spPr>
+          <p:txBody>
+            <a:bodyPr wrap="none">
+              <a:spAutoFit/>
+            </a:bodyPr>
+            <a:lstStyle/>
+            <a:p>
+              <a:pPr algn="ctr"/>
+              <a:r>
+                <a:rPr lang="en-US" sz="2000" dirty="0" smtClean="0">
+                  <a:solidFill>
+                    <a:srgbClr val="000000"/>
+                  </a:solidFill>
+                  <a:latin typeface="Arial"/>
+                  <a:cs typeface="Arial"/>
+                </a:rPr>
+                <a:t>Students</a:t>
+              </a:r>
+              <a:endParaRPr lang="en-US" sz="2000" dirty="0">
+                <a:solidFill>
+                  <a:srgbClr val="000000"/>
+                </a:solidFill>
+                <a:latin typeface="Arial"/>
+                <a:cs typeface="Arial"/>
+              </a:endParaRPr>
+            </a:p>
+          </p:txBody>
+        </p:sp>
+        <p:sp>
+          <p:nvSpPr>
+            <p:cNvPr id="56" name="Process 55"/>
+            <p:cNvSpPr/>
+            <p:nvPr/>
+          </p:nvSpPr>
+          <p:spPr>
+            <a:xfrm>
+              <a:off x="1508703" y="6197881"/>
+              <a:ext cx="1646152" cy="771166"/>
+            </a:xfrm>
+            <a:prstGeom prst="flowChartProcess">
+              <a:avLst/>
+            </a:prstGeom>
+            <a:solidFill>
+              <a:schemeClr val="bg1"/>
+            </a:solidFill>
+            <a:ln>
+              <a:solidFill>
+                <a:schemeClr val="tx1"/>
+              </a:solidFill>
+            </a:ln>
+            <a:effectLst/>
+          </p:spPr>
+          <p:style>
+            <a:lnRef idx="1">
+              <a:schemeClr val="accent1"/>
+            </a:lnRef>
+            <a:fillRef idx="3">
+              <a:schemeClr val="accent1"/>
+            </a:fillRef>
+            <a:effectRef idx="2">
+              <a:schemeClr val="accent1"/>
+            </a:effectRef>
+            <a:fontRef idx="minor">
+              <a:schemeClr val="lt1"/>
+            </a:fontRef>
+          </p:style>
+          <p:txBody>
+            <a:bodyPr rtlCol="0" anchor="ctr"/>
+            <a:lstStyle/>
+            <a:p>
+              <a:r>
+                <a:rPr lang="en-US" sz="1100" b="1" dirty="0" smtClean="0">
+                  <a:solidFill>
+                    <a:srgbClr val="000000"/>
+                  </a:solidFill>
+                  <a:effectLst/>
+                  <a:latin typeface="Arial"/>
+                  <a:cs typeface="Arial"/>
+                </a:rPr>
+                <a:t>Funded students</a:t>
+              </a:r>
+              <a:r>
+                <a:rPr lang="en-US" sz="1100" dirty="0" smtClean="0">
+                  <a:solidFill>
+                    <a:srgbClr val="000000"/>
+                  </a:solidFill>
+                  <a:effectLst/>
+                  <a:latin typeface="Arial"/>
+                  <a:cs typeface="Arial"/>
+                </a:rPr>
+                <a:t>: Masters &amp; PhD, 2 </a:t>
+              </a:r>
+              <a:r>
+                <a:rPr lang="en-US" sz="1100" dirty="0" err="1" smtClean="0">
+                  <a:solidFill>
+                    <a:srgbClr val="000000"/>
+                  </a:solidFill>
+                  <a:effectLst/>
+                  <a:latin typeface="Arial"/>
+                  <a:cs typeface="Arial"/>
+                </a:rPr>
+                <a:t>yr</a:t>
+              </a:r>
+              <a:r>
+                <a:rPr lang="en-US" sz="1100" dirty="0" smtClean="0">
+                  <a:solidFill>
+                    <a:srgbClr val="000000"/>
+                  </a:solidFill>
+                  <a:effectLst/>
+                  <a:latin typeface="Arial"/>
+                  <a:cs typeface="Arial"/>
+                </a:rPr>
+                <a:t> funding, continuous mentoring.</a:t>
+              </a:r>
+              <a:endParaRPr lang="en-US" sz="1100" dirty="0">
+                <a:solidFill>
+                  <a:srgbClr val="000000"/>
+                </a:solidFill>
+                <a:effectLst/>
+                <a:latin typeface="Arial"/>
+                <a:cs typeface="Arial"/>
+              </a:endParaRPr>
+            </a:p>
+          </p:txBody>
+        </p:sp>
+        <p:sp>
+          <p:nvSpPr>
+            <p:cNvPr id="57" name="Process 56"/>
+            <p:cNvSpPr/>
+            <p:nvPr/>
+          </p:nvSpPr>
+          <p:spPr>
+            <a:xfrm>
+              <a:off x="1508703" y="7121448"/>
+              <a:ext cx="1646152" cy="771166"/>
+            </a:xfrm>
+            <a:prstGeom prst="flowChartProcess">
+              <a:avLst/>
+            </a:prstGeom>
+            <a:solidFill>
+              <a:schemeClr val="bg1"/>
+            </a:solidFill>
+            <a:ln>
+              <a:solidFill>
+                <a:schemeClr val="tx1"/>
+              </a:solidFill>
+            </a:ln>
+            <a:effectLst/>
+          </p:spPr>
+          <p:style>
+            <a:lnRef idx="1">
+              <a:schemeClr val="accent1"/>
+            </a:lnRef>
+            <a:fillRef idx="3">
+              <a:schemeClr val="accent1"/>
+            </a:fillRef>
+            <a:effectRef idx="2">
+              <a:schemeClr val="accent1"/>
+            </a:effectRef>
+            <a:fontRef idx="minor">
+              <a:schemeClr val="lt1"/>
+            </a:fontRef>
+          </p:style>
+          <p:txBody>
+            <a:bodyPr rtlCol="0" anchor="ctr"/>
+            <a:lstStyle/>
+            <a:p>
+              <a:r>
+                <a:rPr lang="en-US" sz="1100" b="1" dirty="0" smtClean="0">
+                  <a:solidFill>
+                    <a:srgbClr val="000000"/>
+                  </a:solidFill>
+                  <a:effectLst/>
+                  <a:latin typeface="Arial"/>
+                  <a:cs typeface="Arial"/>
+                </a:rPr>
+                <a:t>Affiliate students</a:t>
+              </a:r>
+              <a:r>
+                <a:rPr lang="en-US" sz="1100" dirty="0" smtClean="0">
+                  <a:solidFill>
+                    <a:srgbClr val="000000"/>
+                  </a:solidFill>
+                  <a:effectLst/>
+                  <a:latin typeface="Arial"/>
+                  <a:cs typeface="Arial"/>
+                </a:rPr>
+                <a:t>: Other degree seeking students participating in program activities</a:t>
+              </a:r>
+              <a:endParaRPr lang="en-US" sz="1100" dirty="0">
+                <a:solidFill>
+                  <a:srgbClr val="000000"/>
+                </a:solidFill>
+                <a:effectLst/>
+                <a:latin typeface="Arial"/>
+                <a:cs typeface="Arial"/>
+              </a:endParaRPr>
+            </a:p>
+          </p:txBody>
+        </p:sp>
+        <p:sp>
+          <p:nvSpPr>
+            <p:cNvPr id="58" name="Process 57"/>
+            <p:cNvSpPr/>
+            <p:nvPr/>
+          </p:nvSpPr>
+          <p:spPr>
+            <a:xfrm>
+              <a:off x="3271879" y="6211922"/>
+              <a:ext cx="1596787" cy="1680692"/>
+            </a:xfrm>
+            <a:prstGeom prst="flowChartProcess">
+              <a:avLst/>
+            </a:prstGeom>
+            <a:solidFill>
+              <a:schemeClr val="bg1"/>
+            </a:solidFill>
+            <a:ln>
+              <a:solidFill>
+                <a:schemeClr val="tx1"/>
+              </a:solidFill>
+            </a:ln>
+            <a:effectLst/>
+          </p:spPr>
+          <p:style>
+            <a:lnRef idx="1">
+              <a:schemeClr val="accent1"/>
+            </a:lnRef>
+            <a:fillRef idx="3">
+              <a:schemeClr val="accent1"/>
+            </a:fillRef>
+            <a:effectRef idx="2">
+              <a:schemeClr val="accent1"/>
+            </a:effectRef>
+            <a:fontRef idx="minor">
+              <a:schemeClr val="lt1"/>
+            </a:fontRef>
+          </p:style>
+          <p:txBody>
+            <a:bodyPr rtlCol="0" anchor="ctr"/>
+            <a:lstStyle/>
+            <a:p>
+              <a:r>
+                <a:rPr lang="en-US" sz="1100" b="1" dirty="0" smtClean="0">
+                  <a:solidFill>
+                    <a:srgbClr val="000000"/>
+                  </a:solidFill>
+                  <a:latin typeface="Arial"/>
+                  <a:cs typeface="Arial"/>
+                </a:rPr>
+                <a:t>External participants</a:t>
+              </a:r>
+              <a:r>
+                <a:rPr lang="en-US" sz="1100" dirty="0" smtClean="0">
+                  <a:solidFill>
+                    <a:srgbClr val="000000"/>
+                  </a:solidFill>
+                  <a:effectLst/>
+                  <a:latin typeface="Arial"/>
+                  <a:cs typeface="Arial"/>
+                </a:rPr>
+                <a:t>: Other participants in activities, either remotely or through field courses or workshops. </a:t>
+              </a:r>
+              <a:endParaRPr lang="en-US" sz="1100" dirty="0">
+                <a:solidFill>
+                  <a:srgbClr val="000000"/>
+                </a:solidFill>
+                <a:effectLst/>
+                <a:latin typeface="Arial"/>
+                <a:cs typeface="Arial"/>
+              </a:endParaRPr>
+            </a:p>
+          </p:txBody>
+        </p:sp>
+      </p:grpSp>
+      <p:sp>
+        <p:nvSpPr>
+          <p:cNvPr id="59" name="Alternate Process 58"/>
+          <p:cNvSpPr/>
+          <p:nvPr/>
+        </p:nvSpPr>
+        <p:spPr>
+          <a:xfrm>
+            <a:off x="71820" y="22537"/>
+            <a:ext cx="2667000" cy="2484196"/>
+          </a:xfrm>
+          <a:prstGeom prst="flowChartAlternateProcess">
+            <a:avLst/>
+          </a:prstGeom>
+          <a:solidFill>
+            <a:schemeClr val="bg1">
+              <a:lumMod val="85000"/>
+            </a:schemeClr>
+          </a:solidFill>
+          <a:ln>
+            <a:solidFill>
+              <a:schemeClr val="tx1"/>
+            </a:solidFill>
+          </a:ln>
+        </p:spPr>
+        <p:style>
+          <a:lnRef idx="1">
+            <a:schemeClr val="accent1"/>
+          </a:lnRef>
+          <a:fillRef idx="3">
+            <a:schemeClr val="accent1"/>
+          </a:fillRef>
+          <a:effectRef idx="2">
+            <a:schemeClr val="accent1"/>
+          </a:effectRef>
+          <a:fontRef idx="minor">
+            <a:schemeClr val="lt1"/>
+          </a:fontRef>
+        </p:style>
+        <p:txBody>
+          <a:bodyPr rtlCol="0" anchor="ctr"/>
+          <a:lstStyle/>
+          <a:p>
+            <a:pPr algn="ctr"/>
+            <a:endParaRPr lang="en-US" sz="1300" dirty="0"/>
+          </a:p>
+        </p:txBody>
+      </p:sp>
+      <p:sp>
+        <p:nvSpPr>
+          <p:cNvPr id="60" name="Rectangle 59"/>
+          <p:cNvSpPr/>
+          <p:nvPr/>
+        </p:nvSpPr>
+        <p:spPr>
+          <a:xfrm>
+            <a:off x="764420" y="0"/>
+            <a:ext cx="1111152" cy="400110"/>
+          </a:xfrm>
+          <a:prstGeom prst="rect">
+            <a:avLst/>
+          </a:prstGeom>
+        </p:spPr>
+        <p:txBody>
+          <a:bodyPr wrap="none">
+            <a:spAutoFit/>
+          </a:bodyPr>
+          <a:lstStyle/>
+          <a:p>
+            <a:pPr algn="ctr"/>
+            <a:r>
+              <a:rPr lang="en-US" sz="2000" dirty="0" smtClean="0">
+                <a:solidFill>
+                  <a:srgbClr val="000000"/>
+                </a:solidFill>
+                <a:latin typeface="Arial"/>
+                <a:cs typeface="Arial"/>
+              </a:rPr>
+              <a:t>Mentors</a:t>
+            </a:r>
+            <a:endParaRPr lang="en-US" sz="2000" dirty="0">
+              <a:solidFill>
+                <a:srgbClr val="000000"/>
+              </a:solidFill>
+              <a:latin typeface="Arial"/>
+              <a:cs typeface="Arial"/>
+            </a:endParaRPr>
+          </a:p>
+        </p:txBody>
+      </p:sp>
+      <p:sp>
+        <p:nvSpPr>
+          <p:cNvPr id="61" name="Process 60"/>
+          <p:cNvSpPr/>
+          <p:nvPr/>
+        </p:nvSpPr>
+        <p:spPr>
+          <a:xfrm>
+            <a:off x="223236" y="366459"/>
+            <a:ext cx="2372993" cy="700341"/>
+          </a:xfrm>
+          <a:prstGeom prst="flowChartProcess">
+            <a:avLst/>
+          </a:prstGeom>
+          <a:solidFill>
+            <a:schemeClr val="bg1"/>
+          </a:solidFill>
+          <a:ln>
+            <a:solidFill>
+              <a:schemeClr val="tx1"/>
+            </a:solidFill>
+          </a:ln>
+          <a:effectLst/>
+        </p:spPr>
+        <p:style>
+          <a:lnRef idx="1">
+            <a:schemeClr val="accent1"/>
+          </a:lnRef>
+          <a:fillRef idx="3">
+            <a:schemeClr val="accent1"/>
+          </a:fillRef>
+          <a:effectRef idx="2">
+            <a:schemeClr val="accent1"/>
+          </a:effectRef>
+          <a:fontRef idx="minor">
+            <a:schemeClr val="lt1"/>
+          </a:fontRef>
+        </p:style>
+        <p:txBody>
+          <a:bodyPr rtlCol="0" anchor="ctr"/>
+          <a:lstStyle/>
+          <a:p>
+            <a:r>
+              <a:rPr lang="en-US" sz="1100" b="1" dirty="0" smtClean="0">
+                <a:solidFill>
+                  <a:srgbClr val="000000"/>
+                </a:solidFill>
+                <a:effectLst/>
+                <a:latin typeface="Arial"/>
+                <a:cs typeface="Arial"/>
+              </a:rPr>
+              <a:t>Internship mentors</a:t>
+            </a:r>
+            <a:r>
+              <a:rPr lang="en-US" sz="1100" dirty="0" smtClean="0">
+                <a:solidFill>
+                  <a:srgbClr val="000000"/>
+                </a:solidFill>
+                <a:effectLst/>
+                <a:latin typeface="Arial"/>
+                <a:cs typeface="Arial"/>
+              </a:rPr>
+              <a:t>: Mentors at NGOs, government organizations, and companies</a:t>
+            </a:r>
+            <a:endParaRPr lang="en-US" sz="1100" dirty="0">
+              <a:solidFill>
+                <a:srgbClr val="000000"/>
+              </a:solidFill>
+              <a:effectLst/>
+              <a:latin typeface="Arial"/>
+              <a:cs typeface="Arial"/>
+            </a:endParaRPr>
+          </a:p>
+        </p:txBody>
+      </p:sp>
+      <p:sp>
+        <p:nvSpPr>
+          <p:cNvPr id="62" name="Process 61"/>
+          <p:cNvSpPr/>
+          <p:nvPr/>
+        </p:nvSpPr>
+        <p:spPr>
+          <a:xfrm>
+            <a:off x="223236" y="1219200"/>
+            <a:ext cx="2372993" cy="1091694"/>
+          </a:xfrm>
+          <a:prstGeom prst="flowChartProcess">
+            <a:avLst/>
+          </a:prstGeom>
+          <a:solidFill>
+            <a:schemeClr val="bg1"/>
+          </a:solidFill>
+          <a:ln>
+            <a:solidFill>
+              <a:schemeClr val="tx1"/>
+            </a:solidFill>
+          </a:ln>
+          <a:effectLst/>
+        </p:spPr>
+        <p:style>
+          <a:lnRef idx="1">
+            <a:schemeClr val="accent1"/>
+          </a:lnRef>
+          <a:fillRef idx="3">
+            <a:schemeClr val="accent1"/>
+          </a:fillRef>
+          <a:effectRef idx="2">
+            <a:schemeClr val="accent1"/>
+          </a:effectRef>
+          <a:fontRef idx="minor">
+            <a:schemeClr val="lt1"/>
+          </a:fontRef>
+        </p:style>
+        <p:txBody>
+          <a:bodyPr rtlCol="0" anchor="ctr"/>
+          <a:lstStyle/>
+          <a:p>
+            <a:r>
+              <a:rPr lang="en-US" sz="1100" b="1" dirty="0" smtClean="0">
+                <a:solidFill>
+                  <a:srgbClr val="000000"/>
+                </a:solidFill>
+                <a:effectLst/>
+                <a:latin typeface="Arial"/>
+                <a:cs typeface="Arial"/>
+              </a:rPr>
+              <a:t>Affiliate faculty</a:t>
+            </a:r>
+            <a:r>
+              <a:rPr lang="en-US" sz="1100" dirty="0" smtClean="0">
+                <a:solidFill>
+                  <a:srgbClr val="000000"/>
+                </a:solidFill>
+                <a:latin typeface="Arial"/>
+                <a:cs typeface="Arial"/>
+              </a:rPr>
+              <a:t>: Other faculty seeking to accept students into this program. They will be required to go through cross-mentoring training before being considered for students.</a:t>
+            </a:r>
+            <a:endParaRPr lang="en-US" sz="1100" dirty="0">
+              <a:solidFill>
+                <a:srgbClr val="000000"/>
+              </a:solidFill>
+              <a:effectLst/>
+              <a:latin typeface="Arial"/>
+              <a:cs typeface="Arial"/>
+            </a:endParaRPr>
+          </a:p>
+        </p:txBody>
+      </p:sp>
+      <p:sp>
+        <p:nvSpPr>
+          <p:cNvPr id="64" name="Alternate Process 63"/>
+          <p:cNvSpPr/>
+          <p:nvPr/>
+        </p:nvSpPr>
+        <p:spPr>
+          <a:xfrm>
+            <a:off x="8330550" y="28886"/>
+            <a:ext cx="2346321" cy="2484196"/>
+          </a:xfrm>
+          <a:prstGeom prst="flowChartAlternateProcess">
+            <a:avLst/>
+          </a:prstGeom>
+          <a:solidFill>
+            <a:schemeClr val="bg1">
+              <a:lumMod val="85000"/>
+            </a:schemeClr>
+          </a:solidFill>
+          <a:ln>
+            <a:solidFill>
+              <a:schemeClr val="tx1"/>
+            </a:solidFill>
+          </a:ln>
+        </p:spPr>
+        <p:style>
+          <a:lnRef idx="1">
+            <a:schemeClr val="accent1"/>
+          </a:lnRef>
+          <a:fillRef idx="3">
+            <a:schemeClr val="accent1"/>
+          </a:fillRef>
+          <a:effectRef idx="2">
+            <a:schemeClr val="accent1"/>
+          </a:effectRef>
+          <a:fontRef idx="minor">
+            <a:schemeClr val="lt1"/>
+          </a:fontRef>
+        </p:style>
+        <p:txBody>
+          <a:bodyPr rtlCol="0" anchor="ctr"/>
+          <a:lstStyle/>
+          <a:p>
+            <a:pPr algn="ctr"/>
+            <a:endParaRPr lang="en-US" sz="1300" dirty="0"/>
+          </a:p>
+        </p:txBody>
+      </p:sp>
+      <p:sp>
+        <p:nvSpPr>
+          <p:cNvPr id="65" name="Rectangle 64"/>
+          <p:cNvSpPr/>
+          <p:nvPr/>
+        </p:nvSpPr>
+        <p:spPr>
+          <a:xfrm>
+            <a:off x="8795482" y="6349"/>
+            <a:ext cx="1313973" cy="400110"/>
+          </a:xfrm>
+          <a:prstGeom prst="rect">
+            <a:avLst/>
+          </a:prstGeom>
+        </p:spPr>
+        <p:txBody>
+          <a:bodyPr wrap="square">
+            <a:spAutoFit/>
+          </a:bodyPr>
+          <a:lstStyle/>
+          <a:p>
+            <a:pPr algn="ctr"/>
+            <a:r>
+              <a:rPr lang="en-US" sz="2000" dirty="0" smtClean="0">
+                <a:solidFill>
+                  <a:srgbClr val="000000"/>
+                </a:solidFill>
+                <a:latin typeface="Arial"/>
+                <a:cs typeface="Arial"/>
+              </a:rPr>
+              <a:t>External</a:t>
+            </a:r>
+            <a:endParaRPr lang="en-US" sz="2000" dirty="0">
+              <a:solidFill>
+                <a:srgbClr val="000000"/>
+              </a:solidFill>
+              <a:latin typeface="Arial"/>
+              <a:cs typeface="Arial"/>
+            </a:endParaRPr>
+          </a:p>
+        </p:txBody>
+      </p:sp>
+      <p:sp>
+        <p:nvSpPr>
+          <p:cNvPr id="66" name="Process 65"/>
+          <p:cNvSpPr/>
+          <p:nvPr/>
+        </p:nvSpPr>
+        <p:spPr>
+          <a:xfrm>
+            <a:off x="8449918" y="372808"/>
+            <a:ext cx="2085848" cy="733460"/>
+          </a:xfrm>
+          <a:prstGeom prst="flowChartProcess">
+            <a:avLst/>
+          </a:prstGeom>
+          <a:solidFill>
+            <a:schemeClr val="bg1"/>
+          </a:solidFill>
+          <a:ln>
+            <a:solidFill>
+              <a:schemeClr val="tx1"/>
+            </a:solidFill>
+          </a:ln>
+          <a:effectLst/>
+        </p:spPr>
+        <p:style>
+          <a:lnRef idx="1">
+            <a:schemeClr val="accent1"/>
+          </a:lnRef>
+          <a:fillRef idx="3">
+            <a:schemeClr val="accent1"/>
+          </a:fillRef>
+          <a:effectRef idx="2">
+            <a:schemeClr val="accent1"/>
+          </a:effectRef>
+          <a:fontRef idx="minor">
+            <a:schemeClr val="lt1"/>
+          </a:fontRef>
+        </p:style>
+        <p:txBody>
+          <a:bodyPr rtlCol="0" anchor="ctr"/>
+          <a:lstStyle/>
+          <a:p>
+            <a:r>
+              <a:rPr lang="en-US" sz="1100" b="1" dirty="0" smtClean="0">
+                <a:solidFill>
+                  <a:srgbClr val="000000"/>
+                </a:solidFill>
+                <a:effectLst/>
+                <a:latin typeface="Arial"/>
+                <a:cs typeface="Arial"/>
+              </a:rPr>
+              <a:t>Advisory board</a:t>
+            </a:r>
+            <a:r>
+              <a:rPr lang="en-US" sz="1100" b="1" dirty="0">
+                <a:solidFill>
+                  <a:srgbClr val="000000"/>
+                </a:solidFill>
+                <a:latin typeface="Arial"/>
+                <a:cs typeface="Arial"/>
+              </a:rPr>
+              <a:t>: </a:t>
+            </a:r>
+            <a:r>
+              <a:rPr lang="en-US" sz="1100" dirty="0">
+                <a:solidFill>
+                  <a:srgbClr val="000000"/>
+                </a:solidFill>
+                <a:latin typeface="Arial"/>
+                <a:cs typeface="Arial"/>
+              </a:rPr>
+              <a:t>provide significant guidance and an outside perspective on the progress of the training. </a:t>
+            </a:r>
+            <a:endParaRPr lang="en-US" sz="1100" dirty="0">
+              <a:solidFill>
+                <a:srgbClr val="000000"/>
+              </a:solidFill>
+              <a:effectLst/>
+              <a:latin typeface="Arial"/>
+              <a:cs typeface="Arial"/>
+            </a:endParaRPr>
+          </a:p>
+        </p:txBody>
+      </p:sp>
+      <p:sp>
+        <p:nvSpPr>
+          <p:cNvPr id="67" name="Process 66"/>
+          <p:cNvSpPr/>
+          <p:nvPr/>
+        </p:nvSpPr>
+        <p:spPr>
+          <a:xfrm>
+            <a:off x="8449918" y="1259716"/>
+            <a:ext cx="2085848" cy="1019822"/>
+          </a:xfrm>
+          <a:prstGeom prst="flowChartProcess">
+            <a:avLst/>
+          </a:prstGeom>
+          <a:solidFill>
+            <a:schemeClr val="bg1"/>
+          </a:solidFill>
+          <a:ln>
+            <a:solidFill>
+              <a:schemeClr val="tx1"/>
+            </a:solidFill>
+          </a:ln>
+          <a:effectLst/>
+        </p:spPr>
+        <p:style>
+          <a:lnRef idx="1">
+            <a:schemeClr val="accent1"/>
+          </a:lnRef>
+          <a:fillRef idx="3">
+            <a:schemeClr val="accent1"/>
+          </a:fillRef>
+          <a:effectRef idx="2">
+            <a:schemeClr val="accent1"/>
+          </a:effectRef>
+          <a:fontRef idx="minor">
+            <a:schemeClr val="lt1"/>
+          </a:fontRef>
+        </p:style>
+        <p:txBody>
+          <a:bodyPr rtlCol="0" anchor="ctr"/>
+          <a:lstStyle/>
+          <a:p>
+            <a:r>
+              <a:rPr lang="en-US" sz="1100" b="1" dirty="0" smtClean="0">
+                <a:solidFill>
+                  <a:srgbClr val="000000"/>
+                </a:solidFill>
+                <a:effectLst/>
+                <a:latin typeface="Arial"/>
+                <a:cs typeface="Arial"/>
+              </a:rPr>
+              <a:t>Administration</a:t>
+            </a:r>
+            <a:r>
+              <a:rPr lang="en-US" sz="1100" dirty="0" smtClean="0">
+                <a:solidFill>
+                  <a:srgbClr val="000000"/>
+                </a:solidFill>
+                <a:latin typeface="Arial"/>
+                <a:cs typeface="Arial"/>
+              </a:rPr>
+              <a:t>: Administrators at UTK and UTIA who will engage with leadership team annually to review needs.</a:t>
+            </a:r>
+            <a:endParaRPr lang="en-US" sz="1100" dirty="0">
+              <a:solidFill>
+                <a:srgbClr val="000000"/>
+              </a:solidFill>
+              <a:effectLst/>
+              <a:latin typeface="Arial"/>
+              <a:cs typeface="Arial"/>
+            </a:endParaRPr>
+          </a:p>
+        </p:txBody>
+      </p:sp>
+      <p:cxnSp>
+        <p:nvCxnSpPr>
+          <p:cNvPr id="75" name="Curved Connector 74"/>
+          <p:cNvCxnSpPr>
+            <a:stCxn id="59" idx="2"/>
+            <a:endCxn id="55" idx="0"/>
+          </p:cNvCxnSpPr>
+          <p:nvPr/>
+        </p:nvCxnSpPr>
+        <p:spPr>
+          <a:xfrm rot="16200000" flipH="1">
+            <a:off x="1358334" y="2553718"/>
+            <a:ext cx="793337" cy="699365"/>
+          </a:xfrm>
+          <a:prstGeom prst="curvedConnector3">
+            <a:avLst>
+              <a:gd name="adj1" fmla="val 50000"/>
+            </a:avLst>
+          </a:prstGeom>
+          <a:ln>
+            <a:solidFill>
+              <a:srgbClr val="000000"/>
+            </a:solidFill>
+          </a:ln>
+          <a:effectLst>
+            <a:outerShdw blurRad="50800" dist="38100" dir="2700000" algn="tl" rotWithShape="0">
+              <a:prstClr val="black">
+                <a:alpha val="40000"/>
+              </a:prstClr>
+            </a:outerShdw>
+          </a:effectLst>
+        </p:spPr>
+        <p:style>
+          <a:lnRef idx="2">
+            <a:schemeClr val="accent1"/>
+          </a:lnRef>
+          <a:fillRef idx="0">
+            <a:schemeClr val="accent1"/>
+          </a:fillRef>
+          <a:effectRef idx="1">
+            <a:schemeClr val="accent1"/>
+          </a:effectRef>
+          <a:fontRef idx="minor">
+            <a:schemeClr val="tx1"/>
+          </a:fontRef>
+        </p:style>
+      </p:cxnSp>
+      <p:sp>
+        <p:nvSpPr>
+          <p:cNvPr id="79" name="Alternate Process 78"/>
+          <p:cNvSpPr/>
+          <p:nvPr/>
+        </p:nvSpPr>
+        <p:spPr>
+          <a:xfrm>
+            <a:off x="6710283" y="3269371"/>
+            <a:ext cx="2357518" cy="1543845"/>
+          </a:xfrm>
+          <a:prstGeom prst="flowChartAlternateProcess">
+            <a:avLst/>
+          </a:prstGeom>
+          <a:solidFill>
+            <a:schemeClr val="bg1">
+              <a:lumMod val="85000"/>
+            </a:schemeClr>
+          </a:solidFill>
+          <a:ln>
+            <a:solidFill>
+              <a:schemeClr val="tx1"/>
+            </a:solidFill>
+          </a:ln>
+        </p:spPr>
+        <p:style>
+          <a:lnRef idx="1">
+            <a:schemeClr val="accent1"/>
+          </a:lnRef>
+          <a:fillRef idx="3">
+            <a:schemeClr val="accent1"/>
+          </a:fillRef>
+          <a:effectRef idx="2">
+            <a:schemeClr val="accent1"/>
+          </a:effectRef>
+          <a:fontRef idx="minor">
+            <a:schemeClr val="lt1"/>
+          </a:fontRef>
+        </p:style>
+        <p:txBody>
+          <a:bodyPr rtlCol="0" anchor="ctr"/>
+          <a:lstStyle/>
+          <a:p>
+            <a:pPr algn="ctr"/>
+            <a:endParaRPr lang="en-US" sz="1300" dirty="0"/>
+          </a:p>
+        </p:txBody>
+      </p:sp>
+      <p:sp>
+        <p:nvSpPr>
+          <p:cNvPr id="80" name="Rectangle 79"/>
+          <p:cNvSpPr/>
+          <p:nvPr/>
+        </p:nvSpPr>
+        <p:spPr>
+          <a:xfrm>
+            <a:off x="6823474" y="3246834"/>
+            <a:ext cx="2085848" cy="400110"/>
+          </a:xfrm>
+          <a:prstGeom prst="rect">
+            <a:avLst/>
+          </a:prstGeom>
+        </p:spPr>
+        <p:txBody>
+          <a:bodyPr wrap="square">
+            <a:spAutoFit/>
+          </a:bodyPr>
+          <a:lstStyle/>
+          <a:p>
+            <a:pPr algn="ctr"/>
+            <a:r>
+              <a:rPr lang="en-US" sz="2000" dirty="0" smtClean="0">
+                <a:solidFill>
+                  <a:srgbClr val="000000"/>
+                </a:solidFill>
+                <a:latin typeface="Arial"/>
+                <a:cs typeface="Arial"/>
+              </a:rPr>
+              <a:t>Assessment</a:t>
+            </a:r>
+            <a:endParaRPr lang="en-US" sz="2000" dirty="0">
+              <a:solidFill>
+                <a:srgbClr val="000000"/>
+              </a:solidFill>
+              <a:latin typeface="Arial"/>
+              <a:cs typeface="Arial"/>
+            </a:endParaRPr>
+          </a:p>
+        </p:txBody>
+      </p:sp>
+      <p:sp>
+        <p:nvSpPr>
+          <p:cNvPr id="81" name="Process 80"/>
+          <p:cNvSpPr/>
+          <p:nvPr/>
+        </p:nvSpPr>
+        <p:spPr>
+          <a:xfrm>
+            <a:off x="6823474" y="3613293"/>
+            <a:ext cx="2085848" cy="1050578"/>
+          </a:xfrm>
+          <a:prstGeom prst="flowChartProcess">
+            <a:avLst/>
+          </a:prstGeom>
+          <a:solidFill>
+            <a:schemeClr val="bg1"/>
+          </a:solidFill>
+          <a:ln>
+            <a:solidFill>
+              <a:schemeClr val="tx1"/>
+            </a:solidFill>
+          </a:ln>
+          <a:effectLst/>
+        </p:spPr>
+        <p:style>
+          <a:lnRef idx="1">
+            <a:schemeClr val="accent1"/>
+          </a:lnRef>
+          <a:fillRef idx="3">
+            <a:schemeClr val="accent1"/>
+          </a:fillRef>
+          <a:effectRef idx="2">
+            <a:schemeClr val="accent1"/>
+          </a:effectRef>
+          <a:fontRef idx="minor">
+            <a:schemeClr val="lt1"/>
+          </a:fontRef>
+        </p:style>
+        <p:txBody>
+          <a:bodyPr rtlCol="0" anchor="ctr"/>
+          <a:lstStyle/>
+          <a:p>
+            <a:r>
+              <a:rPr lang="en-US" sz="1100" b="1" dirty="0" smtClean="0">
+                <a:solidFill>
+                  <a:srgbClr val="000000"/>
+                </a:solidFill>
+                <a:effectLst/>
+                <a:latin typeface="Arial"/>
+                <a:cs typeface="Arial"/>
+              </a:rPr>
+              <a:t>East Main Consulting: </a:t>
+            </a:r>
+            <a:r>
+              <a:rPr lang="en-US" sz="1100" dirty="0" smtClean="0">
+                <a:solidFill>
+                  <a:srgbClr val="000000"/>
+                </a:solidFill>
+                <a:effectLst/>
+                <a:latin typeface="Arial"/>
+                <a:cs typeface="Arial"/>
+              </a:rPr>
+              <a:t>Assessment of delivery on project goals. Reports back to leadership team and peer-reviewed publications.</a:t>
+            </a:r>
+            <a:r>
+              <a:rPr lang="en-US" sz="1100" b="1" dirty="0" smtClean="0">
+                <a:solidFill>
+                  <a:srgbClr val="000000"/>
+                </a:solidFill>
+                <a:effectLst/>
+                <a:latin typeface="Arial"/>
+                <a:cs typeface="Arial"/>
+              </a:rPr>
+              <a:t> </a:t>
+            </a:r>
+            <a:endParaRPr lang="en-US" sz="1100" dirty="0">
+              <a:solidFill>
+                <a:srgbClr val="000000"/>
+              </a:solidFill>
+              <a:effectLst/>
+              <a:latin typeface="Arial"/>
+              <a:cs typeface="Arial"/>
+            </a:endParaRPr>
+          </a:p>
+        </p:txBody>
+      </p:sp>
+      <p:cxnSp>
+        <p:nvCxnSpPr>
+          <p:cNvPr id="86" name="Curved Connector 85"/>
+          <p:cNvCxnSpPr>
+            <a:stCxn id="48" idx="1"/>
+            <a:endCxn id="61" idx="3"/>
+          </p:cNvCxnSpPr>
+          <p:nvPr/>
+        </p:nvCxnSpPr>
+        <p:spPr>
+          <a:xfrm rot="10800000">
+            <a:off x="2596229" y="716630"/>
+            <a:ext cx="675648" cy="35412"/>
+          </a:xfrm>
+          <a:prstGeom prst="curvedConnector3">
+            <a:avLst>
+              <a:gd name="adj1" fmla="val 50000"/>
+            </a:avLst>
+          </a:prstGeom>
+          <a:ln>
+            <a:solidFill>
+              <a:srgbClr val="000000"/>
+            </a:solidFill>
+          </a:ln>
+          <a:effectLst>
+            <a:outerShdw blurRad="50800" dist="38100" dir="2700000" algn="tl" rotWithShape="0">
+              <a:prstClr val="black">
+                <a:alpha val="40000"/>
+              </a:prstClr>
+            </a:outerShdw>
+          </a:effectLst>
+        </p:spPr>
+        <p:style>
+          <a:lnRef idx="2">
+            <a:schemeClr val="accent1"/>
+          </a:lnRef>
+          <a:fillRef idx="0">
+            <a:schemeClr val="accent1"/>
+          </a:fillRef>
+          <a:effectRef idx="1">
+            <a:schemeClr val="accent1"/>
+          </a:effectRef>
+          <a:fontRef idx="minor">
+            <a:schemeClr val="tx1"/>
+          </a:fontRef>
+        </p:style>
+      </p:cxnSp>
+      <p:cxnSp>
+        <p:nvCxnSpPr>
+          <p:cNvPr id="89" name="Curved Connector 88"/>
+          <p:cNvCxnSpPr>
+            <a:stCxn id="45" idx="1"/>
+            <a:endCxn id="59" idx="3"/>
+          </p:cNvCxnSpPr>
+          <p:nvPr/>
+        </p:nvCxnSpPr>
+        <p:spPr>
+          <a:xfrm rot="10800000">
+            <a:off x="2738821" y="1264635"/>
+            <a:ext cx="447391" cy="12700"/>
+          </a:xfrm>
+          <a:prstGeom prst="curvedConnector3">
+            <a:avLst>
+              <a:gd name="adj1" fmla="val 50000"/>
+            </a:avLst>
+          </a:prstGeom>
+          <a:ln>
+            <a:solidFill>
+              <a:srgbClr val="000000"/>
+            </a:solidFill>
+          </a:ln>
+          <a:effectLst>
+            <a:outerShdw blurRad="50800" dist="38100" dir="2700000" algn="tl" rotWithShape="0">
+              <a:prstClr val="black">
+                <a:alpha val="40000"/>
+              </a:prstClr>
+            </a:outerShdw>
+          </a:effectLst>
+        </p:spPr>
+        <p:style>
+          <a:lnRef idx="2">
+            <a:schemeClr val="accent1"/>
+          </a:lnRef>
+          <a:fillRef idx="0">
+            <a:schemeClr val="accent1"/>
+          </a:fillRef>
+          <a:effectRef idx="1">
+            <a:schemeClr val="accent1"/>
+          </a:effectRef>
+          <a:fontRef idx="minor">
+            <a:schemeClr val="tx1"/>
+          </a:fontRef>
+        </p:style>
+      </p:cxnSp>
+      <p:cxnSp>
+        <p:nvCxnSpPr>
+          <p:cNvPr id="92" name="Curved Connector 91"/>
+          <p:cNvCxnSpPr>
+            <a:stCxn id="54" idx="3"/>
+            <a:endCxn id="79" idx="1"/>
+          </p:cNvCxnSpPr>
+          <p:nvPr/>
+        </p:nvCxnSpPr>
+        <p:spPr>
+          <a:xfrm flipV="1">
+            <a:off x="4037043" y="4041294"/>
+            <a:ext cx="2673240" cy="474256"/>
+          </a:xfrm>
+          <a:prstGeom prst="curvedConnector3">
+            <a:avLst>
+              <a:gd name="adj1" fmla="val 50000"/>
+            </a:avLst>
+          </a:prstGeom>
+          <a:ln>
+            <a:solidFill>
+              <a:srgbClr val="000000"/>
+            </a:solidFill>
+          </a:ln>
+          <a:effectLst>
+            <a:outerShdw blurRad="50800" dist="38100" dir="2700000" algn="tl" rotWithShape="0">
+              <a:prstClr val="black">
+                <a:alpha val="40000"/>
+              </a:prstClr>
+            </a:outerShdw>
+          </a:effectLst>
+        </p:spPr>
+        <p:style>
+          <a:lnRef idx="2">
+            <a:schemeClr val="accent1"/>
+          </a:lnRef>
+          <a:fillRef idx="0">
+            <a:schemeClr val="accent1"/>
+          </a:fillRef>
+          <a:effectRef idx="1">
+            <a:schemeClr val="accent1"/>
+          </a:effectRef>
+          <a:fontRef idx="minor">
+            <a:schemeClr val="tx1"/>
+          </a:fontRef>
+        </p:style>
+      </p:cxnSp>
+      <p:cxnSp>
+        <p:nvCxnSpPr>
+          <p:cNvPr id="95" name="Curved Connector 94"/>
+          <p:cNvCxnSpPr>
+            <a:stCxn id="79" idx="0"/>
+            <a:endCxn id="45" idx="3"/>
+          </p:cNvCxnSpPr>
+          <p:nvPr/>
+        </p:nvCxnSpPr>
+        <p:spPr>
+          <a:xfrm rot="5400000" flipH="1" flipV="1">
+            <a:off x="6920231" y="2233446"/>
+            <a:ext cx="2004736" cy="67114"/>
+          </a:xfrm>
+          <a:prstGeom prst="curvedConnector4">
+            <a:avLst>
+              <a:gd name="adj1" fmla="val 19021"/>
+              <a:gd name="adj2" fmla="val 440614"/>
+            </a:avLst>
+          </a:prstGeom>
+          <a:ln>
+            <a:solidFill>
+              <a:srgbClr val="000000"/>
+            </a:solidFill>
+          </a:ln>
+          <a:effectLst>
+            <a:outerShdw blurRad="50800" dist="38100" dir="2700000" algn="tl" rotWithShape="0">
+              <a:prstClr val="black">
+                <a:alpha val="40000"/>
+              </a:prstClr>
+            </a:outerShdw>
+          </a:effectLst>
+        </p:spPr>
+        <p:style>
+          <a:lnRef idx="2">
+            <a:schemeClr val="accent1"/>
+          </a:lnRef>
+          <a:fillRef idx="0">
+            <a:schemeClr val="accent1"/>
+          </a:fillRef>
+          <a:effectRef idx="1">
+            <a:schemeClr val="accent1"/>
+          </a:effectRef>
+          <a:fontRef idx="minor">
+            <a:schemeClr val="tx1"/>
+          </a:fontRef>
+        </p:style>
+      </p:cxnSp>
+      <p:cxnSp>
+        <p:nvCxnSpPr>
+          <p:cNvPr id="98" name="Curved Connector 97"/>
+          <p:cNvCxnSpPr>
+            <a:stCxn id="45" idx="2"/>
+            <a:endCxn id="54" idx="0"/>
+          </p:cNvCxnSpPr>
+          <p:nvPr/>
+        </p:nvCxnSpPr>
+        <p:spPr>
+          <a:xfrm rot="5400000">
+            <a:off x="3467303" y="1169570"/>
+            <a:ext cx="766719" cy="3441044"/>
+          </a:xfrm>
+          <a:prstGeom prst="curvedConnector3">
+            <a:avLst>
+              <a:gd name="adj1" fmla="val 50000"/>
+            </a:avLst>
+          </a:prstGeom>
+          <a:ln>
+            <a:solidFill>
+              <a:srgbClr val="000000"/>
+            </a:solidFill>
+          </a:ln>
+          <a:effectLst>
+            <a:outerShdw blurRad="50800" dist="38100" dir="2700000" algn="tl" rotWithShape="0">
+              <a:prstClr val="black">
+                <a:alpha val="40000"/>
+              </a:prstClr>
+            </a:outerShdw>
+          </a:effectLst>
+        </p:spPr>
+        <p:style>
+          <a:lnRef idx="2">
+            <a:schemeClr val="accent1"/>
+          </a:lnRef>
+          <a:fillRef idx="0">
+            <a:schemeClr val="accent1"/>
+          </a:fillRef>
+          <a:effectRef idx="1">
+            <a:schemeClr val="accent1"/>
+          </a:effectRef>
+          <a:fontRef idx="minor">
+            <a:schemeClr val="tx1"/>
+          </a:fontRef>
+        </p:style>
+      </p:cxnSp>
+      <p:sp>
+        <p:nvSpPr>
+          <p:cNvPr id="103" name="Alternate Process 102"/>
+          <p:cNvSpPr/>
+          <p:nvPr/>
+        </p:nvSpPr>
+        <p:spPr>
+          <a:xfrm>
+            <a:off x="4822540" y="5213906"/>
+            <a:ext cx="1524000" cy="1356704"/>
+          </a:xfrm>
+          <a:prstGeom prst="flowChartAlternateProcess">
+            <a:avLst/>
+          </a:prstGeom>
+          <a:solidFill>
+            <a:schemeClr val="bg1">
+              <a:lumMod val="85000"/>
+            </a:schemeClr>
+          </a:solidFill>
+          <a:ln>
+            <a:solidFill>
+              <a:schemeClr val="tx1"/>
+            </a:solidFill>
+          </a:ln>
+        </p:spPr>
+        <p:style>
+          <a:lnRef idx="1">
+            <a:schemeClr val="accent1"/>
+          </a:lnRef>
+          <a:fillRef idx="3">
+            <a:schemeClr val="accent1"/>
+          </a:fillRef>
+          <a:effectRef idx="2">
+            <a:schemeClr val="accent1"/>
+          </a:effectRef>
+          <a:fontRef idx="minor">
+            <a:schemeClr val="lt1"/>
+          </a:fontRef>
+        </p:style>
+        <p:txBody>
+          <a:bodyPr rtlCol="0" anchor="ctr"/>
+          <a:lstStyle/>
+          <a:p>
+            <a:pPr algn="ctr"/>
+            <a:endParaRPr lang="en-US" sz="1300" dirty="0"/>
+          </a:p>
+        </p:txBody>
+      </p:sp>
+      <p:sp>
+        <p:nvSpPr>
+          <p:cNvPr id="104" name="Rectangle 103"/>
+          <p:cNvSpPr/>
+          <p:nvPr/>
+        </p:nvSpPr>
+        <p:spPr>
+          <a:xfrm>
+            <a:off x="4935730" y="5191368"/>
+            <a:ext cx="1292128" cy="400110"/>
+          </a:xfrm>
+          <a:prstGeom prst="rect">
+            <a:avLst/>
+          </a:prstGeom>
+        </p:spPr>
+        <p:txBody>
+          <a:bodyPr wrap="square">
+            <a:spAutoFit/>
+          </a:bodyPr>
+          <a:lstStyle/>
+          <a:p>
+            <a:pPr algn="ctr"/>
+            <a:r>
+              <a:rPr lang="en-US" sz="2000" dirty="0" smtClean="0">
+                <a:solidFill>
+                  <a:srgbClr val="000000"/>
+                </a:solidFill>
+                <a:latin typeface="Arial"/>
+                <a:cs typeface="Arial"/>
+              </a:rPr>
+              <a:t>Outreach</a:t>
+            </a:r>
+            <a:endParaRPr lang="en-US" sz="2000" dirty="0">
+              <a:solidFill>
+                <a:srgbClr val="000000"/>
+              </a:solidFill>
+              <a:latin typeface="Arial"/>
+              <a:cs typeface="Arial"/>
+            </a:endParaRPr>
+          </a:p>
+        </p:txBody>
+      </p:sp>
+      <p:sp>
+        <p:nvSpPr>
+          <p:cNvPr id="105" name="Process 104"/>
+          <p:cNvSpPr/>
+          <p:nvPr/>
+        </p:nvSpPr>
+        <p:spPr>
+          <a:xfrm>
+            <a:off x="4935730" y="5557827"/>
+            <a:ext cx="1292128" cy="856001"/>
+          </a:xfrm>
+          <a:prstGeom prst="flowChartProcess">
+            <a:avLst/>
+          </a:prstGeom>
+          <a:solidFill>
+            <a:schemeClr val="bg1"/>
+          </a:solidFill>
+          <a:ln>
+            <a:solidFill>
+              <a:schemeClr val="tx1"/>
+            </a:solidFill>
+          </a:ln>
+          <a:effectLst/>
+        </p:spPr>
+        <p:style>
+          <a:lnRef idx="1">
+            <a:schemeClr val="accent1"/>
+          </a:lnRef>
+          <a:fillRef idx="3">
+            <a:schemeClr val="accent1"/>
+          </a:fillRef>
+          <a:effectRef idx="2">
+            <a:schemeClr val="accent1"/>
+          </a:effectRef>
+          <a:fontRef idx="minor">
+            <a:schemeClr val="lt1"/>
+          </a:fontRef>
+        </p:style>
+        <p:txBody>
+          <a:bodyPr rtlCol="0" anchor="ctr"/>
+          <a:lstStyle/>
+          <a:p>
+            <a:r>
+              <a:rPr lang="en-US" sz="1100" dirty="0" smtClean="0">
+                <a:solidFill>
+                  <a:srgbClr val="000000"/>
+                </a:solidFill>
+                <a:latin typeface="Arial"/>
+                <a:cs typeface="Arial"/>
+              </a:rPr>
+              <a:t>Members of public at events like Ag Day and Darwin Day.</a:t>
+            </a:r>
+            <a:endParaRPr lang="en-US" sz="1100" dirty="0">
+              <a:solidFill>
+                <a:srgbClr val="000000"/>
+              </a:solidFill>
+              <a:effectLst/>
+              <a:latin typeface="Arial"/>
+              <a:cs typeface="Arial"/>
+            </a:endParaRPr>
+          </a:p>
+        </p:txBody>
+      </p:sp>
+      <p:cxnSp>
+        <p:nvCxnSpPr>
+          <p:cNvPr id="106" name="Curved Connector 105"/>
+          <p:cNvCxnSpPr>
+            <a:stCxn id="54" idx="2"/>
+            <a:endCxn id="103" idx="1"/>
+          </p:cNvCxnSpPr>
+          <p:nvPr/>
+        </p:nvCxnSpPr>
+        <p:spPr>
+          <a:xfrm rot="16200000" flipH="1">
+            <a:off x="3409035" y="4478753"/>
+            <a:ext cx="134610" cy="2692400"/>
+          </a:xfrm>
+          <a:prstGeom prst="curvedConnector2">
+            <a:avLst/>
+          </a:prstGeom>
+          <a:ln>
+            <a:solidFill>
+              <a:srgbClr val="000000"/>
+            </a:solidFill>
+          </a:ln>
+          <a:effectLst>
+            <a:outerShdw blurRad="50800" dist="38100" dir="2700000" algn="tl" rotWithShape="0">
+              <a:prstClr val="black">
+                <a:alpha val="40000"/>
+              </a:prstClr>
+            </a:outerShdw>
+          </a:effectLst>
+        </p:spPr>
+        <p:style>
+          <a:lnRef idx="2">
+            <a:schemeClr val="accent1"/>
+          </a:lnRef>
+          <a:fillRef idx="0">
+            <a:schemeClr val="accent1"/>
+          </a:fillRef>
+          <a:effectRef idx="1">
+            <a:schemeClr val="accent1"/>
+          </a:effectRef>
+          <a:fontRef idx="minor">
+            <a:schemeClr val="tx1"/>
+          </a:fontRef>
+        </p:style>
+      </p:cxnSp>
+      <p:cxnSp>
+        <p:nvCxnSpPr>
+          <p:cNvPr id="112" name="Curved Connector 111"/>
+          <p:cNvCxnSpPr>
+            <a:stCxn id="103" idx="0"/>
+            <a:endCxn id="79" idx="1"/>
+          </p:cNvCxnSpPr>
+          <p:nvPr/>
+        </p:nvCxnSpPr>
+        <p:spPr>
+          <a:xfrm rot="5400000" flipH="1" flipV="1">
+            <a:off x="5561105" y="4064729"/>
+            <a:ext cx="1172612" cy="1125743"/>
+          </a:xfrm>
+          <a:prstGeom prst="curvedConnector2">
+            <a:avLst/>
+          </a:prstGeom>
+          <a:ln>
+            <a:solidFill>
+              <a:srgbClr val="000000"/>
+            </a:solidFill>
+          </a:ln>
+          <a:effectLst>
+            <a:outerShdw blurRad="50800" dist="38100" dir="2700000" algn="tl" rotWithShape="0">
+              <a:prstClr val="black">
+                <a:alpha val="40000"/>
+              </a:prstClr>
+            </a:outerShdw>
+          </a:effectLst>
+        </p:spPr>
+        <p:style>
+          <a:lnRef idx="2">
+            <a:schemeClr val="accent1"/>
+          </a:lnRef>
+          <a:fillRef idx="0">
+            <a:schemeClr val="accent1"/>
+          </a:fillRef>
+          <a:effectRef idx="1">
+            <a:schemeClr val="accent1"/>
+          </a:effectRef>
+          <a:fontRef idx="minor">
+            <a:schemeClr val="tx1"/>
+          </a:fontRef>
+        </p:style>
+      </p:cxnSp>
+      <p:cxnSp>
+        <p:nvCxnSpPr>
+          <p:cNvPr id="115" name="Curved Connector 114"/>
+          <p:cNvCxnSpPr>
+            <a:stCxn id="64" idx="1"/>
+            <a:endCxn id="45" idx="3"/>
+          </p:cNvCxnSpPr>
+          <p:nvPr/>
+        </p:nvCxnSpPr>
+        <p:spPr>
+          <a:xfrm rot="10800000">
+            <a:off x="7956156" y="1264636"/>
+            <a:ext cx="374394" cy="6349"/>
+          </a:xfrm>
+          <a:prstGeom prst="curvedConnector3">
+            <a:avLst>
+              <a:gd name="adj1" fmla="val 50000"/>
+            </a:avLst>
+          </a:prstGeom>
+          <a:ln>
+            <a:solidFill>
+              <a:srgbClr val="000000"/>
+            </a:solidFill>
+          </a:ln>
+          <a:effectLst>
+            <a:outerShdw blurRad="50800" dist="38100" dir="2700000" algn="tl" rotWithShape="0">
+              <a:prstClr val="black">
+                <a:alpha val="40000"/>
+              </a:prstClr>
+            </a:outerShdw>
+          </a:effectLst>
+        </p:spPr>
+        <p:style>
+          <a:lnRef idx="2">
+            <a:schemeClr val="accent1"/>
+          </a:lnRef>
+          <a:fillRef idx="0">
+            <a:schemeClr val="accent1"/>
+          </a:fillRef>
+          <a:effectRef idx="1">
+            <a:schemeClr val="accent1"/>
+          </a:effectRef>
+          <a:fontRef idx="minor">
+            <a:schemeClr val="tx1"/>
+          </a:fontRef>
+        </p:style>
+      </p:cxnSp>
     </p:spTree>
     <p:extLst>
       <p:ext uri="{BB962C8B-B14F-4D97-AF65-F5344CB8AC3E}">

</xml_diff>

<commit_message>
updated summary and body
</commit_message>
<xml_diff>
--- a/FinalProposal/OrgChart.pptx
+++ b/FinalProposal/OrgChart.pptx
@@ -288,7 +288,7 @@
           <a:p>
             <a:fld id="{ECE00523-3F0A-3D4F-9F00-E442DF3AB4B6}" type="datetimeFigureOut">
               <a:rPr lang="en-US" smtClean="0"/>
-              <a:t>1/29/17</a:t>
+              <a:t>2/4/17</a:t>
             </a:fld>
             <a:endParaRPr lang="en-US"/>
           </a:p>
@@ -458,7 +458,7 @@
           <a:p>
             <a:fld id="{ECE00523-3F0A-3D4F-9F00-E442DF3AB4B6}" type="datetimeFigureOut">
               <a:rPr lang="en-US" smtClean="0"/>
-              <a:t>1/29/17</a:t>
+              <a:t>2/4/17</a:t>
             </a:fld>
             <a:endParaRPr lang="en-US"/>
           </a:p>
@@ -638,7 +638,7 @@
           <a:p>
             <a:fld id="{ECE00523-3F0A-3D4F-9F00-E442DF3AB4B6}" type="datetimeFigureOut">
               <a:rPr lang="en-US" smtClean="0"/>
-              <a:t>1/29/17</a:t>
+              <a:t>2/4/17</a:t>
             </a:fld>
             <a:endParaRPr lang="en-US"/>
           </a:p>
@@ -808,7 +808,7 @@
           <a:p>
             <a:fld id="{ECE00523-3F0A-3D4F-9F00-E442DF3AB4B6}" type="datetimeFigureOut">
               <a:rPr lang="en-US" smtClean="0"/>
-              <a:t>1/29/17</a:t>
+              <a:t>2/4/17</a:t>
             </a:fld>
             <a:endParaRPr lang="en-US"/>
           </a:p>
@@ -1054,7 +1054,7 @@
           <a:p>
             <a:fld id="{ECE00523-3F0A-3D4F-9F00-E442DF3AB4B6}" type="datetimeFigureOut">
               <a:rPr lang="en-US" smtClean="0"/>
-              <a:t>1/29/17</a:t>
+              <a:t>2/4/17</a:t>
             </a:fld>
             <a:endParaRPr lang="en-US"/>
           </a:p>
@@ -1342,7 +1342,7 @@
           <a:p>
             <a:fld id="{ECE00523-3F0A-3D4F-9F00-E442DF3AB4B6}" type="datetimeFigureOut">
               <a:rPr lang="en-US" smtClean="0"/>
-              <a:t>1/29/17</a:t>
+              <a:t>2/4/17</a:t>
             </a:fld>
             <a:endParaRPr lang="en-US"/>
           </a:p>
@@ -1764,7 +1764,7 @@
           <a:p>
             <a:fld id="{ECE00523-3F0A-3D4F-9F00-E442DF3AB4B6}" type="datetimeFigureOut">
               <a:rPr lang="en-US" smtClean="0"/>
-              <a:t>1/29/17</a:t>
+              <a:t>2/4/17</a:t>
             </a:fld>
             <a:endParaRPr lang="en-US"/>
           </a:p>
@@ -1882,7 +1882,7 @@
           <a:p>
             <a:fld id="{ECE00523-3F0A-3D4F-9F00-E442DF3AB4B6}" type="datetimeFigureOut">
               <a:rPr lang="en-US" smtClean="0"/>
-              <a:t>1/29/17</a:t>
+              <a:t>2/4/17</a:t>
             </a:fld>
             <a:endParaRPr lang="en-US"/>
           </a:p>
@@ -1977,7 +1977,7 @@
           <a:p>
             <a:fld id="{ECE00523-3F0A-3D4F-9F00-E442DF3AB4B6}" type="datetimeFigureOut">
               <a:rPr lang="en-US" smtClean="0"/>
-              <a:t>1/29/17</a:t>
+              <a:t>2/4/17</a:t>
             </a:fld>
             <a:endParaRPr lang="en-US"/>
           </a:p>
@@ -2254,7 +2254,7 @@
           <a:p>
             <a:fld id="{ECE00523-3F0A-3D4F-9F00-E442DF3AB4B6}" type="datetimeFigureOut">
               <a:rPr lang="en-US" smtClean="0"/>
-              <a:t>1/29/17</a:t>
+              <a:t>2/4/17</a:t>
             </a:fld>
             <a:endParaRPr lang="en-US"/>
           </a:p>
@@ -2507,7 +2507,7 @@
           <a:p>
             <a:fld id="{ECE00523-3F0A-3D4F-9F00-E442DF3AB4B6}" type="datetimeFigureOut">
               <a:rPr lang="en-US" smtClean="0"/>
-              <a:t>1/29/17</a:t>
+              <a:t>2/4/17</a:t>
             </a:fld>
             <a:endParaRPr lang="en-US"/>
           </a:p>
@@ -2720,7 +2720,7 @@
           <a:p>
             <a:fld id="{ECE00523-3F0A-3D4F-9F00-E442DF3AB4B6}" type="datetimeFigureOut">
               <a:rPr lang="en-US" smtClean="0"/>
-              <a:t>1/29/17</a:t>
+              <a:t>2/4/17</a:t>
             </a:fld>
             <a:endParaRPr lang="en-US"/>
           </a:p>
@@ -3103,58 +3103,10 @@
         </p:nvSpPr>
         <p:spPr>
           <a:xfrm>
-            <a:off x="3186211" y="22537"/>
+            <a:off x="3101428" y="1930705"/>
             <a:ext cx="4769945" cy="2484196"/>
           </a:xfrm>
           <a:prstGeom prst="flowChartAlternateProcess">
-            <a:avLst/>
-          </a:prstGeom>
-          <a:solidFill>
-            <a:schemeClr val="bg1">
-              <a:lumMod val="85000"/>
-            </a:schemeClr>
-          </a:solidFill>
-          <a:ln>
-            <a:solidFill>
-              <a:schemeClr val="tx1"/>
-            </a:solidFill>
-          </a:ln>
-        </p:spPr>
-        <p:style>
-          <a:lnRef idx="1">
-            <a:schemeClr val="accent1"/>
-          </a:lnRef>
-          <a:fillRef idx="3">
-            <a:schemeClr val="accent1"/>
-          </a:fillRef>
-          <a:effectRef idx="2">
-            <a:schemeClr val="accent1"/>
-          </a:effectRef>
-          <a:fontRef idx="minor">
-            <a:schemeClr val="lt1"/>
-          </a:fontRef>
-        </p:style>
-        <p:txBody>
-          <a:bodyPr rtlCol="0" anchor="ctr"/>
-          <a:lstStyle/>
-          <a:p>
-            <a:pPr algn="ctr"/>
-            <a:endParaRPr lang="en-US"/>
-          </a:p>
-        </p:txBody>
-      </p:sp>
-      <p:sp>
-        <p:nvSpPr>
-          <p:cNvPr id="46" name="Process 45"/>
-          <p:cNvSpPr/>
-          <p:nvPr/>
-        </p:nvSpPr>
-        <p:spPr>
-          <a:xfrm>
-            <a:off x="4857522" y="366460"/>
-            <a:ext cx="1426259" cy="771166"/>
-          </a:xfrm>
-          <a:prstGeom prst="flowChartProcess">
             <a:avLst/>
           </a:prstGeom>
           <a:solidFill>
@@ -3185,98 +3137,79 @@
           <a:bodyPr rtlCol="0" anchor="ctr"/>
           <a:lstStyle/>
           <a:p>
-            <a:r>
-              <a:rPr lang="en-US" sz="1100" b="1" dirty="0" smtClean="0">
+            <a:pPr algn="ctr"/>
+            <a:endParaRPr lang="en-US" sz="3200" dirty="0"/>
+          </a:p>
+        </p:txBody>
+      </p:sp>
+      <p:sp>
+        <p:nvSpPr>
+          <p:cNvPr id="53" name="Rectangle 52"/>
+          <p:cNvSpPr/>
+          <p:nvPr/>
+        </p:nvSpPr>
+        <p:spPr>
+          <a:xfrm>
+            <a:off x="3930074" y="2079362"/>
+            <a:ext cx="3112652" cy="523220"/>
+          </a:xfrm>
+          <a:prstGeom prst="rect">
+            <a:avLst/>
+          </a:prstGeom>
+          <a:solidFill>
+            <a:schemeClr val="bg1"/>
+          </a:solidFill>
+          <a:effectLst/>
+        </p:spPr>
+        <p:txBody>
+          <a:bodyPr wrap="square">
+            <a:spAutoFit/>
+          </a:bodyPr>
+          <a:lstStyle/>
+          <a:p>
+            <a:pPr algn="ctr"/>
+            <a:r>
+              <a:rPr lang="en-US" sz="2800" dirty="0">
                 <a:solidFill>
                   <a:srgbClr val="000000"/>
                 </a:solidFill>
-                <a:effectLst/>
                 <a:latin typeface="Arial"/>
                 <a:cs typeface="Arial"/>
               </a:rPr>
-              <a:t>PI O’Meara</a:t>
-            </a:r>
-            <a:r>
-              <a:rPr lang="en-US" sz="1100" dirty="0" smtClean="0">
+              <a:t>Leadership </a:t>
+            </a:r>
+            <a:r>
+              <a:rPr lang="en-US" sz="2800" dirty="0" smtClean="0">
                 <a:solidFill>
                   <a:srgbClr val="000000"/>
                 </a:solidFill>
-                <a:effectLst/>
                 <a:latin typeface="Arial"/>
                 <a:cs typeface="Arial"/>
               </a:rPr>
-              <a:t>: Oversee project to ensure delivery of targets. Workshops </a:t>
-            </a:r>
-            <a:endParaRPr lang="en-US" sz="1100" dirty="0">
+              <a:t>Team</a:t>
+            </a:r>
+            <a:endParaRPr lang="en-US" sz="2800" dirty="0">
               <a:solidFill>
                 <a:srgbClr val="000000"/>
               </a:solidFill>
-              <a:effectLst/>
               <a:latin typeface="Arial"/>
               <a:cs typeface="Arial"/>
             </a:endParaRPr>
           </a:p>
         </p:txBody>
       </p:sp>
-      <p:cxnSp>
-        <p:nvCxnSpPr>
-          <p:cNvPr id="47" name="Curved Connector 46"/>
-          <p:cNvCxnSpPr>
-            <a:stCxn id="46" idx="2"/>
-            <a:endCxn id="52" idx="0"/>
-          </p:cNvCxnSpPr>
-          <p:nvPr/>
-        </p:nvCxnSpPr>
-        <p:spPr>
-          <a:xfrm rot="16200000" flipH="1">
-            <a:off x="5439577" y="1268701"/>
-            <a:ext cx="273292" cy="11142"/>
-          </a:xfrm>
-          <a:prstGeom prst="curvedConnector3">
-            <a:avLst>
-              <a:gd name="adj1" fmla="val 50000"/>
-            </a:avLst>
-          </a:prstGeom>
-          <a:ln>
-            <a:solidFill>
-              <a:srgbClr val="000000"/>
-            </a:solidFill>
-          </a:ln>
-          <a:effectLst>
-            <a:outerShdw blurRad="50800" dist="38100" dir="2700000" algn="tl" rotWithShape="0">
-              <a:prstClr val="black">
-                <a:alpha val="40000"/>
-              </a:prstClr>
-            </a:outerShdw>
-          </a:effectLst>
-        </p:spPr>
-        <p:style>
-          <a:lnRef idx="2">
-            <a:schemeClr val="accent1"/>
-          </a:lnRef>
-          <a:fillRef idx="0">
-            <a:schemeClr val="accent1"/>
-          </a:fillRef>
-          <a:effectRef idx="1">
-            <a:schemeClr val="accent1"/>
-          </a:effectRef>
-          <a:fontRef idx="minor">
-            <a:schemeClr val="tx1"/>
-          </a:fontRef>
-        </p:style>
-      </p:cxnSp>
-      <p:sp>
-        <p:nvSpPr>
-          <p:cNvPr id="48" name="Process 47"/>
+      <p:sp>
+        <p:nvSpPr>
+          <p:cNvPr id="44" name="Alternate Process 43"/>
           <p:cNvSpPr/>
           <p:nvPr/>
         </p:nvSpPr>
         <p:spPr>
           <a:xfrm>
-            <a:off x="3271877" y="366459"/>
-            <a:ext cx="1426259" cy="771166"/>
+            <a:off x="4247388" y="353072"/>
+            <a:ext cx="2478024" cy="869155"/>
           </a:xfrm>
-          <a:prstGeom prst="flowChartProcess">
+          <a:prstGeom prst="flowChartAlternateProcess">
             <a:avLst/>
           </a:prstGeom>
           <a:solidFill>
@@ -3307,44 +3240,34 @@
           <a:bodyPr rtlCol="0" anchor="ctr"/>
           <a:lstStyle/>
           <a:p>
-            <a:r>
-              <a:rPr lang="en-US" sz="1100" b="1" dirty="0" smtClean="0">
+            <a:pPr algn="ctr"/>
+            <a:r>
+              <a:rPr lang="en-US" sz="2400" dirty="0" smtClean="0">
                 <a:solidFill>
                   <a:srgbClr val="000000"/>
                 </a:solidFill>
-                <a:effectLst/>
                 <a:latin typeface="Arial"/>
                 <a:cs typeface="Arial"/>
               </a:rPr>
-              <a:t>Co-PI </a:t>
-            </a:r>
-            <a:r>
-              <a:rPr lang="en-US" sz="1100" b="1" dirty="0" err="1" smtClean="0">
+              <a:t>UTK/UTIA </a:t>
+            </a:r>
+          </a:p>
+          <a:p>
+            <a:pPr algn="ctr"/>
+            <a:r>
+              <a:rPr lang="en-US" sz="2400" dirty="0" smtClean="0">
                 <a:solidFill>
                   <a:srgbClr val="000000"/>
                 </a:solidFill>
-                <a:effectLst/>
                 <a:latin typeface="Arial"/>
                 <a:cs typeface="Arial"/>
               </a:rPr>
-              <a:t>Kwit</a:t>
-            </a:r>
-            <a:r>
-              <a:rPr lang="en-US" sz="1100" dirty="0" smtClean="0">
-                <a:solidFill>
-                  <a:srgbClr val="000000"/>
-                </a:solidFill>
-                <a:effectLst/>
-                <a:latin typeface="Arial"/>
-                <a:cs typeface="Arial"/>
-              </a:rPr>
-              <a:t>: Liaison between students and external groups</a:t>
-            </a:r>
-            <a:endParaRPr lang="en-US" sz="1100" dirty="0">
+              <a:t>Administration</a:t>
+            </a:r>
+            <a:endParaRPr lang="en-US" sz="2400" dirty="0">
               <a:solidFill>
                 <a:srgbClr val="000000"/>
               </a:solidFill>
-              <a:effectLst/>
               <a:latin typeface="Arial"/>
               <a:cs typeface="Arial"/>
             </a:endParaRPr>
@@ -3353,16 +3276,16 @@
       </p:sp>
       <p:sp>
         <p:nvSpPr>
-          <p:cNvPr id="49" name="Process 48"/>
+          <p:cNvPr id="63" name="Alternate Process 62"/>
           <p:cNvSpPr/>
           <p:nvPr/>
         </p:nvSpPr>
         <p:spPr>
           <a:xfrm>
-            <a:off x="3271877" y="1410918"/>
-            <a:ext cx="1426259" cy="771166"/>
+            <a:off x="8265601" y="1930705"/>
+            <a:ext cx="2478024" cy="869155"/>
           </a:xfrm>
-          <a:prstGeom prst="flowChartProcess">
+          <a:prstGeom prst="flowChartAlternateProcess">
             <a:avLst/>
           </a:prstGeom>
           <a:solidFill>
@@ -3393,62 +3316,561 @@
           <a:bodyPr rtlCol="0" anchor="ctr"/>
           <a:lstStyle/>
           <a:p>
-            <a:r>
-              <a:rPr lang="en-US" sz="1100" b="1" dirty="0" smtClean="0">
+            <a:pPr algn="ctr"/>
+            <a:r>
+              <a:rPr lang="en-US" sz="2400" dirty="0" smtClean="0">
                 <a:solidFill>
                   <a:srgbClr val="000000"/>
                 </a:solidFill>
-                <a:effectLst/>
                 <a:latin typeface="Arial"/>
                 <a:cs typeface="Arial"/>
               </a:rPr>
-              <a:t>Co-PI </a:t>
-            </a:r>
-            <a:r>
-              <a:rPr lang="en-US" sz="1100" b="1" dirty="0" err="1" smtClean="0">
-                <a:solidFill>
-                  <a:srgbClr val="000000"/>
-                </a:solidFill>
-                <a:effectLst/>
-                <a:latin typeface="Arial"/>
-                <a:cs typeface="Arial"/>
-              </a:rPr>
-              <a:t>Staton</a:t>
-            </a:r>
-            <a:r>
-              <a:rPr lang="en-US" sz="1100" dirty="0" smtClean="0">
-                <a:solidFill>
-                  <a:srgbClr val="000000"/>
-                </a:solidFill>
-                <a:effectLst/>
-                <a:latin typeface="Arial"/>
-                <a:cs typeface="Arial"/>
-              </a:rPr>
-              <a:t>: Teach workshops, identify curriculum needs </a:t>
-            </a:r>
-            <a:endParaRPr lang="en-US" sz="1100" dirty="0">
+              <a:t>Evaluator</a:t>
+            </a:r>
+            <a:endParaRPr lang="en-US" sz="2400" dirty="0">
               <a:solidFill>
                 <a:srgbClr val="000000"/>
               </a:solidFill>
-              <a:effectLst/>
               <a:latin typeface="Arial"/>
               <a:cs typeface="Arial"/>
             </a:endParaRPr>
           </a:p>
         </p:txBody>
       </p:sp>
-      <p:sp>
-        <p:nvSpPr>
-          <p:cNvPr id="50" name="Process 49"/>
+      <p:graphicFrame>
+        <p:nvGraphicFramePr>
+          <p:cNvPr id="6" name="Table 5"/>
+          <p:cNvGraphicFramePr>
+            <a:graphicFrameLocks noGrp="1"/>
+          </p:cNvGraphicFramePr>
+          <p:nvPr>
+            <p:extLst>
+              <p:ext uri="{D42A27DB-BD31-4B8C-83A1-F6EECF244321}">
+                <p14:modId xmlns:p14="http://schemas.microsoft.com/office/powerpoint/2010/main" val="3706546939"/>
+              </p:ext>
+            </p:extLst>
+          </p:nvPr>
+        </p:nvGraphicFramePr>
+        <p:xfrm>
+          <a:off x="3425501" y="2795016"/>
+          <a:ext cx="4121799" cy="1371600"/>
+        </p:xfrm>
+        <a:graphic>
+          <a:graphicData uri="http://schemas.openxmlformats.org/drawingml/2006/table">
+            <a:tbl>
+              <a:tblPr firstRow="1" bandRow="1">
+                <a:tableStyleId>{2D5ABB26-0587-4C30-8999-92F81FD0307C}</a:tableStyleId>
+              </a:tblPr>
+              <a:tblGrid>
+                <a:gridCol w="1373933"/>
+                <a:gridCol w="1373933"/>
+                <a:gridCol w="1373933"/>
+              </a:tblGrid>
+              <a:tr h="317573">
+                <a:tc>
+                  <a:txBody>
+                    <a:bodyPr/>
+                    <a:lstStyle/>
+                    <a:p>
+                      <a:pPr algn="ctr"/>
+                      <a:r>
+                        <a:rPr lang="en-US" sz="1600" dirty="0" smtClean="0">
+                          <a:latin typeface="Arial"/>
+                          <a:cs typeface="Arial"/>
+                        </a:rPr>
+                        <a:t>PI O’Meara</a:t>
+                      </a:r>
+                      <a:endParaRPr lang="en-US" sz="1600" dirty="0">
+                        <a:latin typeface="Arial"/>
+                        <a:cs typeface="Arial"/>
+                      </a:endParaRPr>
+                    </a:p>
+                  </a:txBody>
+                  <a:tcPr/>
+                </a:tc>
+                <a:tc>
+                  <a:txBody>
+                    <a:bodyPr/>
+                    <a:lstStyle/>
+                    <a:p>
+                      <a:pPr algn="ctr"/>
+                      <a:r>
+                        <a:rPr lang="en-US" sz="1600" dirty="0" smtClean="0">
+                          <a:latin typeface="Arial"/>
+                          <a:cs typeface="Arial"/>
+                        </a:rPr>
+                        <a:t>Co-PI </a:t>
+                      </a:r>
+                      <a:r>
+                        <a:rPr lang="en-US" sz="1600" dirty="0" err="1" smtClean="0">
+                          <a:latin typeface="Arial"/>
+                          <a:cs typeface="Arial"/>
+                        </a:rPr>
+                        <a:t>Staton</a:t>
+                      </a:r>
+                      <a:endParaRPr lang="en-US" sz="1600" dirty="0">
+                        <a:latin typeface="Arial"/>
+                        <a:cs typeface="Arial"/>
+                      </a:endParaRPr>
+                    </a:p>
+                  </a:txBody>
+                  <a:tcPr/>
+                </a:tc>
+                <a:tc>
+                  <a:txBody>
+                    <a:bodyPr/>
+                    <a:lstStyle/>
+                    <a:p>
+                      <a:pPr algn="ctr"/>
+                      <a:r>
+                        <a:rPr lang="en-US" sz="1600" dirty="0" smtClean="0">
+                          <a:latin typeface="Arial"/>
+                          <a:cs typeface="Arial"/>
+                        </a:rPr>
+                        <a:t>Co-PI </a:t>
+                      </a:r>
+                      <a:r>
+                        <a:rPr lang="en-US" sz="1600" dirty="0" err="1" smtClean="0">
+                          <a:latin typeface="Arial"/>
+                          <a:cs typeface="Arial"/>
+                        </a:rPr>
+                        <a:t>Kwit</a:t>
+                      </a:r>
+                      <a:endParaRPr lang="en-US" sz="1600" dirty="0">
+                        <a:latin typeface="Arial"/>
+                        <a:cs typeface="Arial"/>
+                      </a:endParaRPr>
+                    </a:p>
+                  </a:txBody>
+                  <a:tcPr/>
+                </a:tc>
+              </a:tr>
+              <a:tr h="317573">
+                <a:tc>
+                  <a:txBody>
+                    <a:bodyPr/>
+                    <a:lstStyle/>
+                    <a:p>
+                      <a:pPr algn="ctr"/>
+                      <a:r>
+                        <a:rPr lang="en-US" sz="2400" dirty="0" smtClean="0">
+                          <a:latin typeface="Arial"/>
+                          <a:cs typeface="Arial"/>
+                        </a:rPr>
+                        <a:t>↑</a:t>
+                      </a:r>
+                      <a:endParaRPr lang="en-US" sz="2400" dirty="0">
+                        <a:latin typeface="Arial"/>
+                        <a:cs typeface="Arial"/>
+                      </a:endParaRPr>
+                    </a:p>
+                  </a:txBody>
+                  <a:tcPr/>
+                </a:tc>
+                <a:tc>
+                  <a:txBody>
+                    <a:bodyPr/>
+                    <a:lstStyle/>
+                    <a:p>
+                      <a:pPr algn="ctr"/>
+                      <a:endParaRPr lang="en-US" sz="1600">
+                        <a:latin typeface="Arial"/>
+                        <a:cs typeface="Arial"/>
+                      </a:endParaRPr>
+                    </a:p>
+                  </a:txBody>
+                  <a:tcPr/>
+                </a:tc>
+                <a:tc>
+                  <a:txBody>
+                    <a:bodyPr/>
+                    <a:lstStyle/>
+                    <a:p>
+                      <a:pPr algn="ctr"/>
+                      <a:endParaRPr lang="en-US" sz="1600" dirty="0">
+                        <a:latin typeface="Arial"/>
+                        <a:cs typeface="Arial"/>
+                      </a:endParaRPr>
+                    </a:p>
+                  </a:txBody>
+                  <a:tcPr/>
+                </a:tc>
+              </a:tr>
+              <a:tr h="573681">
+                <a:tc>
+                  <a:txBody>
+                    <a:bodyPr/>
+                    <a:lstStyle/>
+                    <a:p>
+                      <a:pPr algn="ctr"/>
+                      <a:r>
+                        <a:rPr lang="en-US" sz="1600" dirty="0" smtClean="0">
+                          <a:latin typeface="Arial"/>
+                          <a:cs typeface="Arial"/>
+                        </a:rPr>
+                        <a:t>Project Coordinator</a:t>
+                      </a:r>
+                      <a:endParaRPr lang="en-US" sz="1600" dirty="0">
+                        <a:latin typeface="Arial"/>
+                        <a:cs typeface="Arial"/>
+                      </a:endParaRPr>
+                    </a:p>
+                  </a:txBody>
+                  <a:tcPr/>
+                </a:tc>
+                <a:tc>
+                  <a:txBody>
+                    <a:bodyPr/>
+                    <a:lstStyle/>
+                    <a:p>
+                      <a:pPr algn="ctr"/>
+                      <a:r>
+                        <a:rPr lang="en-US" sz="1600" dirty="0" smtClean="0">
+                          <a:latin typeface="Arial"/>
+                          <a:cs typeface="Arial"/>
+                        </a:rPr>
+                        <a:t>Co-PI Kalisz</a:t>
+                      </a:r>
+                      <a:endParaRPr lang="en-US" sz="1600" dirty="0">
+                        <a:latin typeface="Arial"/>
+                        <a:cs typeface="Arial"/>
+                      </a:endParaRPr>
+                    </a:p>
+                  </a:txBody>
+                  <a:tcPr/>
+                </a:tc>
+                <a:tc>
+                  <a:txBody>
+                    <a:bodyPr/>
+                    <a:lstStyle/>
+                    <a:p>
+                      <a:pPr algn="ctr"/>
+                      <a:r>
+                        <a:rPr lang="en-US" sz="1600" dirty="0" smtClean="0">
+                          <a:latin typeface="Arial"/>
+                          <a:cs typeface="Arial"/>
+                        </a:rPr>
+                        <a:t>Co-PI Moulton</a:t>
+                      </a:r>
+                      <a:endParaRPr lang="en-US" sz="1600" dirty="0">
+                        <a:latin typeface="Arial"/>
+                        <a:cs typeface="Arial"/>
+                      </a:endParaRPr>
+                    </a:p>
+                  </a:txBody>
+                  <a:tcPr/>
+                </a:tc>
+              </a:tr>
+            </a:tbl>
+          </a:graphicData>
+        </a:graphic>
+      </p:graphicFrame>
+      <p:cxnSp>
+        <p:nvCxnSpPr>
+          <p:cNvPr id="76" name="Straight Connector 75"/>
+          <p:cNvCxnSpPr>
+            <a:stCxn id="70" idx="2"/>
+          </p:cNvCxnSpPr>
+          <p:nvPr/>
+        </p:nvCxnSpPr>
+        <p:spPr>
+          <a:xfrm>
+            <a:off x="1439404" y="4354658"/>
+            <a:ext cx="3371937" cy="1063183"/>
+          </a:xfrm>
+          <a:prstGeom prst="line">
+            <a:avLst/>
+          </a:prstGeom>
+          <a:ln>
+            <a:solidFill>
+              <a:schemeClr val="tx1"/>
+            </a:solidFill>
+          </a:ln>
+          <a:effectLst/>
+        </p:spPr>
+        <p:style>
+          <a:lnRef idx="2">
+            <a:schemeClr val="accent1"/>
+          </a:lnRef>
+          <a:fillRef idx="0">
+            <a:schemeClr val="accent1"/>
+          </a:fillRef>
+          <a:effectRef idx="1">
+            <a:schemeClr val="accent1"/>
+          </a:effectRef>
+          <a:fontRef idx="minor">
+            <a:schemeClr val="tx1"/>
+          </a:fontRef>
+        </p:style>
+      </p:cxnSp>
+      <p:cxnSp>
+        <p:nvCxnSpPr>
+          <p:cNvPr id="7" name="Straight Connector 6"/>
+          <p:cNvCxnSpPr/>
+          <p:nvPr/>
+        </p:nvCxnSpPr>
+        <p:spPr>
+          <a:xfrm flipH="1">
+            <a:off x="7871373" y="2365283"/>
+            <a:ext cx="394228" cy="0"/>
+          </a:xfrm>
+          <a:prstGeom prst="line">
+            <a:avLst/>
+          </a:prstGeom>
+          <a:ln>
+            <a:solidFill>
+              <a:schemeClr val="tx1"/>
+            </a:solidFill>
+          </a:ln>
+          <a:effectLst/>
+        </p:spPr>
+        <p:style>
+          <a:lnRef idx="2">
+            <a:schemeClr val="accent1"/>
+          </a:lnRef>
+          <a:fillRef idx="0">
+            <a:schemeClr val="accent1"/>
+          </a:fillRef>
+          <a:effectRef idx="1">
+            <a:schemeClr val="accent1"/>
+          </a:effectRef>
+          <a:fontRef idx="minor">
+            <a:schemeClr val="tx1"/>
+          </a:fontRef>
+        </p:style>
+      </p:cxnSp>
+      <p:cxnSp>
+        <p:nvCxnSpPr>
+          <p:cNvPr id="25" name="Straight Connector 24"/>
+          <p:cNvCxnSpPr/>
+          <p:nvPr/>
+        </p:nvCxnSpPr>
+        <p:spPr>
+          <a:xfrm flipH="1">
+            <a:off x="7876463" y="3886479"/>
+            <a:ext cx="394228" cy="0"/>
+          </a:xfrm>
+          <a:prstGeom prst="line">
+            <a:avLst/>
+          </a:prstGeom>
+          <a:ln>
+            <a:solidFill>
+              <a:schemeClr val="tx1"/>
+            </a:solidFill>
+          </a:ln>
+          <a:effectLst/>
+        </p:spPr>
+        <p:style>
+          <a:lnRef idx="2">
+            <a:schemeClr val="accent1"/>
+          </a:lnRef>
+          <a:fillRef idx="0">
+            <a:schemeClr val="accent1"/>
+          </a:fillRef>
+          <a:effectRef idx="1">
+            <a:schemeClr val="accent1"/>
+          </a:effectRef>
+          <a:fontRef idx="minor">
+            <a:schemeClr val="tx1"/>
+          </a:fontRef>
+        </p:style>
+      </p:cxnSp>
+      <p:cxnSp>
+        <p:nvCxnSpPr>
+          <p:cNvPr id="26" name="Straight Connector 25"/>
+          <p:cNvCxnSpPr/>
+          <p:nvPr/>
+        </p:nvCxnSpPr>
+        <p:spPr>
+          <a:xfrm flipH="1">
+            <a:off x="2674993" y="2365283"/>
+            <a:ext cx="420624" cy="0"/>
+          </a:xfrm>
+          <a:prstGeom prst="line">
+            <a:avLst/>
+          </a:prstGeom>
+          <a:ln>
+            <a:solidFill>
+              <a:schemeClr val="tx1"/>
+            </a:solidFill>
+          </a:ln>
+          <a:effectLst/>
+        </p:spPr>
+        <p:style>
+          <a:lnRef idx="2">
+            <a:schemeClr val="accent1"/>
+          </a:lnRef>
+          <a:fillRef idx="0">
+            <a:schemeClr val="accent1"/>
+          </a:fillRef>
+          <a:effectRef idx="1">
+            <a:schemeClr val="accent1"/>
+          </a:effectRef>
+          <a:fontRef idx="minor">
+            <a:schemeClr val="tx1"/>
+          </a:fontRef>
+        </p:style>
+      </p:cxnSp>
+      <p:cxnSp>
+        <p:nvCxnSpPr>
+          <p:cNvPr id="27" name="Straight Connector 26"/>
+          <p:cNvCxnSpPr/>
+          <p:nvPr/>
+        </p:nvCxnSpPr>
+        <p:spPr>
+          <a:xfrm flipH="1">
+            <a:off x="2683340" y="3942683"/>
+            <a:ext cx="412515" cy="0"/>
+          </a:xfrm>
+          <a:prstGeom prst="line">
+            <a:avLst/>
+          </a:prstGeom>
+          <a:ln>
+            <a:solidFill>
+              <a:schemeClr val="tx1"/>
+            </a:solidFill>
+          </a:ln>
+          <a:effectLst/>
+        </p:spPr>
+        <p:style>
+          <a:lnRef idx="2">
+            <a:schemeClr val="accent1"/>
+          </a:lnRef>
+          <a:fillRef idx="0">
+            <a:schemeClr val="accent1"/>
+          </a:fillRef>
+          <a:effectRef idx="1">
+            <a:schemeClr val="accent1"/>
+          </a:effectRef>
+          <a:fontRef idx="minor">
+            <a:schemeClr val="tx1"/>
+          </a:fontRef>
+        </p:style>
+      </p:cxnSp>
+      <p:cxnSp>
+        <p:nvCxnSpPr>
+          <p:cNvPr id="30" name="Straight Connector 29"/>
+          <p:cNvCxnSpPr/>
+          <p:nvPr/>
+        </p:nvCxnSpPr>
+        <p:spPr>
+          <a:xfrm flipH="1">
+            <a:off x="6107891" y="4354658"/>
+            <a:ext cx="3371937" cy="1063183"/>
+          </a:xfrm>
+          <a:prstGeom prst="line">
+            <a:avLst/>
+          </a:prstGeom>
+          <a:ln>
+            <a:solidFill>
+              <a:schemeClr val="tx1"/>
+            </a:solidFill>
+          </a:ln>
+          <a:effectLst/>
+        </p:spPr>
+        <p:style>
+          <a:lnRef idx="2">
+            <a:schemeClr val="accent1"/>
+          </a:lnRef>
+          <a:fillRef idx="0">
+            <a:schemeClr val="accent1"/>
+          </a:fillRef>
+          <a:effectRef idx="1">
+            <a:schemeClr val="accent1"/>
+          </a:effectRef>
+          <a:fontRef idx="minor">
+            <a:schemeClr val="tx1"/>
+          </a:fontRef>
+        </p:style>
+      </p:cxnSp>
+      <p:cxnSp>
+        <p:nvCxnSpPr>
+          <p:cNvPr id="31" name="Straight Connector 30"/>
+          <p:cNvCxnSpPr>
+            <a:stCxn id="69" idx="0"/>
+          </p:cNvCxnSpPr>
+          <p:nvPr/>
+        </p:nvCxnSpPr>
+        <p:spPr>
+          <a:xfrm flipV="1">
+            <a:off x="5478561" y="4449326"/>
+            <a:ext cx="0" cy="968515"/>
+          </a:xfrm>
+          <a:prstGeom prst="line">
+            <a:avLst/>
+          </a:prstGeom>
+          <a:ln>
+            <a:solidFill>
+              <a:schemeClr val="tx1"/>
+            </a:solidFill>
+          </a:ln>
+          <a:effectLst/>
+        </p:spPr>
+        <p:style>
+          <a:lnRef idx="2">
+            <a:schemeClr val="accent1"/>
+          </a:lnRef>
+          <a:fillRef idx="0">
+            <a:schemeClr val="accent1"/>
+          </a:fillRef>
+          <a:effectRef idx="1">
+            <a:schemeClr val="accent1"/>
+          </a:effectRef>
+          <a:fontRef idx="minor">
+            <a:schemeClr val="tx1"/>
+          </a:fontRef>
+        </p:style>
+      </p:cxnSp>
+      <p:cxnSp>
+        <p:nvCxnSpPr>
+          <p:cNvPr id="33" name="Straight Connector 32"/>
+          <p:cNvCxnSpPr>
+            <a:stCxn id="45" idx="0"/>
+          </p:cNvCxnSpPr>
+          <p:nvPr/>
+        </p:nvCxnSpPr>
+        <p:spPr>
+          <a:xfrm flipH="1" flipV="1">
+            <a:off x="5478562" y="1222228"/>
+            <a:ext cx="0" cy="708477"/>
+          </a:xfrm>
+          <a:prstGeom prst="line">
+            <a:avLst/>
+          </a:prstGeom>
+          <a:ln>
+            <a:solidFill>
+              <a:schemeClr val="tx1"/>
+            </a:solidFill>
+          </a:ln>
+          <a:effectLst/>
+        </p:spPr>
+        <p:style>
+          <a:lnRef idx="2">
+            <a:schemeClr val="accent1"/>
+          </a:lnRef>
+          <a:fillRef idx="0">
+            <a:schemeClr val="accent1"/>
+          </a:fillRef>
+          <a:effectRef idx="1">
+            <a:schemeClr val="accent1"/>
+          </a:effectRef>
+          <a:fontRef idx="minor">
+            <a:schemeClr val="tx1"/>
+          </a:fontRef>
+        </p:style>
+      </p:cxnSp>
+      <p:sp>
+        <p:nvSpPr>
+          <p:cNvPr id="71" name="Alternate Process 70"/>
           <p:cNvSpPr/>
           <p:nvPr/>
         </p:nvSpPr>
         <p:spPr>
           <a:xfrm>
-            <a:off x="6443169" y="366460"/>
-            <a:ext cx="1426259" cy="771166"/>
+            <a:off x="8265601" y="3485503"/>
+            <a:ext cx="2478024" cy="869155"/>
           </a:xfrm>
-          <a:prstGeom prst="flowChartProcess">
+          <a:prstGeom prst="flowChartAlternateProcess">
             <a:avLst/>
           </a:prstGeom>
           <a:solidFill>
@@ -3479,44 +3901,21 @@
           <a:bodyPr rtlCol="0" anchor="ctr"/>
           <a:lstStyle/>
           <a:p>
-            <a:r>
-              <a:rPr lang="en-US" sz="1100" b="1" dirty="0" smtClean="0">
+            <a:pPr algn="ctr"/>
+            <a:r>
+              <a:rPr lang="en-US" sz="2400" dirty="0" smtClean="0">
                 <a:solidFill>
                   <a:srgbClr val="000000"/>
                 </a:solidFill>
-                <a:effectLst/>
                 <a:latin typeface="Arial"/>
                 <a:cs typeface="Arial"/>
               </a:rPr>
-              <a:t>Co-PI </a:t>
-            </a:r>
-            <a:r>
-              <a:rPr lang="en-US" sz="1100" b="1" dirty="0" smtClean="0">
-                <a:solidFill>
-                  <a:srgbClr val="000000"/>
-                </a:solidFill>
-                <a:effectLst/>
-                <a:latin typeface="Arial"/>
-                <a:cs typeface="Arial"/>
-              </a:rPr>
-              <a:t>Moulton</a:t>
-            </a:r>
-            <a:r>
-              <a:rPr lang="en-US" sz="1100" dirty="0" smtClean="0">
-                <a:solidFill>
-                  <a:srgbClr val="000000"/>
-                </a:solidFill>
-                <a:effectLst/>
-                <a:latin typeface="Arial"/>
-                <a:cs typeface="Arial"/>
-              </a:rPr>
-              <a:t>: Mentoring students, teaching</a:t>
-            </a:r>
-            <a:endParaRPr lang="en-US" sz="1100" dirty="0">
+              <a:t>Internship Mentors</a:t>
+            </a:r>
+            <a:endParaRPr lang="en-US" sz="2400" dirty="0">
               <a:solidFill>
                 <a:srgbClr val="000000"/>
               </a:solidFill>
-              <a:effectLst/>
               <a:latin typeface="Arial"/>
               <a:cs typeface="Arial"/>
             </a:endParaRPr>
@@ -3525,16 +3924,16 @@
       </p:sp>
       <p:sp>
         <p:nvSpPr>
-          <p:cNvPr id="51" name="Process 50"/>
+          <p:cNvPr id="69" name="Alternate Process 68"/>
           <p:cNvSpPr/>
           <p:nvPr/>
         </p:nvSpPr>
         <p:spPr>
           <a:xfrm>
-            <a:off x="6443169" y="1291072"/>
-            <a:ext cx="1426259" cy="771166"/>
+            <a:off x="4239549" y="5417841"/>
+            <a:ext cx="2478024" cy="869155"/>
           </a:xfrm>
-          <a:prstGeom prst="flowChartProcess">
+          <a:prstGeom prst="flowChartAlternateProcess">
             <a:avLst/>
           </a:prstGeom>
           <a:solidFill>
@@ -3565,44 +3964,21 @@
           <a:bodyPr rtlCol="0" anchor="ctr"/>
           <a:lstStyle/>
           <a:p>
-            <a:r>
-              <a:rPr lang="en-US" sz="1100" b="1" dirty="0" smtClean="0">
+            <a:pPr algn="ctr"/>
+            <a:r>
+              <a:rPr lang="en-US" sz="2400" dirty="0" smtClean="0">
                 <a:solidFill>
                   <a:srgbClr val="000000"/>
                 </a:solidFill>
-                <a:effectLst/>
                 <a:latin typeface="Arial"/>
                 <a:cs typeface="Arial"/>
               </a:rPr>
-              <a:t>Co-PI </a:t>
-            </a:r>
-            <a:r>
-              <a:rPr lang="en-US" sz="1100" b="1" dirty="0" smtClean="0">
-                <a:solidFill>
-                  <a:srgbClr val="000000"/>
-                </a:solidFill>
-                <a:effectLst/>
-                <a:latin typeface="Arial"/>
-                <a:cs typeface="Arial"/>
-              </a:rPr>
-              <a:t>Kalisz</a:t>
-            </a:r>
-            <a:r>
-              <a:rPr lang="en-US" sz="1100" dirty="0" smtClean="0">
-                <a:solidFill>
-                  <a:srgbClr val="000000"/>
-                </a:solidFill>
-                <a:effectLst/>
-                <a:latin typeface="Arial"/>
-                <a:cs typeface="Arial"/>
-              </a:rPr>
-              <a:t>: Mentoring, coordination with other administrators</a:t>
-            </a:r>
-            <a:endParaRPr lang="en-US" sz="1100" dirty="0">
+              <a:t>Students</a:t>
+            </a:r>
+            <a:endParaRPr lang="en-US" sz="2400" dirty="0">
               <a:solidFill>
                 <a:srgbClr val="000000"/>
               </a:solidFill>
-              <a:effectLst/>
               <a:latin typeface="Arial"/>
               <a:cs typeface="Arial"/>
             </a:endParaRPr>
@@ -3611,16 +3987,16 @@
       </p:sp>
       <p:sp>
         <p:nvSpPr>
-          <p:cNvPr id="52" name="Process 51"/>
+          <p:cNvPr id="42" name="Alternate Process 41"/>
           <p:cNvSpPr/>
           <p:nvPr/>
         </p:nvSpPr>
         <p:spPr>
           <a:xfrm>
-            <a:off x="4868664" y="1410918"/>
-            <a:ext cx="1426259" cy="920727"/>
+            <a:off x="201943" y="1930705"/>
+            <a:ext cx="2474921" cy="869155"/>
           </a:xfrm>
-          <a:prstGeom prst="flowChartProcess">
+          <a:prstGeom prst="flowChartAlternateProcess">
             <a:avLst/>
           </a:prstGeom>
           <a:solidFill>
@@ -3651,72 +4027,18 @@
           <a:bodyPr rtlCol="0" anchor="ctr"/>
           <a:lstStyle/>
           <a:p>
-            <a:r>
-              <a:rPr lang="en-US" sz="1100" b="1" dirty="0" smtClean="0">
-                <a:solidFill>
-                  <a:srgbClr val="000000"/>
-                </a:solidFill>
-                <a:effectLst/>
-                <a:latin typeface="Arial"/>
-                <a:cs typeface="Arial"/>
-              </a:rPr>
-              <a:t>Project Coordinator</a:t>
-            </a:r>
-            <a:r>
-              <a:rPr lang="en-US" sz="1100" dirty="0" smtClean="0">
-                <a:solidFill>
-                  <a:srgbClr val="000000"/>
-                </a:solidFill>
-                <a:effectLst/>
-                <a:latin typeface="Arial"/>
-                <a:cs typeface="Arial"/>
-              </a:rPr>
-              <a:t>: Matching students to internships, tracking progress</a:t>
-            </a:r>
-            <a:endParaRPr lang="en-US" sz="1100" dirty="0">
-              <a:solidFill>
-                <a:srgbClr val="000000"/>
-              </a:solidFill>
-              <a:effectLst/>
-              <a:latin typeface="Arial"/>
-              <a:cs typeface="Arial"/>
-            </a:endParaRPr>
-          </a:p>
-        </p:txBody>
-      </p:sp>
-      <p:sp>
-        <p:nvSpPr>
-          <p:cNvPr id="53" name="Rectangle 52"/>
-          <p:cNvSpPr/>
-          <p:nvPr/>
-        </p:nvSpPr>
-        <p:spPr>
-          <a:xfrm>
-            <a:off x="4284908" y="22537"/>
-            <a:ext cx="2593771" cy="400110"/>
-          </a:xfrm>
-          <a:prstGeom prst="rect">
-            <a:avLst/>
-          </a:prstGeom>
-        </p:spPr>
-        <p:txBody>
-          <a:bodyPr wrap="square">
-            <a:spAutoFit/>
-          </a:bodyPr>
-          <a:lstStyle/>
-          <a:p>
             <a:pPr algn="ctr"/>
             <a:r>
-              <a:rPr lang="en-US" sz="2000" dirty="0" smtClean="0">
+              <a:rPr lang="en-US" sz="2400" dirty="0" smtClean="0">
                 <a:solidFill>
                   <a:srgbClr val="000000"/>
                 </a:solidFill>
                 <a:latin typeface="Arial"/>
                 <a:cs typeface="Arial"/>
               </a:rPr>
-              <a:t>Leadership team</a:t>
-            </a:r>
-            <a:endParaRPr lang="en-US" sz="2000" dirty="0">
+              <a:t>External Advisory Board</a:t>
+            </a:r>
+            <a:endParaRPr lang="en-US" sz="2400" dirty="0">
               <a:solidFill>
                 <a:srgbClr val="000000"/>
               </a:solidFill>
@@ -3726,460 +4048,18 @@
           </a:p>
         </p:txBody>
       </p:sp>
-      <p:grpSp>
-        <p:nvGrpSpPr>
-          <p:cNvPr id="68" name="Group 67"/>
-          <p:cNvGrpSpPr/>
-          <p:nvPr/>
-        </p:nvGrpSpPr>
-        <p:grpSpPr>
-          <a:xfrm>
-            <a:off x="223236" y="3273452"/>
-            <a:ext cx="3813807" cy="2484196"/>
-            <a:chOff x="1279588" y="5774643"/>
-            <a:chExt cx="3813807" cy="2484196"/>
-          </a:xfrm>
-        </p:grpSpPr>
-        <p:sp>
-          <p:nvSpPr>
-            <p:cNvPr id="54" name="Alternate Process 53"/>
-            <p:cNvSpPr/>
-            <p:nvPr/>
-          </p:nvSpPr>
-          <p:spPr>
-            <a:xfrm>
-              <a:off x="1279588" y="5774643"/>
-              <a:ext cx="3813807" cy="2484196"/>
-            </a:xfrm>
-            <a:prstGeom prst="flowChartAlternateProcess">
-              <a:avLst/>
-            </a:prstGeom>
-            <a:solidFill>
-              <a:schemeClr val="accent6">
-                <a:lumMod val="60000"/>
-                <a:lumOff val="40000"/>
-              </a:schemeClr>
-            </a:solidFill>
-            <a:ln>
-              <a:solidFill>
-                <a:schemeClr val="tx1"/>
-              </a:solidFill>
-            </a:ln>
-          </p:spPr>
-          <p:style>
-            <a:lnRef idx="1">
-              <a:schemeClr val="accent1"/>
-            </a:lnRef>
-            <a:fillRef idx="3">
-              <a:schemeClr val="accent1"/>
-            </a:fillRef>
-            <a:effectRef idx="2">
-              <a:schemeClr val="accent1"/>
-            </a:effectRef>
-            <a:fontRef idx="minor">
-              <a:schemeClr val="lt1"/>
-            </a:fontRef>
-          </p:style>
-          <p:txBody>
-            <a:bodyPr rtlCol="0" anchor="ctr"/>
-            <a:lstStyle/>
-            <a:p>
-              <a:pPr algn="ctr"/>
-              <a:endParaRPr lang="en-US" sz="1300" dirty="0"/>
-            </a:p>
-          </p:txBody>
-        </p:sp>
-        <p:sp>
-          <p:nvSpPr>
-            <p:cNvPr id="55" name="Rectangle 54"/>
-            <p:cNvSpPr/>
-            <p:nvPr/>
-          </p:nvSpPr>
-          <p:spPr>
-            <a:xfrm>
-              <a:off x="2562505" y="5801261"/>
-              <a:ext cx="1197063" cy="400110"/>
-            </a:xfrm>
-            <a:prstGeom prst="rect">
-              <a:avLst/>
-            </a:prstGeom>
-          </p:spPr>
-          <p:txBody>
-            <a:bodyPr wrap="none">
-              <a:spAutoFit/>
-            </a:bodyPr>
-            <a:lstStyle/>
-            <a:p>
-              <a:pPr algn="ctr"/>
-              <a:r>
-                <a:rPr lang="en-US" sz="2000" dirty="0" smtClean="0">
-                  <a:solidFill>
-                    <a:srgbClr val="000000"/>
-                  </a:solidFill>
-                  <a:latin typeface="Arial"/>
-                  <a:cs typeface="Arial"/>
-                </a:rPr>
-                <a:t>Students</a:t>
-              </a:r>
-              <a:endParaRPr lang="en-US" sz="2000" dirty="0">
-                <a:solidFill>
-                  <a:srgbClr val="000000"/>
-                </a:solidFill>
-                <a:latin typeface="Arial"/>
-                <a:cs typeface="Arial"/>
-              </a:endParaRPr>
-            </a:p>
-          </p:txBody>
-        </p:sp>
-        <p:sp>
-          <p:nvSpPr>
-            <p:cNvPr id="56" name="Process 55"/>
-            <p:cNvSpPr/>
-            <p:nvPr/>
-          </p:nvSpPr>
-          <p:spPr>
-            <a:xfrm>
-              <a:off x="1508703" y="6197881"/>
-              <a:ext cx="1646152" cy="771166"/>
-            </a:xfrm>
-            <a:prstGeom prst="flowChartProcess">
-              <a:avLst/>
-            </a:prstGeom>
-            <a:solidFill>
-              <a:schemeClr val="bg1"/>
-            </a:solidFill>
-            <a:ln>
-              <a:solidFill>
-                <a:schemeClr val="tx1"/>
-              </a:solidFill>
-            </a:ln>
-            <a:effectLst/>
-          </p:spPr>
-          <p:style>
-            <a:lnRef idx="1">
-              <a:schemeClr val="accent1"/>
-            </a:lnRef>
-            <a:fillRef idx="3">
-              <a:schemeClr val="accent1"/>
-            </a:fillRef>
-            <a:effectRef idx="2">
-              <a:schemeClr val="accent1"/>
-            </a:effectRef>
-            <a:fontRef idx="minor">
-              <a:schemeClr val="lt1"/>
-            </a:fontRef>
-          </p:style>
-          <p:txBody>
-            <a:bodyPr rtlCol="0" anchor="ctr"/>
-            <a:lstStyle/>
-            <a:p>
-              <a:r>
-                <a:rPr lang="en-US" sz="1100" b="1" dirty="0" smtClean="0">
-                  <a:solidFill>
-                    <a:srgbClr val="000000"/>
-                  </a:solidFill>
-                  <a:effectLst/>
-                  <a:latin typeface="Arial"/>
-                  <a:cs typeface="Arial"/>
-                </a:rPr>
-                <a:t>Funded students</a:t>
-              </a:r>
-              <a:r>
-                <a:rPr lang="en-US" sz="1100" dirty="0" smtClean="0">
-                  <a:solidFill>
-                    <a:srgbClr val="000000"/>
-                  </a:solidFill>
-                  <a:effectLst/>
-                  <a:latin typeface="Arial"/>
-                  <a:cs typeface="Arial"/>
-                </a:rPr>
-                <a:t>: Masters &amp; PhD, 2 </a:t>
-              </a:r>
-              <a:r>
-                <a:rPr lang="en-US" sz="1100" dirty="0" err="1" smtClean="0">
-                  <a:solidFill>
-                    <a:srgbClr val="000000"/>
-                  </a:solidFill>
-                  <a:effectLst/>
-                  <a:latin typeface="Arial"/>
-                  <a:cs typeface="Arial"/>
-                </a:rPr>
-                <a:t>yr</a:t>
-              </a:r>
-              <a:r>
-                <a:rPr lang="en-US" sz="1100" dirty="0" smtClean="0">
-                  <a:solidFill>
-                    <a:srgbClr val="000000"/>
-                  </a:solidFill>
-                  <a:effectLst/>
-                  <a:latin typeface="Arial"/>
-                  <a:cs typeface="Arial"/>
-                </a:rPr>
-                <a:t> funding, continuous mentoring.</a:t>
-              </a:r>
-              <a:endParaRPr lang="en-US" sz="1100" dirty="0">
-                <a:solidFill>
-                  <a:srgbClr val="000000"/>
-                </a:solidFill>
-                <a:effectLst/>
-                <a:latin typeface="Arial"/>
-                <a:cs typeface="Arial"/>
-              </a:endParaRPr>
-            </a:p>
-          </p:txBody>
-        </p:sp>
-        <p:sp>
-          <p:nvSpPr>
-            <p:cNvPr id="57" name="Process 56"/>
-            <p:cNvSpPr/>
-            <p:nvPr/>
-          </p:nvSpPr>
-          <p:spPr>
-            <a:xfrm>
-              <a:off x="1508703" y="7121448"/>
-              <a:ext cx="1646152" cy="771166"/>
-            </a:xfrm>
-            <a:prstGeom prst="flowChartProcess">
-              <a:avLst/>
-            </a:prstGeom>
-            <a:solidFill>
-              <a:schemeClr val="bg1"/>
-            </a:solidFill>
-            <a:ln>
-              <a:solidFill>
-                <a:schemeClr val="tx1"/>
-              </a:solidFill>
-            </a:ln>
-            <a:effectLst/>
-          </p:spPr>
-          <p:style>
-            <a:lnRef idx="1">
-              <a:schemeClr val="accent1"/>
-            </a:lnRef>
-            <a:fillRef idx="3">
-              <a:schemeClr val="accent1"/>
-            </a:fillRef>
-            <a:effectRef idx="2">
-              <a:schemeClr val="accent1"/>
-            </a:effectRef>
-            <a:fontRef idx="minor">
-              <a:schemeClr val="lt1"/>
-            </a:fontRef>
-          </p:style>
-          <p:txBody>
-            <a:bodyPr rtlCol="0" anchor="ctr"/>
-            <a:lstStyle/>
-            <a:p>
-              <a:r>
-                <a:rPr lang="en-US" sz="1100" b="1" dirty="0" smtClean="0">
-                  <a:solidFill>
-                    <a:srgbClr val="000000"/>
-                  </a:solidFill>
-                  <a:effectLst/>
-                  <a:latin typeface="Arial"/>
-                  <a:cs typeface="Arial"/>
-                </a:rPr>
-                <a:t>Affiliate students</a:t>
-              </a:r>
-              <a:r>
-                <a:rPr lang="en-US" sz="1100" dirty="0" smtClean="0">
-                  <a:solidFill>
-                    <a:srgbClr val="000000"/>
-                  </a:solidFill>
-                  <a:effectLst/>
-                  <a:latin typeface="Arial"/>
-                  <a:cs typeface="Arial"/>
-                </a:rPr>
-                <a:t>: Other degree seeking students participating in program activities</a:t>
-              </a:r>
-              <a:endParaRPr lang="en-US" sz="1100" dirty="0">
-                <a:solidFill>
-                  <a:srgbClr val="000000"/>
-                </a:solidFill>
-                <a:effectLst/>
-                <a:latin typeface="Arial"/>
-                <a:cs typeface="Arial"/>
-              </a:endParaRPr>
-            </a:p>
-          </p:txBody>
-        </p:sp>
-        <p:sp>
-          <p:nvSpPr>
-            <p:cNvPr id="58" name="Process 57"/>
-            <p:cNvSpPr/>
-            <p:nvPr/>
-          </p:nvSpPr>
-          <p:spPr>
-            <a:xfrm>
-              <a:off x="3271879" y="6211922"/>
-              <a:ext cx="1596787" cy="1680692"/>
-            </a:xfrm>
-            <a:prstGeom prst="flowChartProcess">
-              <a:avLst/>
-            </a:prstGeom>
-            <a:solidFill>
-              <a:schemeClr val="bg1"/>
-            </a:solidFill>
-            <a:ln>
-              <a:solidFill>
-                <a:schemeClr val="tx1"/>
-              </a:solidFill>
-            </a:ln>
-            <a:effectLst/>
-          </p:spPr>
-          <p:style>
-            <a:lnRef idx="1">
-              <a:schemeClr val="accent1"/>
-            </a:lnRef>
-            <a:fillRef idx="3">
-              <a:schemeClr val="accent1"/>
-            </a:fillRef>
-            <a:effectRef idx="2">
-              <a:schemeClr val="accent1"/>
-            </a:effectRef>
-            <a:fontRef idx="minor">
-              <a:schemeClr val="lt1"/>
-            </a:fontRef>
-          </p:style>
-          <p:txBody>
-            <a:bodyPr rtlCol="0" anchor="ctr"/>
-            <a:lstStyle/>
-            <a:p>
-              <a:r>
-                <a:rPr lang="en-US" sz="1100" b="1" dirty="0" smtClean="0">
-                  <a:solidFill>
-                    <a:srgbClr val="000000"/>
-                  </a:solidFill>
-                  <a:latin typeface="Arial"/>
-                  <a:cs typeface="Arial"/>
-                </a:rPr>
-                <a:t>External participants</a:t>
-              </a:r>
-              <a:r>
-                <a:rPr lang="en-US" sz="1100" dirty="0" smtClean="0">
-                  <a:solidFill>
-                    <a:srgbClr val="000000"/>
-                  </a:solidFill>
-                  <a:effectLst/>
-                  <a:latin typeface="Arial"/>
-                  <a:cs typeface="Arial"/>
-                </a:rPr>
-                <a:t>: Other participants in activities, either remotely or through field courses or workshops. </a:t>
-              </a:r>
-              <a:endParaRPr lang="en-US" sz="1100" dirty="0">
-                <a:solidFill>
-                  <a:srgbClr val="000000"/>
-                </a:solidFill>
-                <a:effectLst/>
-                <a:latin typeface="Arial"/>
-                <a:cs typeface="Arial"/>
-              </a:endParaRPr>
-            </a:p>
-          </p:txBody>
-        </p:sp>
-      </p:grpSp>
-      <p:sp>
-        <p:nvSpPr>
-          <p:cNvPr id="59" name="Alternate Process 58"/>
+      <p:sp>
+        <p:nvSpPr>
+          <p:cNvPr id="70" name="Alternate Process 69"/>
           <p:cNvSpPr/>
           <p:nvPr/>
         </p:nvSpPr>
         <p:spPr>
           <a:xfrm>
-            <a:off x="71820" y="22537"/>
-            <a:ext cx="2667000" cy="2484196"/>
+            <a:off x="201943" y="3485503"/>
+            <a:ext cx="2474922" cy="869155"/>
           </a:xfrm>
           <a:prstGeom prst="flowChartAlternateProcess">
-            <a:avLst/>
-          </a:prstGeom>
-          <a:solidFill>
-            <a:schemeClr val="bg1">
-              <a:lumMod val="85000"/>
-            </a:schemeClr>
-          </a:solidFill>
-          <a:ln>
-            <a:solidFill>
-              <a:schemeClr val="tx1"/>
-            </a:solidFill>
-          </a:ln>
-        </p:spPr>
-        <p:style>
-          <a:lnRef idx="1">
-            <a:schemeClr val="accent1"/>
-          </a:lnRef>
-          <a:fillRef idx="3">
-            <a:schemeClr val="accent1"/>
-          </a:fillRef>
-          <a:effectRef idx="2">
-            <a:schemeClr val="accent1"/>
-          </a:effectRef>
-          <a:fontRef idx="minor">
-            <a:schemeClr val="lt1"/>
-          </a:fontRef>
-        </p:style>
-        <p:txBody>
-          <a:bodyPr rtlCol="0" anchor="ctr"/>
-          <a:lstStyle/>
-          <a:p>
-            <a:pPr algn="ctr"/>
-            <a:endParaRPr lang="en-US" sz="1300" dirty="0"/>
-          </a:p>
-        </p:txBody>
-      </p:sp>
-      <p:sp>
-        <p:nvSpPr>
-          <p:cNvPr id="60" name="Rectangle 59"/>
-          <p:cNvSpPr/>
-          <p:nvPr/>
-        </p:nvSpPr>
-        <p:spPr>
-          <a:xfrm>
-            <a:off x="764420" y="0"/>
-            <a:ext cx="1111152" cy="400110"/>
-          </a:xfrm>
-          <a:prstGeom prst="rect">
-            <a:avLst/>
-          </a:prstGeom>
-        </p:spPr>
-        <p:txBody>
-          <a:bodyPr wrap="none">
-            <a:spAutoFit/>
-          </a:bodyPr>
-          <a:lstStyle/>
-          <a:p>
-            <a:pPr algn="ctr"/>
-            <a:r>
-              <a:rPr lang="en-US" sz="2000" dirty="0" smtClean="0">
-                <a:solidFill>
-                  <a:srgbClr val="000000"/>
-                </a:solidFill>
-                <a:latin typeface="Arial"/>
-                <a:cs typeface="Arial"/>
-              </a:rPr>
-              <a:t>Mentors</a:t>
-            </a:r>
-            <a:endParaRPr lang="en-US" sz="2000" dirty="0">
-              <a:solidFill>
-                <a:srgbClr val="000000"/>
-              </a:solidFill>
-              <a:latin typeface="Arial"/>
-              <a:cs typeface="Arial"/>
-            </a:endParaRPr>
-          </a:p>
-        </p:txBody>
-      </p:sp>
-      <p:sp>
-        <p:nvSpPr>
-          <p:cNvPr id="61" name="Process 60"/>
-          <p:cNvSpPr/>
-          <p:nvPr/>
-        </p:nvSpPr>
-        <p:spPr>
-          <a:xfrm>
-            <a:off x="223236" y="366459"/>
-            <a:ext cx="2372993" cy="700341"/>
-          </a:xfrm>
-          <a:prstGeom prst="flowChartProcess">
             <a:avLst/>
           </a:prstGeom>
           <a:solidFill>
@@ -4210,194 +4090,18 @@
           <a:bodyPr rtlCol="0" anchor="ctr"/>
           <a:lstStyle/>
           <a:p>
-            <a:r>
-              <a:rPr lang="en-US" sz="1100" b="1" dirty="0" smtClean="0">
-                <a:solidFill>
-                  <a:srgbClr val="000000"/>
-                </a:solidFill>
-                <a:effectLst/>
-                <a:latin typeface="Arial"/>
-                <a:cs typeface="Arial"/>
-              </a:rPr>
-              <a:t>Internship mentors</a:t>
-            </a:r>
-            <a:r>
-              <a:rPr lang="en-US" sz="1100" dirty="0" smtClean="0">
-                <a:solidFill>
-                  <a:srgbClr val="000000"/>
-                </a:solidFill>
-                <a:effectLst/>
-                <a:latin typeface="Arial"/>
-                <a:cs typeface="Arial"/>
-              </a:rPr>
-              <a:t>: Mentors at NGOs, government organizations, and companies</a:t>
-            </a:r>
-            <a:endParaRPr lang="en-US" sz="1100" dirty="0">
-              <a:solidFill>
-                <a:srgbClr val="000000"/>
-              </a:solidFill>
-              <a:effectLst/>
-              <a:latin typeface="Arial"/>
-              <a:cs typeface="Arial"/>
-            </a:endParaRPr>
-          </a:p>
-        </p:txBody>
-      </p:sp>
-      <p:sp>
-        <p:nvSpPr>
-          <p:cNvPr id="62" name="Process 61"/>
-          <p:cNvSpPr/>
-          <p:nvPr/>
-        </p:nvSpPr>
-        <p:spPr>
-          <a:xfrm>
-            <a:off x="223236" y="1219200"/>
-            <a:ext cx="2372993" cy="1091694"/>
-          </a:xfrm>
-          <a:prstGeom prst="flowChartProcess">
-            <a:avLst/>
-          </a:prstGeom>
-          <a:solidFill>
-            <a:schemeClr val="bg1"/>
-          </a:solidFill>
-          <a:ln>
-            <a:solidFill>
-              <a:schemeClr val="tx1"/>
-            </a:solidFill>
-          </a:ln>
-          <a:effectLst/>
-        </p:spPr>
-        <p:style>
-          <a:lnRef idx="1">
-            <a:schemeClr val="accent1"/>
-          </a:lnRef>
-          <a:fillRef idx="3">
-            <a:schemeClr val="accent1"/>
-          </a:fillRef>
-          <a:effectRef idx="2">
-            <a:schemeClr val="accent1"/>
-          </a:effectRef>
-          <a:fontRef idx="minor">
-            <a:schemeClr val="lt1"/>
-          </a:fontRef>
-        </p:style>
-        <p:txBody>
-          <a:bodyPr rtlCol="0" anchor="ctr"/>
-          <a:lstStyle/>
-          <a:p>
-            <a:r>
-              <a:rPr lang="en-US" sz="1100" b="1" dirty="0" smtClean="0">
-                <a:solidFill>
-                  <a:srgbClr val="000000"/>
-                </a:solidFill>
-                <a:effectLst/>
-                <a:latin typeface="Arial"/>
-                <a:cs typeface="Arial"/>
-              </a:rPr>
-              <a:t>Affiliate faculty</a:t>
-            </a:r>
-            <a:r>
-              <a:rPr lang="en-US" sz="1100" dirty="0" smtClean="0">
+            <a:pPr algn="ctr"/>
+            <a:r>
+              <a:rPr lang="en-US" sz="2400" dirty="0" smtClean="0">
                 <a:solidFill>
                   <a:srgbClr val="000000"/>
                 </a:solidFill>
                 <a:latin typeface="Arial"/>
                 <a:cs typeface="Arial"/>
               </a:rPr>
-              <a:t>: Other faculty seeking to accept students into this program. They will be required to go through cross-mentoring training before being considered for students.</a:t>
-            </a:r>
-            <a:endParaRPr lang="en-US" sz="1100" dirty="0">
-              <a:solidFill>
-                <a:srgbClr val="000000"/>
-              </a:solidFill>
-              <a:effectLst/>
-              <a:latin typeface="Arial"/>
-              <a:cs typeface="Arial"/>
-            </a:endParaRPr>
-          </a:p>
-        </p:txBody>
-      </p:sp>
-      <p:sp>
-        <p:nvSpPr>
-          <p:cNvPr id="64" name="Alternate Process 63"/>
-          <p:cNvSpPr/>
-          <p:nvPr/>
-        </p:nvSpPr>
-        <p:spPr>
-          <a:xfrm>
-            <a:off x="8330550" y="28886"/>
-            <a:ext cx="2346321" cy="2484196"/>
-          </a:xfrm>
-          <a:prstGeom prst="flowChartAlternateProcess">
-            <a:avLst/>
-          </a:prstGeom>
-          <a:solidFill>
-            <a:schemeClr val="bg1">
-              <a:lumMod val="85000"/>
-            </a:schemeClr>
-          </a:solidFill>
-          <a:ln>
-            <a:solidFill>
-              <a:schemeClr val="tx1"/>
-            </a:solidFill>
-          </a:ln>
-        </p:spPr>
-        <p:style>
-          <a:lnRef idx="1">
-            <a:schemeClr val="accent1"/>
-          </a:lnRef>
-          <a:fillRef idx="3">
-            <a:schemeClr val="accent1"/>
-          </a:fillRef>
-          <a:effectRef idx="2">
-            <a:schemeClr val="accent1"/>
-          </a:effectRef>
-          <a:fontRef idx="minor">
-            <a:schemeClr val="lt1"/>
-          </a:fontRef>
-        </p:style>
-        <p:txBody>
-          <a:bodyPr rtlCol="0" anchor="ctr"/>
-          <a:lstStyle/>
-          <a:p>
-            <a:pPr algn="ctr"/>
-            <a:endParaRPr lang="en-US" sz="1300" dirty="0"/>
-          </a:p>
-        </p:txBody>
-      </p:sp>
-      <p:sp>
-        <p:nvSpPr>
-          <p:cNvPr id="65" name="Rectangle 64"/>
-          <p:cNvSpPr/>
-          <p:nvPr/>
-        </p:nvSpPr>
-        <p:spPr>
-          <a:xfrm>
-            <a:off x="8795482" y="6349"/>
-            <a:ext cx="1313973" cy="400110"/>
-          </a:xfrm>
-          <a:prstGeom prst="rect">
-            <a:avLst/>
-          </a:prstGeom>
-        </p:spPr>
-        <p:txBody>
-          <a:bodyPr wrap="square">
-            <a:spAutoFit/>
-          </a:bodyPr>
-          <a:lstStyle/>
-          <a:p>
-            <a:pPr algn="ctr"/>
-            <a:r>
-              <a:rPr lang="en-US" sz="2000" dirty="0" smtClean="0">
-                <a:solidFill>
-                  <a:srgbClr val="000000"/>
-                </a:solidFill>
-                <a:latin typeface="Arial"/>
-                <a:cs typeface="Arial"/>
-              </a:rPr>
-              <a:t>External</a:t>
-            </a:r>
-            <a:endParaRPr lang="en-US" sz="2000" dirty="0">
+              <a:t>Multidisciplinary Advisory Teams</a:t>
+            </a:r>
+            <a:endParaRPr lang="en-US" sz="2400" dirty="0">
               <a:solidFill>
                 <a:srgbClr val="000000"/>
               </a:solidFill>
@@ -4407,913 +4111,6 @@
           </a:p>
         </p:txBody>
       </p:sp>
-      <p:sp>
-        <p:nvSpPr>
-          <p:cNvPr id="66" name="Process 65"/>
-          <p:cNvSpPr/>
-          <p:nvPr/>
-        </p:nvSpPr>
-        <p:spPr>
-          <a:xfrm>
-            <a:off x="8449918" y="372808"/>
-            <a:ext cx="2085848" cy="733460"/>
-          </a:xfrm>
-          <a:prstGeom prst="flowChartProcess">
-            <a:avLst/>
-          </a:prstGeom>
-          <a:solidFill>
-            <a:schemeClr val="bg1"/>
-          </a:solidFill>
-          <a:ln>
-            <a:solidFill>
-              <a:schemeClr val="tx1"/>
-            </a:solidFill>
-          </a:ln>
-          <a:effectLst/>
-        </p:spPr>
-        <p:style>
-          <a:lnRef idx="1">
-            <a:schemeClr val="accent1"/>
-          </a:lnRef>
-          <a:fillRef idx="3">
-            <a:schemeClr val="accent1"/>
-          </a:fillRef>
-          <a:effectRef idx="2">
-            <a:schemeClr val="accent1"/>
-          </a:effectRef>
-          <a:fontRef idx="minor">
-            <a:schemeClr val="lt1"/>
-          </a:fontRef>
-        </p:style>
-        <p:txBody>
-          <a:bodyPr rtlCol="0" anchor="ctr"/>
-          <a:lstStyle/>
-          <a:p>
-            <a:r>
-              <a:rPr lang="en-US" sz="1100" b="1" dirty="0" smtClean="0">
-                <a:solidFill>
-                  <a:srgbClr val="000000"/>
-                </a:solidFill>
-                <a:effectLst/>
-                <a:latin typeface="Arial"/>
-                <a:cs typeface="Arial"/>
-              </a:rPr>
-              <a:t>Advisory board</a:t>
-            </a:r>
-            <a:r>
-              <a:rPr lang="en-US" sz="1100" b="1" dirty="0">
-                <a:solidFill>
-                  <a:srgbClr val="000000"/>
-                </a:solidFill>
-                <a:latin typeface="Arial"/>
-                <a:cs typeface="Arial"/>
-              </a:rPr>
-              <a:t>: </a:t>
-            </a:r>
-            <a:r>
-              <a:rPr lang="en-US" sz="1100" dirty="0">
-                <a:solidFill>
-                  <a:srgbClr val="000000"/>
-                </a:solidFill>
-                <a:latin typeface="Arial"/>
-                <a:cs typeface="Arial"/>
-              </a:rPr>
-              <a:t>provide significant guidance and an outside perspective on the progress of the training. </a:t>
-            </a:r>
-            <a:endParaRPr lang="en-US" sz="1100" dirty="0">
-              <a:solidFill>
-                <a:srgbClr val="000000"/>
-              </a:solidFill>
-              <a:effectLst/>
-              <a:latin typeface="Arial"/>
-              <a:cs typeface="Arial"/>
-            </a:endParaRPr>
-          </a:p>
-        </p:txBody>
-      </p:sp>
-      <p:sp>
-        <p:nvSpPr>
-          <p:cNvPr id="67" name="Process 66"/>
-          <p:cNvSpPr/>
-          <p:nvPr/>
-        </p:nvSpPr>
-        <p:spPr>
-          <a:xfrm>
-            <a:off x="8449918" y="1259716"/>
-            <a:ext cx="2085848" cy="1019822"/>
-          </a:xfrm>
-          <a:prstGeom prst="flowChartProcess">
-            <a:avLst/>
-          </a:prstGeom>
-          <a:solidFill>
-            <a:schemeClr val="bg1"/>
-          </a:solidFill>
-          <a:ln>
-            <a:solidFill>
-              <a:schemeClr val="tx1"/>
-            </a:solidFill>
-          </a:ln>
-          <a:effectLst/>
-        </p:spPr>
-        <p:style>
-          <a:lnRef idx="1">
-            <a:schemeClr val="accent1"/>
-          </a:lnRef>
-          <a:fillRef idx="3">
-            <a:schemeClr val="accent1"/>
-          </a:fillRef>
-          <a:effectRef idx="2">
-            <a:schemeClr val="accent1"/>
-          </a:effectRef>
-          <a:fontRef idx="minor">
-            <a:schemeClr val="lt1"/>
-          </a:fontRef>
-        </p:style>
-        <p:txBody>
-          <a:bodyPr rtlCol="0" anchor="ctr"/>
-          <a:lstStyle/>
-          <a:p>
-            <a:r>
-              <a:rPr lang="en-US" sz="1100" b="1" dirty="0" smtClean="0">
-                <a:solidFill>
-                  <a:srgbClr val="000000"/>
-                </a:solidFill>
-                <a:effectLst/>
-                <a:latin typeface="Arial"/>
-                <a:cs typeface="Arial"/>
-              </a:rPr>
-              <a:t>Administration</a:t>
-            </a:r>
-            <a:r>
-              <a:rPr lang="en-US" sz="1100" dirty="0" smtClean="0">
-                <a:solidFill>
-                  <a:srgbClr val="000000"/>
-                </a:solidFill>
-                <a:latin typeface="Arial"/>
-                <a:cs typeface="Arial"/>
-              </a:rPr>
-              <a:t>: Administrators at UTK and UTIA who will engage with leadership team annually to review needs.</a:t>
-            </a:r>
-            <a:endParaRPr lang="en-US" sz="1100" dirty="0">
-              <a:solidFill>
-                <a:srgbClr val="000000"/>
-              </a:solidFill>
-              <a:effectLst/>
-              <a:latin typeface="Arial"/>
-              <a:cs typeface="Arial"/>
-            </a:endParaRPr>
-          </a:p>
-        </p:txBody>
-      </p:sp>
-      <p:cxnSp>
-        <p:nvCxnSpPr>
-          <p:cNvPr id="75" name="Curved Connector 74"/>
-          <p:cNvCxnSpPr>
-            <a:stCxn id="59" idx="2"/>
-            <a:endCxn id="55" idx="0"/>
-          </p:cNvCxnSpPr>
-          <p:nvPr/>
-        </p:nvCxnSpPr>
-        <p:spPr>
-          <a:xfrm rot="16200000" flipH="1">
-            <a:off x="1358334" y="2553718"/>
-            <a:ext cx="793337" cy="699365"/>
-          </a:xfrm>
-          <a:prstGeom prst="curvedConnector3">
-            <a:avLst>
-              <a:gd name="adj1" fmla="val 50000"/>
-            </a:avLst>
-          </a:prstGeom>
-          <a:ln>
-            <a:solidFill>
-              <a:srgbClr val="000000"/>
-            </a:solidFill>
-          </a:ln>
-          <a:effectLst>
-            <a:outerShdw blurRad="50800" dist="38100" dir="2700000" algn="tl" rotWithShape="0">
-              <a:prstClr val="black">
-                <a:alpha val="40000"/>
-              </a:prstClr>
-            </a:outerShdw>
-          </a:effectLst>
-        </p:spPr>
-        <p:style>
-          <a:lnRef idx="2">
-            <a:schemeClr val="accent1"/>
-          </a:lnRef>
-          <a:fillRef idx="0">
-            <a:schemeClr val="accent1"/>
-          </a:fillRef>
-          <a:effectRef idx="1">
-            <a:schemeClr val="accent1"/>
-          </a:effectRef>
-          <a:fontRef idx="minor">
-            <a:schemeClr val="tx1"/>
-          </a:fontRef>
-        </p:style>
-      </p:cxnSp>
-      <p:sp>
-        <p:nvSpPr>
-          <p:cNvPr id="79" name="Alternate Process 78"/>
-          <p:cNvSpPr/>
-          <p:nvPr/>
-        </p:nvSpPr>
-        <p:spPr>
-          <a:xfrm>
-            <a:off x="6710283" y="3269371"/>
-            <a:ext cx="2357518" cy="1543845"/>
-          </a:xfrm>
-          <a:prstGeom prst="flowChartAlternateProcess">
-            <a:avLst/>
-          </a:prstGeom>
-          <a:solidFill>
-            <a:schemeClr val="bg1">
-              <a:lumMod val="85000"/>
-            </a:schemeClr>
-          </a:solidFill>
-          <a:ln>
-            <a:solidFill>
-              <a:schemeClr val="tx1"/>
-            </a:solidFill>
-          </a:ln>
-        </p:spPr>
-        <p:style>
-          <a:lnRef idx="1">
-            <a:schemeClr val="accent1"/>
-          </a:lnRef>
-          <a:fillRef idx="3">
-            <a:schemeClr val="accent1"/>
-          </a:fillRef>
-          <a:effectRef idx="2">
-            <a:schemeClr val="accent1"/>
-          </a:effectRef>
-          <a:fontRef idx="minor">
-            <a:schemeClr val="lt1"/>
-          </a:fontRef>
-        </p:style>
-        <p:txBody>
-          <a:bodyPr rtlCol="0" anchor="ctr"/>
-          <a:lstStyle/>
-          <a:p>
-            <a:pPr algn="ctr"/>
-            <a:endParaRPr lang="en-US" sz="1300" dirty="0"/>
-          </a:p>
-        </p:txBody>
-      </p:sp>
-      <p:sp>
-        <p:nvSpPr>
-          <p:cNvPr id="80" name="Rectangle 79"/>
-          <p:cNvSpPr/>
-          <p:nvPr/>
-        </p:nvSpPr>
-        <p:spPr>
-          <a:xfrm>
-            <a:off x="6823474" y="3246834"/>
-            <a:ext cx="2085848" cy="400110"/>
-          </a:xfrm>
-          <a:prstGeom prst="rect">
-            <a:avLst/>
-          </a:prstGeom>
-        </p:spPr>
-        <p:txBody>
-          <a:bodyPr wrap="square">
-            <a:spAutoFit/>
-          </a:bodyPr>
-          <a:lstStyle/>
-          <a:p>
-            <a:pPr algn="ctr"/>
-            <a:r>
-              <a:rPr lang="en-US" sz="2000" dirty="0" smtClean="0">
-                <a:solidFill>
-                  <a:srgbClr val="000000"/>
-                </a:solidFill>
-                <a:latin typeface="Arial"/>
-                <a:cs typeface="Arial"/>
-              </a:rPr>
-              <a:t>Assessment</a:t>
-            </a:r>
-            <a:endParaRPr lang="en-US" sz="2000" dirty="0">
-              <a:solidFill>
-                <a:srgbClr val="000000"/>
-              </a:solidFill>
-              <a:latin typeface="Arial"/>
-              <a:cs typeface="Arial"/>
-            </a:endParaRPr>
-          </a:p>
-        </p:txBody>
-      </p:sp>
-      <p:sp>
-        <p:nvSpPr>
-          <p:cNvPr id="81" name="Process 80"/>
-          <p:cNvSpPr/>
-          <p:nvPr/>
-        </p:nvSpPr>
-        <p:spPr>
-          <a:xfrm>
-            <a:off x="6823474" y="3613293"/>
-            <a:ext cx="2085848" cy="1050578"/>
-          </a:xfrm>
-          <a:prstGeom prst="flowChartProcess">
-            <a:avLst/>
-          </a:prstGeom>
-          <a:solidFill>
-            <a:schemeClr val="bg1"/>
-          </a:solidFill>
-          <a:ln>
-            <a:solidFill>
-              <a:schemeClr val="tx1"/>
-            </a:solidFill>
-          </a:ln>
-          <a:effectLst/>
-        </p:spPr>
-        <p:style>
-          <a:lnRef idx="1">
-            <a:schemeClr val="accent1"/>
-          </a:lnRef>
-          <a:fillRef idx="3">
-            <a:schemeClr val="accent1"/>
-          </a:fillRef>
-          <a:effectRef idx="2">
-            <a:schemeClr val="accent1"/>
-          </a:effectRef>
-          <a:fontRef idx="minor">
-            <a:schemeClr val="lt1"/>
-          </a:fontRef>
-        </p:style>
-        <p:txBody>
-          <a:bodyPr rtlCol="0" anchor="ctr"/>
-          <a:lstStyle/>
-          <a:p>
-            <a:r>
-              <a:rPr lang="en-US" sz="1100" b="1" dirty="0" smtClean="0">
-                <a:solidFill>
-                  <a:srgbClr val="000000"/>
-                </a:solidFill>
-                <a:effectLst/>
-                <a:latin typeface="Arial"/>
-                <a:cs typeface="Arial"/>
-              </a:rPr>
-              <a:t>East Main Consulting: </a:t>
-            </a:r>
-            <a:r>
-              <a:rPr lang="en-US" sz="1100" dirty="0" smtClean="0">
-                <a:solidFill>
-                  <a:srgbClr val="000000"/>
-                </a:solidFill>
-                <a:effectLst/>
-                <a:latin typeface="Arial"/>
-                <a:cs typeface="Arial"/>
-              </a:rPr>
-              <a:t>Assessment of delivery on project goals. Reports back to leadership team and peer-reviewed publications.</a:t>
-            </a:r>
-            <a:r>
-              <a:rPr lang="en-US" sz="1100" b="1" dirty="0" smtClean="0">
-                <a:solidFill>
-                  <a:srgbClr val="000000"/>
-                </a:solidFill>
-                <a:effectLst/>
-                <a:latin typeface="Arial"/>
-                <a:cs typeface="Arial"/>
-              </a:rPr>
-              <a:t> </a:t>
-            </a:r>
-            <a:endParaRPr lang="en-US" sz="1100" dirty="0">
-              <a:solidFill>
-                <a:srgbClr val="000000"/>
-              </a:solidFill>
-              <a:effectLst/>
-              <a:latin typeface="Arial"/>
-              <a:cs typeface="Arial"/>
-            </a:endParaRPr>
-          </a:p>
-        </p:txBody>
-      </p:sp>
-      <p:cxnSp>
-        <p:nvCxnSpPr>
-          <p:cNvPr id="86" name="Curved Connector 85"/>
-          <p:cNvCxnSpPr>
-            <a:stCxn id="48" idx="1"/>
-            <a:endCxn id="61" idx="3"/>
-          </p:cNvCxnSpPr>
-          <p:nvPr/>
-        </p:nvCxnSpPr>
-        <p:spPr>
-          <a:xfrm rot="10800000">
-            <a:off x="2596229" y="716630"/>
-            <a:ext cx="675648" cy="35412"/>
-          </a:xfrm>
-          <a:prstGeom prst="curvedConnector3">
-            <a:avLst>
-              <a:gd name="adj1" fmla="val 50000"/>
-            </a:avLst>
-          </a:prstGeom>
-          <a:ln>
-            <a:solidFill>
-              <a:srgbClr val="000000"/>
-            </a:solidFill>
-          </a:ln>
-          <a:effectLst>
-            <a:outerShdw blurRad="50800" dist="38100" dir="2700000" algn="tl" rotWithShape="0">
-              <a:prstClr val="black">
-                <a:alpha val="40000"/>
-              </a:prstClr>
-            </a:outerShdw>
-          </a:effectLst>
-        </p:spPr>
-        <p:style>
-          <a:lnRef idx="2">
-            <a:schemeClr val="accent1"/>
-          </a:lnRef>
-          <a:fillRef idx="0">
-            <a:schemeClr val="accent1"/>
-          </a:fillRef>
-          <a:effectRef idx="1">
-            <a:schemeClr val="accent1"/>
-          </a:effectRef>
-          <a:fontRef idx="minor">
-            <a:schemeClr val="tx1"/>
-          </a:fontRef>
-        </p:style>
-      </p:cxnSp>
-      <p:cxnSp>
-        <p:nvCxnSpPr>
-          <p:cNvPr id="89" name="Curved Connector 88"/>
-          <p:cNvCxnSpPr>
-            <a:stCxn id="45" idx="1"/>
-            <a:endCxn id="59" idx="3"/>
-          </p:cNvCxnSpPr>
-          <p:nvPr/>
-        </p:nvCxnSpPr>
-        <p:spPr>
-          <a:xfrm rot="10800000">
-            <a:off x="2738821" y="1264635"/>
-            <a:ext cx="447391" cy="12700"/>
-          </a:xfrm>
-          <a:prstGeom prst="curvedConnector3">
-            <a:avLst>
-              <a:gd name="adj1" fmla="val 50000"/>
-            </a:avLst>
-          </a:prstGeom>
-          <a:ln>
-            <a:solidFill>
-              <a:srgbClr val="000000"/>
-            </a:solidFill>
-          </a:ln>
-          <a:effectLst>
-            <a:outerShdw blurRad="50800" dist="38100" dir="2700000" algn="tl" rotWithShape="0">
-              <a:prstClr val="black">
-                <a:alpha val="40000"/>
-              </a:prstClr>
-            </a:outerShdw>
-          </a:effectLst>
-        </p:spPr>
-        <p:style>
-          <a:lnRef idx="2">
-            <a:schemeClr val="accent1"/>
-          </a:lnRef>
-          <a:fillRef idx="0">
-            <a:schemeClr val="accent1"/>
-          </a:fillRef>
-          <a:effectRef idx="1">
-            <a:schemeClr val="accent1"/>
-          </a:effectRef>
-          <a:fontRef idx="minor">
-            <a:schemeClr val="tx1"/>
-          </a:fontRef>
-        </p:style>
-      </p:cxnSp>
-      <p:cxnSp>
-        <p:nvCxnSpPr>
-          <p:cNvPr id="92" name="Curved Connector 91"/>
-          <p:cNvCxnSpPr>
-            <a:stCxn id="54" idx="3"/>
-            <a:endCxn id="79" idx="1"/>
-          </p:cNvCxnSpPr>
-          <p:nvPr/>
-        </p:nvCxnSpPr>
-        <p:spPr>
-          <a:xfrm flipV="1">
-            <a:off x="4037043" y="4041294"/>
-            <a:ext cx="2673240" cy="474256"/>
-          </a:xfrm>
-          <a:prstGeom prst="curvedConnector3">
-            <a:avLst>
-              <a:gd name="adj1" fmla="val 50000"/>
-            </a:avLst>
-          </a:prstGeom>
-          <a:ln>
-            <a:solidFill>
-              <a:srgbClr val="000000"/>
-            </a:solidFill>
-          </a:ln>
-          <a:effectLst>
-            <a:outerShdw blurRad="50800" dist="38100" dir="2700000" algn="tl" rotWithShape="0">
-              <a:prstClr val="black">
-                <a:alpha val="40000"/>
-              </a:prstClr>
-            </a:outerShdw>
-          </a:effectLst>
-        </p:spPr>
-        <p:style>
-          <a:lnRef idx="2">
-            <a:schemeClr val="accent1"/>
-          </a:lnRef>
-          <a:fillRef idx="0">
-            <a:schemeClr val="accent1"/>
-          </a:fillRef>
-          <a:effectRef idx="1">
-            <a:schemeClr val="accent1"/>
-          </a:effectRef>
-          <a:fontRef idx="minor">
-            <a:schemeClr val="tx1"/>
-          </a:fontRef>
-        </p:style>
-      </p:cxnSp>
-      <p:cxnSp>
-        <p:nvCxnSpPr>
-          <p:cNvPr id="95" name="Curved Connector 94"/>
-          <p:cNvCxnSpPr>
-            <a:stCxn id="79" idx="0"/>
-            <a:endCxn id="45" idx="3"/>
-          </p:cNvCxnSpPr>
-          <p:nvPr/>
-        </p:nvCxnSpPr>
-        <p:spPr>
-          <a:xfrm rot="5400000" flipH="1" flipV="1">
-            <a:off x="6920231" y="2233446"/>
-            <a:ext cx="2004736" cy="67114"/>
-          </a:xfrm>
-          <a:prstGeom prst="curvedConnector4">
-            <a:avLst>
-              <a:gd name="adj1" fmla="val 19021"/>
-              <a:gd name="adj2" fmla="val 440614"/>
-            </a:avLst>
-          </a:prstGeom>
-          <a:ln>
-            <a:solidFill>
-              <a:srgbClr val="000000"/>
-            </a:solidFill>
-          </a:ln>
-          <a:effectLst>
-            <a:outerShdw blurRad="50800" dist="38100" dir="2700000" algn="tl" rotWithShape="0">
-              <a:prstClr val="black">
-                <a:alpha val="40000"/>
-              </a:prstClr>
-            </a:outerShdw>
-          </a:effectLst>
-        </p:spPr>
-        <p:style>
-          <a:lnRef idx="2">
-            <a:schemeClr val="accent1"/>
-          </a:lnRef>
-          <a:fillRef idx="0">
-            <a:schemeClr val="accent1"/>
-          </a:fillRef>
-          <a:effectRef idx="1">
-            <a:schemeClr val="accent1"/>
-          </a:effectRef>
-          <a:fontRef idx="minor">
-            <a:schemeClr val="tx1"/>
-          </a:fontRef>
-        </p:style>
-      </p:cxnSp>
-      <p:cxnSp>
-        <p:nvCxnSpPr>
-          <p:cNvPr id="98" name="Curved Connector 97"/>
-          <p:cNvCxnSpPr>
-            <a:stCxn id="45" idx="2"/>
-            <a:endCxn id="54" idx="0"/>
-          </p:cNvCxnSpPr>
-          <p:nvPr/>
-        </p:nvCxnSpPr>
-        <p:spPr>
-          <a:xfrm rot="5400000">
-            <a:off x="3467303" y="1169570"/>
-            <a:ext cx="766719" cy="3441044"/>
-          </a:xfrm>
-          <a:prstGeom prst="curvedConnector3">
-            <a:avLst>
-              <a:gd name="adj1" fmla="val 50000"/>
-            </a:avLst>
-          </a:prstGeom>
-          <a:ln>
-            <a:solidFill>
-              <a:srgbClr val="000000"/>
-            </a:solidFill>
-          </a:ln>
-          <a:effectLst>
-            <a:outerShdw blurRad="50800" dist="38100" dir="2700000" algn="tl" rotWithShape="0">
-              <a:prstClr val="black">
-                <a:alpha val="40000"/>
-              </a:prstClr>
-            </a:outerShdw>
-          </a:effectLst>
-        </p:spPr>
-        <p:style>
-          <a:lnRef idx="2">
-            <a:schemeClr val="accent1"/>
-          </a:lnRef>
-          <a:fillRef idx="0">
-            <a:schemeClr val="accent1"/>
-          </a:fillRef>
-          <a:effectRef idx="1">
-            <a:schemeClr val="accent1"/>
-          </a:effectRef>
-          <a:fontRef idx="minor">
-            <a:schemeClr val="tx1"/>
-          </a:fontRef>
-        </p:style>
-      </p:cxnSp>
-      <p:sp>
-        <p:nvSpPr>
-          <p:cNvPr id="103" name="Alternate Process 102"/>
-          <p:cNvSpPr/>
-          <p:nvPr/>
-        </p:nvSpPr>
-        <p:spPr>
-          <a:xfrm>
-            <a:off x="4822540" y="5213906"/>
-            <a:ext cx="1524000" cy="1356704"/>
-          </a:xfrm>
-          <a:prstGeom prst="flowChartAlternateProcess">
-            <a:avLst/>
-          </a:prstGeom>
-          <a:solidFill>
-            <a:schemeClr val="bg1">
-              <a:lumMod val="85000"/>
-            </a:schemeClr>
-          </a:solidFill>
-          <a:ln>
-            <a:solidFill>
-              <a:schemeClr val="tx1"/>
-            </a:solidFill>
-          </a:ln>
-        </p:spPr>
-        <p:style>
-          <a:lnRef idx="1">
-            <a:schemeClr val="accent1"/>
-          </a:lnRef>
-          <a:fillRef idx="3">
-            <a:schemeClr val="accent1"/>
-          </a:fillRef>
-          <a:effectRef idx="2">
-            <a:schemeClr val="accent1"/>
-          </a:effectRef>
-          <a:fontRef idx="minor">
-            <a:schemeClr val="lt1"/>
-          </a:fontRef>
-        </p:style>
-        <p:txBody>
-          <a:bodyPr rtlCol="0" anchor="ctr"/>
-          <a:lstStyle/>
-          <a:p>
-            <a:pPr algn="ctr"/>
-            <a:endParaRPr lang="en-US" sz="1300" dirty="0"/>
-          </a:p>
-        </p:txBody>
-      </p:sp>
-      <p:sp>
-        <p:nvSpPr>
-          <p:cNvPr id="104" name="Rectangle 103"/>
-          <p:cNvSpPr/>
-          <p:nvPr/>
-        </p:nvSpPr>
-        <p:spPr>
-          <a:xfrm>
-            <a:off x="4935730" y="5191368"/>
-            <a:ext cx="1292128" cy="400110"/>
-          </a:xfrm>
-          <a:prstGeom prst="rect">
-            <a:avLst/>
-          </a:prstGeom>
-        </p:spPr>
-        <p:txBody>
-          <a:bodyPr wrap="square">
-            <a:spAutoFit/>
-          </a:bodyPr>
-          <a:lstStyle/>
-          <a:p>
-            <a:pPr algn="ctr"/>
-            <a:r>
-              <a:rPr lang="en-US" sz="2000" dirty="0" smtClean="0">
-                <a:solidFill>
-                  <a:srgbClr val="000000"/>
-                </a:solidFill>
-                <a:latin typeface="Arial"/>
-                <a:cs typeface="Arial"/>
-              </a:rPr>
-              <a:t>Outreach</a:t>
-            </a:r>
-            <a:endParaRPr lang="en-US" sz="2000" dirty="0">
-              <a:solidFill>
-                <a:srgbClr val="000000"/>
-              </a:solidFill>
-              <a:latin typeface="Arial"/>
-              <a:cs typeface="Arial"/>
-            </a:endParaRPr>
-          </a:p>
-        </p:txBody>
-      </p:sp>
-      <p:sp>
-        <p:nvSpPr>
-          <p:cNvPr id="105" name="Process 104"/>
-          <p:cNvSpPr/>
-          <p:nvPr/>
-        </p:nvSpPr>
-        <p:spPr>
-          <a:xfrm>
-            <a:off x="4935730" y="5557827"/>
-            <a:ext cx="1292128" cy="856001"/>
-          </a:xfrm>
-          <a:prstGeom prst="flowChartProcess">
-            <a:avLst/>
-          </a:prstGeom>
-          <a:solidFill>
-            <a:schemeClr val="bg1"/>
-          </a:solidFill>
-          <a:ln>
-            <a:solidFill>
-              <a:schemeClr val="tx1"/>
-            </a:solidFill>
-          </a:ln>
-          <a:effectLst/>
-        </p:spPr>
-        <p:style>
-          <a:lnRef idx="1">
-            <a:schemeClr val="accent1"/>
-          </a:lnRef>
-          <a:fillRef idx="3">
-            <a:schemeClr val="accent1"/>
-          </a:fillRef>
-          <a:effectRef idx="2">
-            <a:schemeClr val="accent1"/>
-          </a:effectRef>
-          <a:fontRef idx="minor">
-            <a:schemeClr val="lt1"/>
-          </a:fontRef>
-        </p:style>
-        <p:txBody>
-          <a:bodyPr rtlCol="0" anchor="ctr"/>
-          <a:lstStyle/>
-          <a:p>
-            <a:r>
-              <a:rPr lang="en-US" sz="1100" dirty="0" smtClean="0">
-                <a:solidFill>
-                  <a:srgbClr val="000000"/>
-                </a:solidFill>
-                <a:latin typeface="Arial"/>
-                <a:cs typeface="Arial"/>
-              </a:rPr>
-              <a:t>Members of public at events like Ag Day and Darwin Day.</a:t>
-            </a:r>
-            <a:endParaRPr lang="en-US" sz="1100" dirty="0">
-              <a:solidFill>
-                <a:srgbClr val="000000"/>
-              </a:solidFill>
-              <a:effectLst/>
-              <a:latin typeface="Arial"/>
-              <a:cs typeface="Arial"/>
-            </a:endParaRPr>
-          </a:p>
-        </p:txBody>
-      </p:sp>
-      <p:cxnSp>
-        <p:nvCxnSpPr>
-          <p:cNvPr id="106" name="Curved Connector 105"/>
-          <p:cNvCxnSpPr>
-            <a:stCxn id="54" idx="2"/>
-            <a:endCxn id="103" idx="1"/>
-          </p:cNvCxnSpPr>
-          <p:nvPr/>
-        </p:nvCxnSpPr>
-        <p:spPr>
-          <a:xfrm rot="16200000" flipH="1">
-            <a:off x="3409035" y="4478753"/>
-            <a:ext cx="134610" cy="2692400"/>
-          </a:xfrm>
-          <a:prstGeom prst="curvedConnector2">
-            <a:avLst/>
-          </a:prstGeom>
-          <a:ln>
-            <a:solidFill>
-              <a:srgbClr val="000000"/>
-            </a:solidFill>
-          </a:ln>
-          <a:effectLst>
-            <a:outerShdw blurRad="50800" dist="38100" dir="2700000" algn="tl" rotWithShape="0">
-              <a:prstClr val="black">
-                <a:alpha val="40000"/>
-              </a:prstClr>
-            </a:outerShdw>
-          </a:effectLst>
-        </p:spPr>
-        <p:style>
-          <a:lnRef idx="2">
-            <a:schemeClr val="accent1"/>
-          </a:lnRef>
-          <a:fillRef idx="0">
-            <a:schemeClr val="accent1"/>
-          </a:fillRef>
-          <a:effectRef idx="1">
-            <a:schemeClr val="accent1"/>
-          </a:effectRef>
-          <a:fontRef idx="minor">
-            <a:schemeClr val="tx1"/>
-          </a:fontRef>
-        </p:style>
-      </p:cxnSp>
-      <p:cxnSp>
-        <p:nvCxnSpPr>
-          <p:cNvPr id="112" name="Curved Connector 111"/>
-          <p:cNvCxnSpPr>
-            <a:stCxn id="103" idx="0"/>
-            <a:endCxn id="79" idx="1"/>
-          </p:cNvCxnSpPr>
-          <p:nvPr/>
-        </p:nvCxnSpPr>
-        <p:spPr>
-          <a:xfrm rot="5400000" flipH="1" flipV="1">
-            <a:off x="5561105" y="4064729"/>
-            <a:ext cx="1172612" cy="1125743"/>
-          </a:xfrm>
-          <a:prstGeom prst="curvedConnector2">
-            <a:avLst/>
-          </a:prstGeom>
-          <a:ln>
-            <a:solidFill>
-              <a:srgbClr val="000000"/>
-            </a:solidFill>
-          </a:ln>
-          <a:effectLst>
-            <a:outerShdw blurRad="50800" dist="38100" dir="2700000" algn="tl" rotWithShape="0">
-              <a:prstClr val="black">
-                <a:alpha val="40000"/>
-              </a:prstClr>
-            </a:outerShdw>
-          </a:effectLst>
-        </p:spPr>
-        <p:style>
-          <a:lnRef idx="2">
-            <a:schemeClr val="accent1"/>
-          </a:lnRef>
-          <a:fillRef idx="0">
-            <a:schemeClr val="accent1"/>
-          </a:fillRef>
-          <a:effectRef idx="1">
-            <a:schemeClr val="accent1"/>
-          </a:effectRef>
-          <a:fontRef idx="minor">
-            <a:schemeClr val="tx1"/>
-          </a:fontRef>
-        </p:style>
-      </p:cxnSp>
-      <p:cxnSp>
-        <p:nvCxnSpPr>
-          <p:cNvPr id="115" name="Curved Connector 114"/>
-          <p:cNvCxnSpPr>
-            <a:stCxn id="64" idx="1"/>
-            <a:endCxn id="45" idx="3"/>
-          </p:cNvCxnSpPr>
-          <p:nvPr/>
-        </p:nvCxnSpPr>
-        <p:spPr>
-          <a:xfrm rot="10800000">
-            <a:off x="7956156" y="1264636"/>
-            <a:ext cx="374394" cy="6349"/>
-          </a:xfrm>
-          <a:prstGeom prst="curvedConnector3">
-            <a:avLst>
-              <a:gd name="adj1" fmla="val 50000"/>
-            </a:avLst>
-          </a:prstGeom>
-          <a:ln>
-            <a:solidFill>
-              <a:srgbClr val="000000"/>
-            </a:solidFill>
-          </a:ln>
-          <a:effectLst>
-            <a:outerShdw blurRad="50800" dist="38100" dir="2700000" algn="tl" rotWithShape="0">
-              <a:prstClr val="black">
-                <a:alpha val="40000"/>
-              </a:prstClr>
-            </a:outerShdw>
-          </a:effectLst>
-        </p:spPr>
-        <p:style>
-          <a:lnRef idx="2">
-            <a:schemeClr val="accent1"/>
-          </a:lnRef>
-          <a:fillRef idx="0">
-            <a:schemeClr val="accent1"/>
-          </a:fillRef>
-          <a:effectRef idx="1">
-            <a:schemeClr val="accent1"/>
-          </a:effectRef>
-          <a:fontRef idx="minor">
-            <a:schemeClr val="tx1"/>
-          </a:fontRef>
-        </p:style>
-      </p:cxnSp>
     </p:spTree>
     <p:extLst>
       <p:ext uri="{BB962C8B-B14F-4D97-AF65-F5344CB8AC3E}">

</xml_diff>

<commit_message>
updated body et al.
</commit_message>
<xml_diff>
--- a/FinalProposal/OrgChart.pptx
+++ b/FinalProposal/OrgChart.pptx
@@ -288,7 +288,7 @@
           <a:p>
             <a:fld id="{ECE00523-3F0A-3D4F-9F00-E442DF3AB4B6}" type="datetimeFigureOut">
               <a:rPr lang="en-US" smtClean="0"/>
-              <a:t>2/4/17</a:t>
+              <a:t>2/5/17</a:t>
             </a:fld>
             <a:endParaRPr lang="en-US"/>
           </a:p>
@@ -458,7 +458,7 @@
           <a:p>
             <a:fld id="{ECE00523-3F0A-3D4F-9F00-E442DF3AB4B6}" type="datetimeFigureOut">
               <a:rPr lang="en-US" smtClean="0"/>
-              <a:t>2/4/17</a:t>
+              <a:t>2/5/17</a:t>
             </a:fld>
             <a:endParaRPr lang="en-US"/>
           </a:p>
@@ -638,7 +638,7 @@
           <a:p>
             <a:fld id="{ECE00523-3F0A-3D4F-9F00-E442DF3AB4B6}" type="datetimeFigureOut">
               <a:rPr lang="en-US" smtClean="0"/>
-              <a:t>2/4/17</a:t>
+              <a:t>2/5/17</a:t>
             </a:fld>
             <a:endParaRPr lang="en-US"/>
           </a:p>
@@ -808,7 +808,7 @@
           <a:p>
             <a:fld id="{ECE00523-3F0A-3D4F-9F00-E442DF3AB4B6}" type="datetimeFigureOut">
               <a:rPr lang="en-US" smtClean="0"/>
-              <a:t>2/4/17</a:t>
+              <a:t>2/5/17</a:t>
             </a:fld>
             <a:endParaRPr lang="en-US"/>
           </a:p>
@@ -1054,7 +1054,7 @@
           <a:p>
             <a:fld id="{ECE00523-3F0A-3D4F-9F00-E442DF3AB4B6}" type="datetimeFigureOut">
               <a:rPr lang="en-US" smtClean="0"/>
-              <a:t>2/4/17</a:t>
+              <a:t>2/5/17</a:t>
             </a:fld>
             <a:endParaRPr lang="en-US"/>
           </a:p>
@@ -1342,7 +1342,7 @@
           <a:p>
             <a:fld id="{ECE00523-3F0A-3D4F-9F00-E442DF3AB4B6}" type="datetimeFigureOut">
               <a:rPr lang="en-US" smtClean="0"/>
-              <a:t>2/4/17</a:t>
+              <a:t>2/5/17</a:t>
             </a:fld>
             <a:endParaRPr lang="en-US"/>
           </a:p>
@@ -1764,7 +1764,7 @@
           <a:p>
             <a:fld id="{ECE00523-3F0A-3D4F-9F00-E442DF3AB4B6}" type="datetimeFigureOut">
               <a:rPr lang="en-US" smtClean="0"/>
-              <a:t>2/4/17</a:t>
+              <a:t>2/5/17</a:t>
             </a:fld>
             <a:endParaRPr lang="en-US"/>
           </a:p>
@@ -1882,7 +1882,7 @@
           <a:p>
             <a:fld id="{ECE00523-3F0A-3D4F-9F00-E442DF3AB4B6}" type="datetimeFigureOut">
               <a:rPr lang="en-US" smtClean="0"/>
-              <a:t>2/4/17</a:t>
+              <a:t>2/5/17</a:t>
             </a:fld>
             <a:endParaRPr lang="en-US"/>
           </a:p>
@@ -1977,7 +1977,7 @@
           <a:p>
             <a:fld id="{ECE00523-3F0A-3D4F-9F00-E442DF3AB4B6}" type="datetimeFigureOut">
               <a:rPr lang="en-US" smtClean="0"/>
-              <a:t>2/4/17</a:t>
+              <a:t>2/5/17</a:t>
             </a:fld>
             <a:endParaRPr lang="en-US"/>
           </a:p>
@@ -2254,7 +2254,7 @@
           <a:p>
             <a:fld id="{ECE00523-3F0A-3D4F-9F00-E442DF3AB4B6}" type="datetimeFigureOut">
               <a:rPr lang="en-US" smtClean="0"/>
-              <a:t>2/4/17</a:t>
+              <a:t>2/5/17</a:t>
             </a:fld>
             <a:endParaRPr lang="en-US"/>
           </a:p>
@@ -2507,7 +2507,7 @@
           <a:p>
             <a:fld id="{ECE00523-3F0A-3D4F-9F00-E442DF3AB4B6}" type="datetimeFigureOut">
               <a:rPr lang="en-US" smtClean="0"/>
-              <a:t>2/4/17</a:t>
+              <a:t>2/5/17</a:t>
             </a:fld>
             <a:endParaRPr lang="en-US"/>
           </a:p>
@@ -2720,7 +2720,7 @@
           <a:p>
             <a:fld id="{ECE00523-3F0A-3D4F-9F00-E442DF3AB4B6}" type="datetimeFigureOut">
               <a:rPr lang="en-US" smtClean="0"/>
-              <a:t>2/4/17</a:t>
+              <a:t>2/5/17</a:t>
             </a:fld>
             <a:endParaRPr lang="en-US"/>
           </a:p>
@@ -3575,8 +3575,8 @@
         </p:nvCxnSpPr>
         <p:spPr>
           <a:xfrm>
-            <a:off x="1439404" y="4354658"/>
-            <a:ext cx="3371937" cy="1063183"/>
+            <a:off x="1338433" y="4656941"/>
+            <a:ext cx="3472908" cy="760900"/>
           </a:xfrm>
           <a:prstGeom prst="line">
             <a:avLst/>
@@ -3993,8 +3993,8 @@
         </p:nvSpPr>
         <p:spPr>
           <a:xfrm>
-            <a:off x="201943" y="1930705"/>
-            <a:ext cx="2474921" cy="869155"/>
+            <a:off x="1" y="1930705"/>
+            <a:ext cx="2676864" cy="869155"/>
           </a:xfrm>
           <a:prstGeom prst="flowChartAlternateProcess">
             <a:avLst/>
@@ -4056,8 +4056,8 @@
         </p:nvSpPr>
         <p:spPr>
           <a:xfrm>
-            <a:off x="201943" y="3485503"/>
-            <a:ext cx="2474922" cy="869155"/>
+            <a:off x="0" y="3018729"/>
+            <a:ext cx="2676865" cy="1638212"/>
           </a:xfrm>
           <a:prstGeom prst="flowChartAlternateProcess">
             <a:avLst/>
@@ -4099,7 +4099,17 @@
                 <a:latin typeface="Arial"/>
                 <a:cs typeface="Arial"/>
               </a:rPr>
-              <a:t>Multidisciplinary Advisory Teams</a:t>
+              <a:t>Multidisciplinary Advisory </a:t>
+            </a:r>
+            <a:r>
+              <a:rPr lang="en-US" sz="2400" dirty="0" smtClean="0">
+                <a:solidFill>
+                  <a:srgbClr val="000000"/>
+                </a:solidFill>
+                <a:latin typeface="Arial"/>
+                <a:cs typeface="Arial"/>
+              </a:rPr>
+              <a:t>Committees (MACs)</a:t>
             </a:r>
             <a:endParaRPr lang="en-US" sz="2400" dirty="0">
               <a:solidFill>

</xml_diff>